<commit_message>
pptx: add propositional-algebra; tweak digital-logic propositional-logic truth-tables
</commit_message>
<xml_diff>
--- a/spring15/slidesS15/digital-logic.pptx
+++ b/spring15/slidesS15/digital-logic.pptx
@@ -1401,8 +1401,8 @@
         </p:nvSpPr>
         <p:spPr>
           <a:xfrm>
-            <a:off x="7435108" y="6553200"/>
-            <a:ext cx="1708896" cy="276999"/>
+            <a:off x="8183885" y="6553200"/>
+            <a:ext cx="960119" cy="276999"/>
           </a:xfrm>
           <a:ln/>
         </p:spPr>
@@ -1419,7 +1419,11 @@
             </a:pPr>
             <a:r>
               <a:rPr lang="en-US" dirty="0" smtClean="0"/>
-              <a:t>propositional ops..</a:t>
+              <a:t>digital.</a:t>
+            </a:r>
+            <a:r>
+              <a:rPr lang="en-US" dirty="0" smtClean="0"/>
+              <a:t>.</a:t>
             </a:r>
             <a:fld id="{C3C9801B-391E-452B-A4C3-BC5EC51A0BC7}" type="slidenum">
               <a:rPr lang="en-US" smtClean="0"/>
@@ -1451,2036 +1455,6 @@
 </file>
 
 <file path=ppt/slideLayouts/slideLayout10.xml><?xml version="1.0" encoding="utf-8"?>
-<p:sldLayout xmlns:a="http://schemas.openxmlformats.org/drawingml/2006/main" xmlns:r="http://schemas.openxmlformats.org/officeDocument/2006/relationships" xmlns:p="http://schemas.openxmlformats.org/presentationml/2006/main" type="obj" preserve="1">
-  <p:cSld name="Title and Content">
-    <p:spTree>
-      <p:nvGrpSpPr>
-        <p:cNvPr id="1" name=""/>
-        <p:cNvGrpSpPr/>
-        <p:nvPr/>
-      </p:nvGrpSpPr>
-      <p:grpSpPr>
-        <a:xfrm>
-          <a:off x="0" y="0"/>
-          <a:ext cx="0" cy="0"/>
-          <a:chOff x="0" y="0"/>
-          <a:chExt cx="0" cy="0"/>
-        </a:xfrm>
-      </p:grpSpPr>
-      <p:sp>
-        <p:nvSpPr>
-          <p:cNvPr id="2" name="Title 1"/>
-          <p:cNvSpPr>
-            <a:spLocks noGrp="1"/>
-          </p:cNvSpPr>
-          <p:nvPr>
-            <p:ph type="title"/>
-          </p:nvPr>
-        </p:nvSpPr>
-        <p:spPr/>
-        <p:txBody>
-          <a:bodyPr/>
-          <a:lstStyle>
-            <a:lvl1pPr>
-              <a:defRPr sz="3600"/>
-            </a:lvl1pPr>
-          </a:lstStyle>
-          <a:p>
-            <a:r>
-              <a:rPr lang="en-US" dirty="0" smtClean="0"/>
-              <a:t>Click to edit Master title style</a:t>
-            </a:r>
-            <a:endParaRPr lang="en-US" dirty="0"/>
-          </a:p>
-        </p:txBody>
-      </p:sp>
-      <p:sp>
-        <p:nvSpPr>
-          <p:cNvPr id="3" name="Content Placeholder 2"/>
-          <p:cNvSpPr>
-            <a:spLocks noGrp="1"/>
-          </p:cNvSpPr>
-          <p:nvPr>
-            <p:ph idx="1"/>
-          </p:nvPr>
-        </p:nvSpPr>
-        <p:spPr/>
-        <p:txBody>
-          <a:bodyPr/>
-          <a:lstStyle>
-            <a:lvl1pPr>
-              <a:buNone/>
-              <a:defRPr>
-                <a:latin typeface="Comic Sans MS" pitchFamily="66" charset="0"/>
-              </a:defRPr>
-            </a:lvl1pPr>
-          </a:lstStyle>
-          <a:p>
-            <a:pPr lvl="0"/>
-            <a:r>
-              <a:rPr lang="en-US" dirty="0" smtClean="0"/>
-              <a:t>Click to edit Master text styles</a:t>
-            </a:r>
-          </a:p>
-        </p:txBody>
-      </p:sp>
-      <p:sp>
-        <p:nvSpPr>
-          <p:cNvPr id="4" name="Rectangle 4"/>
-          <p:cNvSpPr>
-            <a:spLocks noGrp="1" noChangeArrowheads="1"/>
-          </p:cNvSpPr>
-          <p:nvPr>
-            <p:ph type="sldNum" sz="quarter" idx="10"/>
-          </p:nvPr>
-        </p:nvSpPr>
-        <p:spPr>
-          <a:ln/>
-        </p:spPr>
-        <p:txBody>
-          <a:bodyPr/>
-          <a:lstStyle>
-            <a:lvl1pPr>
-              <a:defRPr/>
-            </a:lvl1pPr>
-          </a:lstStyle>
-          <a:p>
-            <a:pPr>
-              <a:defRPr/>
-            </a:pPr>
-            <a:r>
-              <a:rPr lang="en-US" dirty="0" smtClean="0"/>
-              <a:t>propositional ops.</a:t>
-            </a:r>
-            <a:fld id="{19F24CE2-1F4B-4512-B5C9-C4086662BBB7}" type="slidenum">
-              <a:rPr lang="en-US" smtClean="0"/>
-              <a:pPr>
-                <a:defRPr/>
-              </a:pPr>
-              <a:t>‹#›</a:t>
-            </a:fld>
-            <a:endParaRPr lang="en-US" dirty="0"/>
-          </a:p>
-        </p:txBody>
-      </p:sp>
-    </p:spTree>
-  </p:cSld>
-  <p:clrMapOvr>
-    <a:masterClrMapping/>
-  </p:clrMapOvr>
-  <p:transition xmlns:p14="http://schemas.microsoft.com/office/powerpoint/2010/main">
-    <p:fade/>
-  </p:transition>
-</p:sldLayout>
-</file>
-
-<file path=ppt/slideLayouts/slideLayout11.xml><?xml version="1.0" encoding="utf-8"?>
-<p:sldLayout xmlns:a="http://schemas.openxmlformats.org/drawingml/2006/main" xmlns:r="http://schemas.openxmlformats.org/officeDocument/2006/relationships" xmlns:p="http://schemas.openxmlformats.org/presentationml/2006/main" type="secHead" preserve="1">
-  <p:cSld name="Section Header">
-    <p:spTree>
-      <p:nvGrpSpPr>
-        <p:cNvPr id="1" name=""/>
-        <p:cNvGrpSpPr/>
-        <p:nvPr/>
-      </p:nvGrpSpPr>
-      <p:grpSpPr>
-        <a:xfrm>
-          <a:off x="0" y="0"/>
-          <a:ext cx="0" cy="0"/>
-          <a:chOff x="0" y="0"/>
-          <a:chExt cx="0" cy="0"/>
-        </a:xfrm>
-      </p:grpSpPr>
-      <p:sp>
-        <p:nvSpPr>
-          <p:cNvPr id="2" name="Title 1"/>
-          <p:cNvSpPr>
-            <a:spLocks noGrp="1"/>
-          </p:cNvSpPr>
-          <p:nvPr>
-            <p:ph type="title"/>
-          </p:nvPr>
-        </p:nvSpPr>
-        <p:spPr>
-          <a:xfrm>
-            <a:off x="722313" y="4406900"/>
-            <a:ext cx="7772400" cy="1362075"/>
-          </a:xfrm>
-        </p:spPr>
-        <p:txBody>
-          <a:bodyPr anchor="t"/>
-          <a:lstStyle>
-            <a:lvl1pPr algn="l">
-              <a:defRPr sz="4000" b="1" cap="all"/>
-            </a:lvl1pPr>
-          </a:lstStyle>
-          <a:p>
-            <a:r>
-              <a:rPr lang="en-US" smtClean="0"/>
-              <a:t>Click to edit Master title style</a:t>
-            </a:r>
-            <a:endParaRPr lang="en-US"/>
-          </a:p>
-        </p:txBody>
-      </p:sp>
-      <p:sp>
-        <p:nvSpPr>
-          <p:cNvPr id="3" name="Text Placeholder 2"/>
-          <p:cNvSpPr>
-            <a:spLocks noGrp="1"/>
-          </p:cNvSpPr>
-          <p:nvPr>
-            <p:ph type="body" idx="1"/>
-          </p:nvPr>
-        </p:nvSpPr>
-        <p:spPr>
-          <a:xfrm>
-            <a:off x="722313" y="2906713"/>
-            <a:ext cx="7772400" cy="1500187"/>
-          </a:xfrm>
-        </p:spPr>
-        <p:txBody>
-          <a:bodyPr anchor="b"/>
-          <a:lstStyle>
-            <a:lvl1pPr marL="0" indent="0">
-              <a:buNone/>
-              <a:defRPr sz="2000"/>
-            </a:lvl1pPr>
-            <a:lvl2pPr marL="457200" indent="0">
-              <a:buNone/>
-              <a:defRPr sz="1800"/>
-            </a:lvl2pPr>
-            <a:lvl3pPr marL="914400" indent="0">
-              <a:buNone/>
-              <a:defRPr sz="1600"/>
-            </a:lvl3pPr>
-            <a:lvl4pPr marL="1371600" indent="0">
-              <a:buNone/>
-              <a:defRPr sz="1400"/>
-            </a:lvl4pPr>
-            <a:lvl5pPr marL="1828800" indent="0">
-              <a:buNone/>
-              <a:defRPr sz="1400"/>
-            </a:lvl5pPr>
-            <a:lvl6pPr marL="2286000" indent="0">
-              <a:buNone/>
-              <a:defRPr sz="1400"/>
-            </a:lvl6pPr>
-            <a:lvl7pPr marL="2743200" indent="0">
-              <a:buNone/>
-              <a:defRPr sz="1400"/>
-            </a:lvl7pPr>
-            <a:lvl8pPr marL="3200400" indent="0">
-              <a:buNone/>
-              <a:defRPr sz="1400"/>
-            </a:lvl8pPr>
-            <a:lvl9pPr marL="3657600" indent="0">
-              <a:buNone/>
-              <a:defRPr sz="1400"/>
-            </a:lvl9pPr>
-          </a:lstStyle>
-          <a:p>
-            <a:pPr lvl="0"/>
-            <a:r>
-              <a:rPr lang="en-US" smtClean="0"/>
-              <a:t>Click to edit Master text styles</a:t>
-            </a:r>
-          </a:p>
-        </p:txBody>
-      </p:sp>
-      <p:sp>
-        <p:nvSpPr>
-          <p:cNvPr id="4" name="Rectangle 4"/>
-          <p:cNvSpPr>
-            <a:spLocks noGrp="1" noChangeArrowheads="1"/>
-          </p:cNvSpPr>
-          <p:nvPr>
-            <p:ph type="sldNum" sz="quarter" idx="10"/>
-          </p:nvPr>
-        </p:nvSpPr>
-        <p:spPr>
-          <a:ln/>
-        </p:spPr>
-        <p:txBody>
-          <a:bodyPr/>
-          <a:lstStyle>
-            <a:lvl1pPr>
-              <a:defRPr/>
-            </a:lvl1pPr>
-          </a:lstStyle>
-          <a:p>
-            <a:pPr>
-              <a:defRPr/>
-            </a:pPr>
-            <a:r>
-              <a:rPr lang="en-US" dirty="0" smtClean="0"/>
-              <a:t>propositional ops.</a:t>
-            </a:r>
-            <a:fld id="{37824D00-345F-4FD0-936A-71B5AC18468B}" type="slidenum">
-              <a:rPr lang="en-US" smtClean="0"/>
-              <a:pPr>
-                <a:defRPr/>
-              </a:pPr>
-              <a:t>‹#›</a:t>
-            </a:fld>
-            <a:endParaRPr lang="en-US" dirty="0"/>
-          </a:p>
-        </p:txBody>
-      </p:sp>
-    </p:spTree>
-  </p:cSld>
-  <p:clrMapOvr>
-    <a:masterClrMapping/>
-  </p:clrMapOvr>
-  <p:transition xmlns:p14="http://schemas.microsoft.com/office/powerpoint/2010/main">
-    <p:fade/>
-  </p:transition>
-</p:sldLayout>
-</file>
-
-<file path=ppt/slideLayouts/slideLayout12.xml><?xml version="1.0" encoding="utf-8"?>
-<p:sldLayout xmlns:a="http://schemas.openxmlformats.org/drawingml/2006/main" xmlns:r="http://schemas.openxmlformats.org/officeDocument/2006/relationships" xmlns:p="http://schemas.openxmlformats.org/presentationml/2006/main" type="twoObj" preserve="1">
-  <p:cSld name="Two Content">
-    <p:spTree>
-      <p:nvGrpSpPr>
-        <p:cNvPr id="1" name=""/>
-        <p:cNvGrpSpPr/>
-        <p:nvPr/>
-      </p:nvGrpSpPr>
-      <p:grpSpPr>
-        <a:xfrm>
-          <a:off x="0" y="0"/>
-          <a:ext cx="0" cy="0"/>
-          <a:chOff x="0" y="0"/>
-          <a:chExt cx="0" cy="0"/>
-        </a:xfrm>
-      </p:grpSpPr>
-      <p:sp>
-        <p:nvSpPr>
-          <p:cNvPr id="2" name="Title 1"/>
-          <p:cNvSpPr>
-            <a:spLocks noGrp="1"/>
-          </p:cNvSpPr>
-          <p:nvPr>
-            <p:ph type="title"/>
-          </p:nvPr>
-        </p:nvSpPr>
-        <p:spPr/>
-        <p:txBody>
-          <a:bodyPr/>
-          <a:lstStyle/>
-          <a:p>
-            <a:r>
-              <a:rPr lang="en-US" smtClean="0"/>
-              <a:t>Click to edit Master title style</a:t>
-            </a:r>
-            <a:endParaRPr lang="en-US"/>
-          </a:p>
-        </p:txBody>
-      </p:sp>
-      <p:sp>
-        <p:nvSpPr>
-          <p:cNvPr id="3" name="Content Placeholder 2"/>
-          <p:cNvSpPr>
-            <a:spLocks noGrp="1"/>
-          </p:cNvSpPr>
-          <p:nvPr>
-            <p:ph sz="half" idx="1"/>
-          </p:nvPr>
-        </p:nvSpPr>
-        <p:spPr>
-          <a:xfrm>
-            <a:off x="685800" y="2057400"/>
-            <a:ext cx="3810000" cy="4114800"/>
-          </a:xfrm>
-        </p:spPr>
-        <p:txBody>
-          <a:bodyPr/>
-          <a:lstStyle>
-            <a:lvl1pPr>
-              <a:defRPr sz="2800"/>
-            </a:lvl1pPr>
-            <a:lvl2pPr>
-              <a:defRPr sz="2400"/>
-            </a:lvl2pPr>
-            <a:lvl3pPr>
-              <a:defRPr sz="2000"/>
-            </a:lvl3pPr>
-            <a:lvl4pPr>
-              <a:defRPr sz="1800"/>
-            </a:lvl4pPr>
-            <a:lvl5pPr>
-              <a:defRPr sz="1800"/>
-            </a:lvl5pPr>
-            <a:lvl6pPr>
-              <a:defRPr sz="1800"/>
-            </a:lvl6pPr>
-            <a:lvl7pPr>
-              <a:defRPr sz="1800"/>
-            </a:lvl7pPr>
-            <a:lvl8pPr>
-              <a:defRPr sz="1800"/>
-            </a:lvl8pPr>
-            <a:lvl9pPr>
-              <a:defRPr sz="1800"/>
-            </a:lvl9pPr>
-          </a:lstStyle>
-          <a:p>
-            <a:pPr lvl="0"/>
-            <a:r>
-              <a:rPr lang="en-US" smtClean="0"/>
-              <a:t>Click to edit Master text styles</a:t>
-            </a:r>
-          </a:p>
-          <a:p>
-            <a:pPr lvl="1"/>
-            <a:r>
-              <a:rPr lang="en-US" smtClean="0"/>
-              <a:t>Second level</a:t>
-            </a:r>
-          </a:p>
-          <a:p>
-            <a:pPr lvl="2"/>
-            <a:r>
-              <a:rPr lang="en-US" smtClean="0"/>
-              <a:t>Third level</a:t>
-            </a:r>
-          </a:p>
-          <a:p>
-            <a:pPr lvl="3"/>
-            <a:r>
-              <a:rPr lang="en-US" smtClean="0"/>
-              <a:t>Fourth level</a:t>
-            </a:r>
-          </a:p>
-          <a:p>
-            <a:pPr lvl="4"/>
-            <a:r>
-              <a:rPr lang="en-US" smtClean="0"/>
-              <a:t>Fifth level</a:t>
-            </a:r>
-            <a:endParaRPr lang="en-US"/>
-          </a:p>
-        </p:txBody>
-      </p:sp>
-      <p:sp>
-        <p:nvSpPr>
-          <p:cNvPr id="4" name="Content Placeholder 3"/>
-          <p:cNvSpPr>
-            <a:spLocks noGrp="1"/>
-          </p:cNvSpPr>
-          <p:nvPr>
-            <p:ph sz="half" idx="2"/>
-          </p:nvPr>
-        </p:nvSpPr>
-        <p:spPr>
-          <a:xfrm>
-            <a:off x="4648200" y="2057400"/>
-            <a:ext cx="3810000" cy="4114800"/>
-          </a:xfrm>
-        </p:spPr>
-        <p:txBody>
-          <a:bodyPr/>
-          <a:lstStyle>
-            <a:lvl1pPr>
-              <a:defRPr sz="2800"/>
-            </a:lvl1pPr>
-            <a:lvl2pPr>
-              <a:defRPr sz="2400"/>
-            </a:lvl2pPr>
-            <a:lvl3pPr>
-              <a:defRPr sz="2000"/>
-            </a:lvl3pPr>
-            <a:lvl4pPr>
-              <a:defRPr sz="1800"/>
-            </a:lvl4pPr>
-            <a:lvl5pPr>
-              <a:defRPr sz="1800"/>
-            </a:lvl5pPr>
-            <a:lvl6pPr>
-              <a:defRPr sz="1800"/>
-            </a:lvl6pPr>
-            <a:lvl7pPr>
-              <a:defRPr sz="1800"/>
-            </a:lvl7pPr>
-            <a:lvl8pPr>
-              <a:defRPr sz="1800"/>
-            </a:lvl8pPr>
-            <a:lvl9pPr>
-              <a:defRPr sz="1800"/>
-            </a:lvl9pPr>
-          </a:lstStyle>
-          <a:p>
-            <a:pPr lvl="0"/>
-            <a:r>
-              <a:rPr lang="en-US" smtClean="0"/>
-              <a:t>Click to edit Master text styles</a:t>
-            </a:r>
-          </a:p>
-          <a:p>
-            <a:pPr lvl="1"/>
-            <a:r>
-              <a:rPr lang="en-US" smtClean="0"/>
-              <a:t>Second level</a:t>
-            </a:r>
-          </a:p>
-          <a:p>
-            <a:pPr lvl="2"/>
-            <a:r>
-              <a:rPr lang="en-US" smtClean="0"/>
-              <a:t>Third level</a:t>
-            </a:r>
-          </a:p>
-          <a:p>
-            <a:pPr lvl="3"/>
-            <a:r>
-              <a:rPr lang="en-US" smtClean="0"/>
-              <a:t>Fourth level</a:t>
-            </a:r>
-          </a:p>
-          <a:p>
-            <a:pPr lvl="4"/>
-            <a:r>
-              <a:rPr lang="en-US" smtClean="0"/>
-              <a:t>Fifth level</a:t>
-            </a:r>
-            <a:endParaRPr lang="en-US"/>
-          </a:p>
-        </p:txBody>
-      </p:sp>
-      <p:sp>
-        <p:nvSpPr>
-          <p:cNvPr id="5" name="Rectangle 4"/>
-          <p:cNvSpPr>
-            <a:spLocks noGrp="1" noChangeArrowheads="1"/>
-          </p:cNvSpPr>
-          <p:nvPr>
-            <p:ph type="sldNum" sz="quarter" idx="10"/>
-          </p:nvPr>
-        </p:nvSpPr>
-        <p:spPr>
-          <a:ln/>
-        </p:spPr>
-        <p:txBody>
-          <a:bodyPr/>
-          <a:lstStyle>
-            <a:lvl1pPr>
-              <a:defRPr/>
-            </a:lvl1pPr>
-          </a:lstStyle>
-          <a:p>
-            <a:pPr>
-              <a:defRPr/>
-            </a:pPr>
-            <a:r>
-              <a:rPr lang="en-US" dirty="0" smtClean="0"/>
-              <a:t>propositional ops.</a:t>
-            </a:r>
-            <a:fld id="{C4F24D8D-A185-4E60-9514-B135EA8C3BD6}" type="slidenum">
-              <a:rPr lang="en-US" smtClean="0"/>
-              <a:pPr>
-                <a:defRPr/>
-              </a:pPr>
-              <a:t>‹#›</a:t>
-            </a:fld>
-            <a:endParaRPr lang="en-US" dirty="0"/>
-          </a:p>
-        </p:txBody>
-      </p:sp>
-    </p:spTree>
-  </p:cSld>
-  <p:clrMapOvr>
-    <a:masterClrMapping/>
-  </p:clrMapOvr>
-  <p:transition xmlns:p14="http://schemas.microsoft.com/office/powerpoint/2010/main">
-    <p:fade/>
-  </p:transition>
-</p:sldLayout>
-</file>
-
-<file path=ppt/slideLayouts/slideLayout13.xml><?xml version="1.0" encoding="utf-8"?>
-<p:sldLayout xmlns:a="http://schemas.openxmlformats.org/drawingml/2006/main" xmlns:r="http://schemas.openxmlformats.org/officeDocument/2006/relationships" xmlns:p="http://schemas.openxmlformats.org/presentationml/2006/main" type="twoTxTwoObj" preserve="1">
-  <p:cSld name="Comparison">
-    <p:spTree>
-      <p:nvGrpSpPr>
-        <p:cNvPr id="1" name=""/>
-        <p:cNvGrpSpPr/>
-        <p:nvPr/>
-      </p:nvGrpSpPr>
-      <p:grpSpPr>
-        <a:xfrm>
-          <a:off x="0" y="0"/>
-          <a:ext cx="0" cy="0"/>
-          <a:chOff x="0" y="0"/>
-          <a:chExt cx="0" cy="0"/>
-        </a:xfrm>
-      </p:grpSpPr>
-      <p:sp>
-        <p:nvSpPr>
-          <p:cNvPr id="2" name="Title 1"/>
-          <p:cNvSpPr>
-            <a:spLocks noGrp="1"/>
-          </p:cNvSpPr>
-          <p:nvPr>
-            <p:ph type="title"/>
-          </p:nvPr>
-        </p:nvSpPr>
-        <p:spPr>
-          <a:xfrm>
-            <a:off x="457200" y="274638"/>
-            <a:ext cx="8229600" cy="1143000"/>
-          </a:xfrm>
-        </p:spPr>
-        <p:txBody>
-          <a:bodyPr/>
-          <a:lstStyle>
-            <a:lvl1pPr>
-              <a:defRPr/>
-            </a:lvl1pPr>
-          </a:lstStyle>
-          <a:p>
-            <a:r>
-              <a:rPr lang="en-US" smtClean="0"/>
-              <a:t>Click to edit Master title style</a:t>
-            </a:r>
-            <a:endParaRPr lang="en-US"/>
-          </a:p>
-        </p:txBody>
-      </p:sp>
-      <p:sp>
-        <p:nvSpPr>
-          <p:cNvPr id="3" name="Text Placeholder 2"/>
-          <p:cNvSpPr>
-            <a:spLocks noGrp="1"/>
-          </p:cNvSpPr>
-          <p:nvPr>
-            <p:ph type="body" idx="1"/>
-          </p:nvPr>
-        </p:nvSpPr>
-        <p:spPr>
-          <a:xfrm>
-            <a:off x="457200" y="1535113"/>
-            <a:ext cx="4040188" cy="639762"/>
-          </a:xfrm>
-        </p:spPr>
-        <p:txBody>
-          <a:bodyPr anchor="b"/>
-          <a:lstStyle>
-            <a:lvl1pPr marL="0" indent="0">
-              <a:buNone/>
-              <a:defRPr sz="2400" b="1"/>
-            </a:lvl1pPr>
-            <a:lvl2pPr marL="457200" indent="0">
-              <a:buNone/>
-              <a:defRPr sz="2000" b="1"/>
-            </a:lvl2pPr>
-            <a:lvl3pPr marL="914400" indent="0">
-              <a:buNone/>
-              <a:defRPr sz="1800" b="1"/>
-            </a:lvl3pPr>
-            <a:lvl4pPr marL="1371600" indent="0">
-              <a:buNone/>
-              <a:defRPr sz="1600" b="1"/>
-            </a:lvl4pPr>
-            <a:lvl5pPr marL="1828800" indent="0">
-              <a:buNone/>
-              <a:defRPr sz="1600" b="1"/>
-            </a:lvl5pPr>
-            <a:lvl6pPr marL="2286000" indent="0">
-              <a:buNone/>
-              <a:defRPr sz="1600" b="1"/>
-            </a:lvl6pPr>
-            <a:lvl7pPr marL="2743200" indent="0">
-              <a:buNone/>
-              <a:defRPr sz="1600" b="1"/>
-            </a:lvl7pPr>
-            <a:lvl8pPr marL="3200400" indent="0">
-              <a:buNone/>
-              <a:defRPr sz="1600" b="1"/>
-            </a:lvl8pPr>
-            <a:lvl9pPr marL="3657600" indent="0">
-              <a:buNone/>
-              <a:defRPr sz="1600" b="1"/>
-            </a:lvl9pPr>
-          </a:lstStyle>
-          <a:p>
-            <a:pPr lvl="0"/>
-            <a:r>
-              <a:rPr lang="en-US" smtClean="0"/>
-              <a:t>Click to edit Master text styles</a:t>
-            </a:r>
-          </a:p>
-        </p:txBody>
-      </p:sp>
-      <p:sp>
-        <p:nvSpPr>
-          <p:cNvPr id="4" name="Content Placeholder 3"/>
-          <p:cNvSpPr>
-            <a:spLocks noGrp="1"/>
-          </p:cNvSpPr>
-          <p:nvPr>
-            <p:ph sz="half" idx="2"/>
-          </p:nvPr>
-        </p:nvSpPr>
-        <p:spPr>
-          <a:xfrm>
-            <a:off x="457200" y="2174875"/>
-            <a:ext cx="4040188" cy="3951288"/>
-          </a:xfrm>
-        </p:spPr>
-        <p:txBody>
-          <a:bodyPr/>
-          <a:lstStyle>
-            <a:lvl1pPr>
-              <a:defRPr sz="2400"/>
-            </a:lvl1pPr>
-            <a:lvl2pPr>
-              <a:defRPr sz="2000"/>
-            </a:lvl2pPr>
-            <a:lvl3pPr>
-              <a:defRPr sz="1800"/>
-            </a:lvl3pPr>
-            <a:lvl4pPr>
-              <a:defRPr sz="1600"/>
-            </a:lvl4pPr>
-            <a:lvl5pPr>
-              <a:defRPr sz="1600"/>
-            </a:lvl5pPr>
-            <a:lvl6pPr>
-              <a:defRPr sz="1600"/>
-            </a:lvl6pPr>
-            <a:lvl7pPr>
-              <a:defRPr sz="1600"/>
-            </a:lvl7pPr>
-            <a:lvl8pPr>
-              <a:defRPr sz="1600"/>
-            </a:lvl8pPr>
-            <a:lvl9pPr>
-              <a:defRPr sz="1600"/>
-            </a:lvl9pPr>
-          </a:lstStyle>
-          <a:p>
-            <a:pPr lvl="0"/>
-            <a:r>
-              <a:rPr lang="en-US" smtClean="0"/>
-              <a:t>Click to edit Master text styles</a:t>
-            </a:r>
-          </a:p>
-          <a:p>
-            <a:pPr lvl="1"/>
-            <a:r>
-              <a:rPr lang="en-US" smtClean="0"/>
-              <a:t>Second level</a:t>
-            </a:r>
-          </a:p>
-          <a:p>
-            <a:pPr lvl="2"/>
-            <a:r>
-              <a:rPr lang="en-US" smtClean="0"/>
-              <a:t>Third level</a:t>
-            </a:r>
-          </a:p>
-          <a:p>
-            <a:pPr lvl="3"/>
-            <a:r>
-              <a:rPr lang="en-US" smtClean="0"/>
-              <a:t>Fourth level</a:t>
-            </a:r>
-          </a:p>
-          <a:p>
-            <a:pPr lvl="4"/>
-            <a:r>
-              <a:rPr lang="en-US" smtClean="0"/>
-              <a:t>Fifth level</a:t>
-            </a:r>
-            <a:endParaRPr lang="en-US"/>
-          </a:p>
-        </p:txBody>
-      </p:sp>
-      <p:sp>
-        <p:nvSpPr>
-          <p:cNvPr id="5" name="Text Placeholder 4"/>
-          <p:cNvSpPr>
-            <a:spLocks noGrp="1"/>
-          </p:cNvSpPr>
-          <p:nvPr>
-            <p:ph type="body" sz="quarter" idx="3"/>
-          </p:nvPr>
-        </p:nvSpPr>
-        <p:spPr>
-          <a:xfrm>
-            <a:off x="4645025" y="1535113"/>
-            <a:ext cx="4041775" cy="639762"/>
-          </a:xfrm>
-        </p:spPr>
-        <p:txBody>
-          <a:bodyPr anchor="b"/>
-          <a:lstStyle>
-            <a:lvl1pPr marL="0" indent="0">
-              <a:buNone/>
-              <a:defRPr sz="2400" b="1"/>
-            </a:lvl1pPr>
-            <a:lvl2pPr marL="457200" indent="0">
-              <a:buNone/>
-              <a:defRPr sz="2000" b="1"/>
-            </a:lvl2pPr>
-            <a:lvl3pPr marL="914400" indent="0">
-              <a:buNone/>
-              <a:defRPr sz="1800" b="1"/>
-            </a:lvl3pPr>
-            <a:lvl4pPr marL="1371600" indent="0">
-              <a:buNone/>
-              <a:defRPr sz="1600" b="1"/>
-            </a:lvl4pPr>
-            <a:lvl5pPr marL="1828800" indent="0">
-              <a:buNone/>
-              <a:defRPr sz="1600" b="1"/>
-            </a:lvl5pPr>
-            <a:lvl6pPr marL="2286000" indent="0">
-              <a:buNone/>
-              <a:defRPr sz="1600" b="1"/>
-            </a:lvl6pPr>
-            <a:lvl7pPr marL="2743200" indent="0">
-              <a:buNone/>
-              <a:defRPr sz="1600" b="1"/>
-            </a:lvl7pPr>
-            <a:lvl8pPr marL="3200400" indent="0">
-              <a:buNone/>
-              <a:defRPr sz="1600" b="1"/>
-            </a:lvl8pPr>
-            <a:lvl9pPr marL="3657600" indent="0">
-              <a:buNone/>
-              <a:defRPr sz="1600" b="1"/>
-            </a:lvl9pPr>
-          </a:lstStyle>
-          <a:p>
-            <a:pPr lvl="0"/>
-            <a:r>
-              <a:rPr lang="en-US" smtClean="0"/>
-              <a:t>Click to edit Master text styles</a:t>
-            </a:r>
-          </a:p>
-        </p:txBody>
-      </p:sp>
-      <p:sp>
-        <p:nvSpPr>
-          <p:cNvPr id="6" name="Content Placeholder 5"/>
-          <p:cNvSpPr>
-            <a:spLocks noGrp="1"/>
-          </p:cNvSpPr>
-          <p:nvPr>
-            <p:ph sz="quarter" idx="4"/>
-          </p:nvPr>
-        </p:nvSpPr>
-        <p:spPr>
-          <a:xfrm>
-            <a:off x="4645025" y="2174875"/>
-            <a:ext cx="4041775" cy="3951288"/>
-          </a:xfrm>
-        </p:spPr>
-        <p:txBody>
-          <a:bodyPr/>
-          <a:lstStyle>
-            <a:lvl1pPr>
-              <a:defRPr sz="2400"/>
-            </a:lvl1pPr>
-            <a:lvl2pPr>
-              <a:defRPr sz="2000"/>
-            </a:lvl2pPr>
-            <a:lvl3pPr>
-              <a:defRPr sz="1800"/>
-            </a:lvl3pPr>
-            <a:lvl4pPr>
-              <a:defRPr sz="1600"/>
-            </a:lvl4pPr>
-            <a:lvl5pPr>
-              <a:defRPr sz="1600"/>
-            </a:lvl5pPr>
-            <a:lvl6pPr>
-              <a:defRPr sz="1600"/>
-            </a:lvl6pPr>
-            <a:lvl7pPr>
-              <a:defRPr sz="1600"/>
-            </a:lvl7pPr>
-            <a:lvl8pPr>
-              <a:defRPr sz="1600"/>
-            </a:lvl8pPr>
-            <a:lvl9pPr>
-              <a:defRPr sz="1600"/>
-            </a:lvl9pPr>
-          </a:lstStyle>
-          <a:p>
-            <a:pPr lvl="0"/>
-            <a:r>
-              <a:rPr lang="en-US" smtClean="0"/>
-              <a:t>Click to edit Master text styles</a:t>
-            </a:r>
-          </a:p>
-          <a:p>
-            <a:pPr lvl="1"/>
-            <a:r>
-              <a:rPr lang="en-US" smtClean="0"/>
-              <a:t>Second level</a:t>
-            </a:r>
-          </a:p>
-          <a:p>
-            <a:pPr lvl="2"/>
-            <a:r>
-              <a:rPr lang="en-US" smtClean="0"/>
-              <a:t>Third level</a:t>
-            </a:r>
-          </a:p>
-          <a:p>
-            <a:pPr lvl="3"/>
-            <a:r>
-              <a:rPr lang="en-US" smtClean="0"/>
-              <a:t>Fourth level</a:t>
-            </a:r>
-          </a:p>
-          <a:p>
-            <a:pPr lvl="4"/>
-            <a:r>
-              <a:rPr lang="en-US" smtClean="0"/>
-              <a:t>Fifth level</a:t>
-            </a:r>
-            <a:endParaRPr lang="en-US"/>
-          </a:p>
-        </p:txBody>
-      </p:sp>
-      <p:sp>
-        <p:nvSpPr>
-          <p:cNvPr id="7" name="Rectangle 4"/>
-          <p:cNvSpPr>
-            <a:spLocks noGrp="1" noChangeArrowheads="1"/>
-          </p:cNvSpPr>
-          <p:nvPr>
-            <p:ph type="sldNum" sz="quarter" idx="10"/>
-          </p:nvPr>
-        </p:nvSpPr>
-        <p:spPr>
-          <a:ln/>
-        </p:spPr>
-        <p:txBody>
-          <a:bodyPr/>
-          <a:lstStyle>
-            <a:lvl1pPr>
-              <a:defRPr/>
-            </a:lvl1pPr>
-          </a:lstStyle>
-          <a:p>
-            <a:pPr>
-              <a:defRPr/>
-            </a:pPr>
-            <a:r>
-              <a:rPr lang="en-US" dirty="0" smtClean="0"/>
-              <a:t>propositional ops.</a:t>
-            </a:r>
-            <a:fld id="{CE491DCD-8313-4DB4-A347-0C0100589210}" type="slidenum">
-              <a:rPr lang="en-US" smtClean="0"/>
-              <a:pPr>
-                <a:defRPr/>
-              </a:pPr>
-              <a:t>‹#›</a:t>
-            </a:fld>
-            <a:endParaRPr lang="en-US" dirty="0"/>
-          </a:p>
-        </p:txBody>
-      </p:sp>
-    </p:spTree>
-  </p:cSld>
-  <p:clrMapOvr>
-    <a:masterClrMapping/>
-  </p:clrMapOvr>
-  <p:transition xmlns:p14="http://schemas.microsoft.com/office/powerpoint/2010/main">
-    <p:fade/>
-  </p:transition>
-</p:sldLayout>
-</file>
-
-<file path=ppt/slideLayouts/slideLayout14.xml><?xml version="1.0" encoding="utf-8"?>
-<p:sldLayout xmlns:a="http://schemas.openxmlformats.org/drawingml/2006/main" xmlns:r="http://schemas.openxmlformats.org/officeDocument/2006/relationships" xmlns:p="http://schemas.openxmlformats.org/presentationml/2006/main" type="titleOnly" preserve="1">
-  <p:cSld name="Title Only">
-    <p:spTree>
-      <p:nvGrpSpPr>
-        <p:cNvPr id="1" name=""/>
-        <p:cNvGrpSpPr/>
-        <p:nvPr/>
-      </p:nvGrpSpPr>
-      <p:grpSpPr>
-        <a:xfrm>
-          <a:off x="0" y="0"/>
-          <a:ext cx="0" cy="0"/>
-          <a:chOff x="0" y="0"/>
-          <a:chExt cx="0" cy="0"/>
-        </a:xfrm>
-      </p:grpSpPr>
-      <p:sp>
-        <p:nvSpPr>
-          <p:cNvPr id="2" name="Title 1"/>
-          <p:cNvSpPr>
-            <a:spLocks noGrp="1"/>
-          </p:cNvSpPr>
-          <p:nvPr>
-            <p:ph type="title"/>
-          </p:nvPr>
-        </p:nvSpPr>
-        <p:spPr/>
-        <p:txBody>
-          <a:bodyPr/>
-          <a:lstStyle>
-            <a:lvl1pPr>
-              <a:defRPr sz="3600"/>
-            </a:lvl1pPr>
-          </a:lstStyle>
-          <a:p>
-            <a:r>
-              <a:rPr lang="en-US" dirty="0" smtClean="0"/>
-              <a:t>Click to edit Master title style</a:t>
-            </a:r>
-            <a:endParaRPr lang="en-US" dirty="0"/>
-          </a:p>
-        </p:txBody>
-      </p:sp>
-      <p:sp>
-        <p:nvSpPr>
-          <p:cNvPr id="3" name="Rectangle 4"/>
-          <p:cNvSpPr>
-            <a:spLocks noGrp="1" noChangeArrowheads="1"/>
-          </p:cNvSpPr>
-          <p:nvPr>
-            <p:ph type="sldNum" sz="quarter" idx="10"/>
-          </p:nvPr>
-        </p:nvSpPr>
-        <p:spPr>
-          <a:ln/>
-        </p:spPr>
-        <p:txBody>
-          <a:bodyPr/>
-          <a:lstStyle>
-            <a:lvl1pPr>
-              <a:defRPr/>
-            </a:lvl1pPr>
-          </a:lstStyle>
-          <a:p>
-            <a:pPr>
-              <a:defRPr/>
-            </a:pPr>
-            <a:r>
-              <a:rPr lang="en-US" dirty="0" smtClean="0"/>
-              <a:t>propositional ops.</a:t>
-            </a:r>
-            <a:fld id="{C1105D0F-4076-4DA8-8BBA-221619D9A970}" type="slidenum">
-              <a:rPr lang="en-US" smtClean="0"/>
-              <a:pPr>
-                <a:defRPr/>
-              </a:pPr>
-              <a:t>‹#›</a:t>
-            </a:fld>
-            <a:endParaRPr lang="en-US" dirty="0"/>
-          </a:p>
-        </p:txBody>
-      </p:sp>
-    </p:spTree>
-  </p:cSld>
-  <p:clrMapOvr>
-    <a:masterClrMapping/>
-  </p:clrMapOvr>
-  <p:transition xmlns:p14="http://schemas.microsoft.com/office/powerpoint/2010/main">
-    <p:fade/>
-  </p:transition>
-</p:sldLayout>
-</file>
-
-<file path=ppt/slideLayouts/slideLayout15.xml><?xml version="1.0" encoding="utf-8"?>
-<p:sldLayout xmlns:a="http://schemas.openxmlformats.org/drawingml/2006/main" xmlns:r="http://schemas.openxmlformats.org/officeDocument/2006/relationships" xmlns:p="http://schemas.openxmlformats.org/presentationml/2006/main" type="blank" preserve="1">
-  <p:cSld name="Blank">
-    <p:spTree>
-      <p:nvGrpSpPr>
-        <p:cNvPr id="1" name=""/>
-        <p:cNvGrpSpPr/>
-        <p:nvPr/>
-      </p:nvGrpSpPr>
-      <p:grpSpPr>
-        <a:xfrm>
-          <a:off x="0" y="0"/>
-          <a:ext cx="0" cy="0"/>
-          <a:chOff x="0" y="0"/>
-          <a:chExt cx="0" cy="0"/>
-        </a:xfrm>
-      </p:grpSpPr>
-      <p:sp>
-        <p:nvSpPr>
-          <p:cNvPr id="2" name="Rectangle 4"/>
-          <p:cNvSpPr>
-            <a:spLocks noGrp="1" noChangeArrowheads="1"/>
-          </p:cNvSpPr>
-          <p:nvPr>
-            <p:ph type="sldNum" sz="quarter" idx="10"/>
-          </p:nvPr>
-        </p:nvSpPr>
-        <p:spPr>
-          <a:ln/>
-        </p:spPr>
-        <p:txBody>
-          <a:bodyPr/>
-          <a:lstStyle>
-            <a:lvl1pPr>
-              <a:defRPr/>
-            </a:lvl1pPr>
-          </a:lstStyle>
-          <a:p>
-            <a:pPr>
-              <a:defRPr/>
-            </a:pPr>
-            <a:r>
-              <a:rPr lang="en-US" dirty="0" smtClean="0"/>
-              <a:t>propositional ops.</a:t>
-            </a:r>
-            <a:fld id="{075B8CF0-67CE-46DB-AD5A-266E8FD0124B}" type="slidenum">
-              <a:rPr lang="en-US" smtClean="0"/>
-              <a:pPr>
-                <a:defRPr/>
-              </a:pPr>
-              <a:t>‹#›</a:t>
-            </a:fld>
-            <a:endParaRPr lang="en-US" dirty="0"/>
-          </a:p>
-        </p:txBody>
-      </p:sp>
-    </p:spTree>
-  </p:cSld>
-  <p:clrMapOvr>
-    <a:masterClrMapping/>
-  </p:clrMapOvr>
-  <p:transition xmlns:p14="http://schemas.microsoft.com/office/powerpoint/2010/main">
-    <p:fade/>
-  </p:transition>
-</p:sldLayout>
-</file>
-
-<file path=ppt/slideLayouts/slideLayout16.xml><?xml version="1.0" encoding="utf-8"?>
-<p:sldLayout xmlns:a="http://schemas.openxmlformats.org/drawingml/2006/main" xmlns:r="http://schemas.openxmlformats.org/officeDocument/2006/relationships" xmlns:p="http://schemas.openxmlformats.org/presentationml/2006/main" type="objTx" preserve="1">
-  <p:cSld name="Content with Caption">
-    <p:spTree>
-      <p:nvGrpSpPr>
-        <p:cNvPr id="1" name=""/>
-        <p:cNvGrpSpPr/>
-        <p:nvPr/>
-      </p:nvGrpSpPr>
-      <p:grpSpPr>
-        <a:xfrm>
-          <a:off x="0" y="0"/>
-          <a:ext cx="0" cy="0"/>
-          <a:chOff x="0" y="0"/>
-          <a:chExt cx="0" cy="0"/>
-        </a:xfrm>
-      </p:grpSpPr>
-      <p:sp>
-        <p:nvSpPr>
-          <p:cNvPr id="2" name="Title 1"/>
-          <p:cNvSpPr>
-            <a:spLocks noGrp="1"/>
-          </p:cNvSpPr>
-          <p:nvPr>
-            <p:ph type="title"/>
-          </p:nvPr>
-        </p:nvSpPr>
-        <p:spPr>
-          <a:xfrm>
-            <a:off x="457200" y="273050"/>
-            <a:ext cx="3008313" cy="1162050"/>
-          </a:xfrm>
-        </p:spPr>
-        <p:txBody>
-          <a:bodyPr anchor="b"/>
-          <a:lstStyle>
-            <a:lvl1pPr algn="l">
-              <a:defRPr sz="2000" b="1"/>
-            </a:lvl1pPr>
-          </a:lstStyle>
-          <a:p>
-            <a:r>
-              <a:rPr lang="en-US" smtClean="0"/>
-              <a:t>Click to edit Master title style</a:t>
-            </a:r>
-            <a:endParaRPr lang="en-US"/>
-          </a:p>
-        </p:txBody>
-      </p:sp>
-      <p:sp>
-        <p:nvSpPr>
-          <p:cNvPr id="3" name="Content Placeholder 2"/>
-          <p:cNvSpPr>
-            <a:spLocks noGrp="1"/>
-          </p:cNvSpPr>
-          <p:nvPr>
-            <p:ph idx="1"/>
-          </p:nvPr>
-        </p:nvSpPr>
-        <p:spPr>
-          <a:xfrm>
-            <a:off x="3575050" y="273050"/>
-            <a:ext cx="5111750" cy="5853113"/>
-          </a:xfrm>
-        </p:spPr>
-        <p:txBody>
-          <a:bodyPr/>
-          <a:lstStyle>
-            <a:lvl1pPr>
-              <a:defRPr sz="3200"/>
-            </a:lvl1pPr>
-            <a:lvl2pPr>
-              <a:defRPr sz="2800"/>
-            </a:lvl2pPr>
-            <a:lvl3pPr>
-              <a:defRPr sz="2400"/>
-            </a:lvl3pPr>
-            <a:lvl4pPr>
-              <a:defRPr sz="2000"/>
-            </a:lvl4pPr>
-            <a:lvl5pPr>
-              <a:defRPr sz="2000"/>
-            </a:lvl5pPr>
-            <a:lvl6pPr>
-              <a:defRPr sz="2000"/>
-            </a:lvl6pPr>
-            <a:lvl7pPr>
-              <a:defRPr sz="2000"/>
-            </a:lvl7pPr>
-            <a:lvl8pPr>
-              <a:defRPr sz="2000"/>
-            </a:lvl8pPr>
-            <a:lvl9pPr>
-              <a:defRPr sz="2000"/>
-            </a:lvl9pPr>
-          </a:lstStyle>
-          <a:p>
-            <a:pPr lvl="0"/>
-            <a:r>
-              <a:rPr lang="en-US" smtClean="0"/>
-              <a:t>Click to edit Master text styles</a:t>
-            </a:r>
-          </a:p>
-          <a:p>
-            <a:pPr lvl="1"/>
-            <a:r>
-              <a:rPr lang="en-US" smtClean="0"/>
-              <a:t>Second level</a:t>
-            </a:r>
-          </a:p>
-          <a:p>
-            <a:pPr lvl="2"/>
-            <a:r>
-              <a:rPr lang="en-US" smtClean="0"/>
-              <a:t>Third level</a:t>
-            </a:r>
-          </a:p>
-          <a:p>
-            <a:pPr lvl="3"/>
-            <a:r>
-              <a:rPr lang="en-US" smtClean="0"/>
-              <a:t>Fourth level</a:t>
-            </a:r>
-          </a:p>
-          <a:p>
-            <a:pPr lvl="4"/>
-            <a:r>
-              <a:rPr lang="en-US" smtClean="0"/>
-              <a:t>Fifth level</a:t>
-            </a:r>
-            <a:endParaRPr lang="en-US"/>
-          </a:p>
-        </p:txBody>
-      </p:sp>
-      <p:sp>
-        <p:nvSpPr>
-          <p:cNvPr id="4" name="Text Placeholder 3"/>
-          <p:cNvSpPr>
-            <a:spLocks noGrp="1"/>
-          </p:cNvSpPr>
-          <p:nvPr>
-            <p:ph type="body" sz="half" idx="2"/>
-          </p:nvPr>
-        </p:nvSpPr>
-        <p:spPr>
-          <a:xfrm>
-            <a:off x="457200" y="1435100"/>
-            <a:ext cx="3008313" cy="4691063"/>
-          </a:xfrm>
-        </p:spPr>
-        <p:txBody>
-          <a:bodyPr/>
-          <a:lstStyle>
-            <a:lvl1pPr marL="0" indent="0">
-              <a:buNone/>
-              <a:defRPr sz="1400"/>
-            </a:lvl1pPr>
-            <a:lvl2pPr marL="457200" indent="0">
-              <a:buNone/>
-              <a:defRPr sz="1200"/>
-            </a:lvl2pPr>
-            <a:lvl3pPr marL="914400" indent="0">
-              <a:buNone/>
-              <a:defRPr sz="1000"/>
-            </a:lvl3pPr>
-            <a:lvl4pPr marL="1371600" indent="0">
-              <a:buNone/>
-              <a:defRPr sz="900"/>
-            </a:lvl4pPr>
-            <a:lvl5pPr marL="1828800" indent="0">
-              <a:buNone/>
-              <a:defRPr sz="900"/>
-            </a:lvl5pPr>
-            <a:lvl6pPr marL="2286000" indent="0">
-              <a:buNone/>
-              <a:defRPr sz="900"/>
-            </a:lvl6pPr>
-            <a:lvl7pPr marL="2743200" indent="0">
-              <a:buNone/>
-              <a:defRPr sz="900"/>
-            </a:lvl7pPr>
-            <a:lvl8pPr marL="3200400" indent="0">
-              <a:buNone/>
-              <a:defRPr sz="900"/>
-            </a:lvl8pPr>
-            <a:lvl9pPr marL="3657600" indent="0">
-              <a:buNone/>
-              <a:defRPr sz="900"/>
-            </a:lvl9pPr>
-          </a:lstStyle>
-          <a:p>
-            <a:pPr lvl="0"/>
-            <a:r>
-              <a:rPr lang="en-US" smtClean="0"/>
-              <a:t>Click to edit Master text styles</a:t>
-            </a:r>
-          </a:p>
-        </p:txBody>
-      </p:sp>
-      <p:sp>
-        <p:nvSpPr>
-          <p:cNvPr id="5" name="Rectangle 4"/>
-          <p:cNvSpPr>
-            <a:spLocks noGrp="1" noChangeArrowheads="1"/>
-          </p:cNvSpPr>
-          <p:nvPr>
-            <p:ph type="sldNum" sz="quarter" idx="10"/>
-          </p:nvPr>
-        </p:nvSpPr>
-        <p:spPr>
-          <a:ln/>
-        </p:spPr>
-        <p:txBody>
-          <a:bodyPr/>
-          <a:lstStyle>
-            <a:lvl1pPr>
-              <a:defRPr/>
-            </a:lvl1pPr>
-          </a:lstStyle>
-          <a:p>
-            <a:pPr>
-              <a:defRPr/>
-            </a:pPr>
-            <a:r>
-              <a:rPr lang="en-US" dirty="0" smtClean="0"/>
-              <a:t>propositional ops.</a:t>
-            </a:r>
-            <a:fld id="{E48FC9C2-C352-42EF-B49B-D1C36F9D04B7}" type="slidenum">
-              <a:rPr lang="en-US" smtClean="0"/>
-              <a:pPr>
-                <a:defRPr/>
-              </a:pPr>
-              <a:t>‹#›</a:t>
-            </a:fld>
-            <a:endParaRPr lang="en-US" dirty="0"/>
-          </a:p>
-        </p:txBody>
-      </p:sp>
-    </p:spTree>
-  </p:cSld>
-  <p:clrMapOvr>
-    <a:masterClrMapping/>
-  </p:clrMapOvr>
-  <p:transition xmlns:p14="http://schemas.microsoft.com/office/powerpoint/2010/main">
-    <p:fade/>
-  </p:transition>
-</p:sldLayout>
-</file>
-
-<file path=ppt/slideLayouts/slideLayout17.xml><?xml version="1.0" encoding="utf-8"?>
-<p:sldLayout xmlns:a="http://schemas.openxmlformats.org/drawingml/2006/main" xmlns:r="http://schemas.openxmlformats.org/officeDocument/2006/relationships" xmlns:p="http://schemas.openxmlformats.org/presentationml/2006/main" type="picTx" preserve="1">
-  <p:cSld name="Picture with Caption">
-    <p:spTree>
-      <p:nvGrpSpPr>
-        <p:cNvPr id="1" name=""/>
-        <p:cNvGrpSpPr/>
-        <p:nvPr/>
-      </p:nvGrpSpPr>
-      <p:grpSpPr>
-        <a:xfrm>
-          <a:off x="0" y="0"/>
-          <a:ext cx="0" cy="0"/>
-          <a:chOff x="0" y="0"/>
-          <a:chExt cx="0" cy="0"/>
-        </a:xfrm>
-      </p:grpSpPr>
-      <p:sp>
-        <p:nvSpPr>
-          <p:cNvPr id="2" name="Title 1"/>
-          <p:cNvSpPr>
-            <a:spLocks noGrp="1"/>
-          </p:cNvSpPr>
-          <p:nvPr>
-            <p:ph type="title"/>
-          </p:nvPr>
-        </p:nvSpPr>
-        <p:spPr>
-          <a:xfrm>
-            <a:off x="1792288" y="4800600"/>
-            <a:ext cx="5486400" cy="566738"/>
-          </a:xfrm>
-        </p:spPr>
-        <p:txBody>
-          <a:bodyPr anchor="b"/>
-          <a:lstStyle>
-            <a:lvl1pPr algn="l">
-              <a:defRPr sz="2000" b="1"/>
-            </a:lvl1pPr>
-          </a:lstStyle>
-          <a:p>
-            <a:r>
-              <a:rPr lang="en-US" smtClean="0"/>
-              <a:t>Click to edit Master title style</a:t>
-            </a:r>
-            <a:endParaRPr lang="en-US"/>
-          </a:p>
-        </p:txBody>
-      </p:sp>
-      <p:sp>
-        <p:nvSpPr>
-          <p:cNvPr id="3" name="Picture Placeholder 2"/>
-          <p:cNvSpPr>
-            <a:spLocks noGrp="1"/>
-          </p:cNvSpPr>
-          <p:nvPr>
-            <p:ph type="pic" idx="1"/>
-          </p:nvPr>
-        </p:nvSpPr>
-        <p:spPr>
-          <a:xfrm>
-            <a:off x="1792288" y="612775"/>
-            <a:ext cx="5486400" cy="4114800"/>
-          </a:xfrm>
-        </p:spPr>
-        <p:txBody>
-          <a:bodyPr/>
-          <a:lstStyle>
-            <a:lvl1pPr marL="0" indent="0">
-              <a:buNone/>
-              <a:defRPr sz="3200"/>
-            </a:lvl1pPr>
-            <a:lvl2pPr marL="457200" indent="0">
-              <a:buNone/>
-              <a:defRPr sz="2800"/>
-            </a:lvl2pPr>
-            <a:lvl3pPr marL="914400" indent="0">
-              <a:buNone/>
-              <a:defRPr sz="2400"/>
-            </a:lvl3pPr>
-            <a:lvl4pPr marL="1371600" indent="0">
-              <a:buNone/>
-              <a:defRPr sz="2000"/>
-            </a:lvl4pPr>
-            <a:lvl5pPr marL="1828800" indent="0">
-              <a:buNone/>
-              <a:defRPr sz="2000"/>
-            </a:lvl5pPr>
-            <a:lvl6pPr marL="2286000" indent="0">
-              <a:buNone/>
-              <a:defRPr sz="2000"/>
-            </a:lvl6pPr>
-            <a:lvl7pPr marL="2743200" indent="0">
-              <a:buNone/>
-              <a:defRPr sz="2000"/>
-            </a:lvl7pPr>
-            <a:lvl8pPr marL="3200400" indent="0">
-              <a:buNone/>
-              <a:defRPr sz="2000"/>
-            </a:lvl8pPr>
-            <a:lvl9pPr marL="3657600" indent="0">
-              <a:buNone/>
-              <a:defRPr sz="2000"/>
-            </a:lvl9pPr>
-          </a:lstStyle>
-          <a:p>
-            <a:pPr lvl="0"/>
-            <a:endParaRPr lang="en-US" noProof="0" smtClean="0"/>
-          </a:p>
-        </p:txBody>
-      </p:sp>
-      <p:sp>
-        <p:nvSpPr>
-          <p:cNvPr id="4" name="Text Placeholder 3"/>
-          <p:cNvSpPr>
-            <a:spLocks noGrp="1"/>
-          </p:cNvSpPr>
-          <p:nvPr>
-            <p:ph type="body" sz="half" idx="2"/>
-          </p:nvPr>
-        </p:nvSpPr>
-        <p:spPr>
-          <a:xfrm>
-            <a:off x="1792288" y="5367338"/>
-            <a:ext cx="5486400" cy="804862"/>
-          </a:xfrm>
-        </p:spPr>
-        <p:txBody>
-          <a:bodyPr/>
-          <a:lstStyle>
-            <a:lvl1pPr marL="0" indent="0">
-              <a:buNone/>
-              <a:defRPr sz="1400"/>
-            </a:lvl1pPr>
-            <a:lvl2pPr marL="457200" indent="0">
-              <a:buNone/>
-              <a:defRPr sz="1200"/>
-            </a:lvl2pPr>
-            <a:lvl3pPr marL="914400" indent="0">
-              <a:buNone/>
-              <a:defRPr sz="1000"/>
-            </a:lvl3pPr>
-            <a:lvl4pPr marL="1371600" indent="0">
-              <a:buNone/>
-              <a:defRPr sz="900"/>
-            </a:lvl4pPr>
-            <a:lvl5pPr marL="1828800" indent="0">
-              <a:buNone/>
-              <a:defRPr sz="900"/>
-            </a:lvl5pPr>
-            <a:lvl6pPr marL="2286000" indent="0">
-              <a:buNone/>
-              <a:defRPr sz="900"/>
-            </a:lvl6pPr>
-            <a:lvl7pPr marL="2743200" indent="0">
-              <a:buNone/>
-              <a:defRPr sz="900"/>
-            </a:lvl7pPr>
-            <a:lvl8pPr marL="3200400" indent="0">
-              <a:buNone/>
-              <a:defRPr sz="900"/>
-            </a:lvl8pPr>
-            <a:lvl9pPr marL="3657600" indent="0">
-              <a:buNone/>
-              <a:defRPr sz="900"/>
-            </a:lvl9pPr>
-          </a:lstStyle>
-          <a:p>
-            <a:pPr lvl="0"/>
-            <a:r>
-              <a:rPr lang="en-US" smtClean="0"/>
-              <a:t>Click to edit Master text styles</a:t>
-            </a:r>
-          </a:p>
-        </p:txBody>
-      </p:sp>
-      <p:sp>
-        <p:nvSpPr>
-          <p:cNvPr id="5" name="Rectangle 4"/>
-          <p:cNvSpPr>
-            <a:spLocks noGrp="1" noChangeArrowheads="1"/>
-          </p:cNvSpPr>
-          <p:nvPr>
-            <p:ph type="sldNum" sz="quarter" idx="10"/>
-          </p:nvPr>
-        </p:nvSpPr>
-        <p:spPr>
-          <a:ln/>
-        </p:spPr>
-        <p:txBody>
-          <a:bodyPr/>
-          <a:lstStyle>
-            <a:lvl1pPr>
-              <a:defRPr/>
-            </a:lvl1pPr>
-          </a:lstStyle>
-          <a:p>
-            <a:pPr>
-              <a:defRPr/>
-            </a:pPr>
-            <a:r>
-              <a:rPr lang="en-US" dirty="0" smtClean="0"/>
-              <a:t>propositional ops.</a:t>
-            </a:r>
-            <a:fld id="{26BBB068-6957-4CCF-BE52-E72E2DD2B17D}" type="slidenum">
-              <a:rPr lang="en-US" smtClean="0"/>
-              <a:pPr>
-                <a:defRPr/>
-              </a:pPr>
-              <a:t>‹#›</a:t>
-            </a:fld>
-            <a:endParaRPr lang="en-US" dirty="0"/>
-          </a:p>
-        </p:txBody>
-      </p:sp>
-    </p:spTree>
-  </p:cSld>
-  <p:clrMapOvr>
-    <a:masterClrMapping/>
-  </p:clrMapOvr>
-  <p:transition xmlns:p14="http://schemas.microsoft.com/office/powerpoint/2010/main">
-    <p:fade/>
-  </p:transition>
-</p:sldLayout>
-</file>
-
-<file path=ppt/slideLayouts/slideLayout18.xml><?xml version="1.0" encoding="utf-8"?>
-<p:sldLayout xmlns:a="http://schemas.openxmlformats.org/drawingml/2006/main" xmlns:r="http://schemas.openxmlformats.org/officeDocument/2006/relationships" xmlns:p="http://schemas.openxmlformats.org/presentationml/2006/main" type="vertTx" preserve="1">
-  <p:cSld name="Title and Vertical Text">
-    <p:spTree>
-      <p:nvGrpSpPr>
-        <p:cNvPr id="1" name=""/>
-        <p:cNvGrpSpPr/>
-        <p:nvPr/>
-      </p:nvGrpSpPr>
-      <p:grpSpPr>
-        <a:xfrm>
-          <a:off x="0" y="0"/>
-          <a:ext cx="0" cy="0"/>
-          <a:chOff x="0" y="0"/>
-          <a:chExt cx="0" cy="0"/>
-        </a:xfrm>
-      </p:grpSpPr>
-      <p:sp>
-        <p:nvSpPr>
-          <p:cNvPr id="2" name="Title 1"/>
-          <p:cNvSpPr>
-            <a:spLocks noGrp="1"/>
-          </p:cNvSpPr>
-          <p:nvPr>
-            <p:ph type="title"/>
-          </p:nvPr>
-        </p:nvSpPr>
-        <p:spPr/>
-        <p:txBody>
-          <a:bodyPr/>
-          <a:lstStyle/>
-          <a:p>
-            <a:r>
-              <a:rPr lang="en-US" smtClean="0"/>
-              <a:t>Click to edit Master title style</a:t>
-            </a:r>
-            <a:endParaRPr lang="en-US"/>
-          </a:p>
-        </p:txBody>
-      </p:sp>
-      <p:sp>
-        <p:nvSpPr>
-          <p:cNvPr id="3" name="Vertical Text Placeholder 2"/>
-          <p:cNvSpPr>
-            <a:spLocks noGrp="1"/>
-          </p:cNvSpPr>
-          <p:nvPr>
-            <p:ph type="body" orient="vert" idx="1"/>
-          </p:nvPr>
-        </p:nvSpPr>
-        <p:spPr/>
-        <p:txBody>
-          <a:bodyPr vert="eaVert"/>
-          <a:lstStyle/>
-          <a:p>
-            <a:pPr lvl="0"/>
-            <a:r>
-              <a:rPr lang="en-US" smtClean="0"/>
-              <a:t>Click to edit Master text styles</a:t>
-            </a:r>
-          </a:p>
-          <a:p>
-            <a:pPr lvl="1"/>
-            <a:r>
-              <a:rPr lang="en-US" smtClean="0"/>
-              <a:t>Second level</a:t>
-            </a:r>
-          </a:p>
-          <a:p>
-            <a:pPr lvl="2"/>
-            <a:r>
-              <a:rPr lang="en-US" smtClean="0"/>
-              <a:t>Third level</a:t>
-            </a:r>
-          </a:p>
-          <a:p>
-            <a:pPr lvl="3"/>
-            <a:r>
-              <a:rPr lang="en-US" smtClean="0"/>
-              <a:t>Fourth level</a:t>
-            </a:r>
-          </a:p>
-          <a:p>
-            <a:pPr lvl="4"/>
-            <a:r>
-              <a:rPr lang="en-US" smtClean="0"/>
-              <a:t>Fifth level</a:t>
-            </a:r>
-            <a:endParaRPr lang="en-US"/>
-          </a:p>
-        </p:txBody>
-      </p:sp>
-      <p:sp>
-        <p:nvSpPr>
-          <p:cNvPr id="4" name="Rectangle 4"/>
-          <p:cNvSpPr>
-            <a:spLocks noGrp="1" noChangeArrowheads="1"/>
-          </p:cNvSpPr>
-          <p:nvPr>
-            <p:ph type="sldNum" sz="quarter" idx="10"/>
-          </p:nvPr>
-        </p:nvSpPr>
-        <p:spPr>
-          <a:ln/>
-        </p:spPr>
-        <p:txBody>
-          <a:bodyPr/>
-          <a:lstStyle>
-            <a:lvl1pPr>
-              <a:defRPr/>
-            </a:lvl1pPr>
-          </a:lstStyle>
-          <a:p>
-            <a:pPr>
-              <a:defRPr/>
-            </a:pPr>
-            <a:r>
-              <a:rPr lang="en-US" dirty="0" smtClean="0"/>
-              <a:t>propositional ops.</a:t>
-            </a:r>
-            <a:fld id="{B34E39A3-01D6-4C1E-BA2A-C68DA5665D61}" type="slidenum">
-              <a:rPr lang="en-US" smtClean="0"/>
-              <a:pPr>
-                <a:defRPr/>
-              </a:pPr>
-              <a:t>‹#›</a:t>
-            </a:fld>
-            <a:endParaRPr lang="en-US" dirty="0"/>
-          </a:p>
-        </p:txBody>
-      </p:sp>
-    </p:spTree>
-  </p:cSld>
-  <p:clrMapOvr>
-    <a:masterClrMapping/>
-  </p:clrMapOvr>
-  <p:transition xmlns:p14="http://schemas.microsoft.com/office/powerpoint/2010/main">
-    <p:fade/>
-  </p:transition>
-</p:sldLayout>
-</file>
-
-<file path=ppt/slideLayouts/slideLayout19.xml><?xml version="1.0" encoding="utf-8"?>
-<p:sldLayout xmlns:a="http://schemas.openxmlformats.org/drawingml/2006/main" xmlns:r="http://schemas.openxmlformats.org/officeDocument/2006/relationships" xmlns:p="http://schemas.openxmlformats.org/presentationml/2006/main" type="vertTitleAndTx" preserve="1">
-  <p:cSld name="Vertical Title and Text">
-    <p:spTree>
-      <p:nvGrpSpPr>
-        <p:cNvPr id="1" name=""/>
-        <p:cNvGrpSpPr/>
-        <p:nvPr/>
-      </p:nvGrpSpPr>
-      <p:grpSpPr>
-        <a:xfrm>
-          <a:off x="0" y="0"/>
-          <a:ext cx="0" cy="0"/>
-          <a:chOff x="0" y="0"/>
-          <a:chExt cx="0" cy="0"/>
-        </a:xfrm>
-      </p:grpSpPr>
-      <p:sp>
-        <p:nvSpPr>
-          <p:cNvPr id="2" name="Vertical Title 1"/>
-          <p:cNvSpPr>
-            <a:spLocks noGrp="1"/>
-          </p:cNvSpPr>
-          <p:nvPr>
-            <p:ph type="title" orient="vert"/>
-          </p:nvPr>
-        </p:nvSpPr>
-        <p:spPr>
-          <a:xfrm>
-            <a:off x="6915150" y="304800"/>
-            <a:ext cx="2076450" cy="5867400"/>
-          </a:xfrm>
-        </p:spPr>
-        <p:txBody>
-          <a:bodyPr vert="eaVert"/>
-          <a:lstStyle/>
-          <a:p>
-            <a:r>
-              <a:rPr lang="en-US" smtClean="0"/>
-              <a:t>Click to edit Master title style</a:t>
-            </a:r>
-            <a:endParaRPr lang="en-US"/>
-          </a:p>
-        </p:txBody>
-      </p:sp>
-      <p:sp>
-        <p:nvSpPr>
-          <p:cNvPr id="3" name="Vertical Text Placeholder 2"/>
-          <p:cNvSpPr>
-            <a:spLocks noGrp="1"/>
-          </p:cNvSpPr>
-          <p:nvPr>
-            <p:ph type="body" orient="vert" idx="1"/>
-          </p:nvPr>
-        </p:nvSpPr>
-        <p:spPr>
-          <a:xfrm>
-            <a:off x="685800" y="304800"/>
-            <a:ext cx="6076950" cy="5867400"/>
-          </a:xfrm>
-        </p:spPr>
-        <p:txBody>
-          <a:bodyPr vert="eaVert"/>
-          <a:lstStyle/>
-          <a:p>
-            <a:pPr lvl="0"/>
-            <a:r>
-              <a:rPr lang="en-US" dirty="0" smtClean="0"/>
-              <a:t>Click to edit Master text styles</a:t>
-            </a:r>
-          </a:p>
-          <a:p>
-            <a:pPr lvl="1"/>
-            <a:r>
-              <a:rPr lang="en-US" dirty="0" smtClean="0"/>
-              <a:t>Second level</a:t>
-            </a:r>
-          </a:p>
-          <a:p>
-            <a:pPr lvl="2"/>
-            <a:r>
-              <a:rPr lang="en-US" dirty="0" smtClean="0"/>
-              <a:t>Third level</a:t>
-            </a:r>
-          </a:p>
-          <a:p>
-            <a:pPr lvl="3"/>
-            <a:r>
-              <a:rPr lang="en-US" dirty="0" smtClean="0"/>
-              <a:t>Fourth level</a:t>
-            </a:r>
-          </a:p>
-          <a:p>
-            <a:pPr lvl="4"/>
-            <a:r>
-              <a:rPr lang="en-US" dirty="0" smtClean="0"/>
-              <a:t>Fifth level</a:t>
-            </a:r>
-            <a:endParaRPr lang="en-US" dirty="0"/>
-          </a:p>
-        </p:txBody>
-      </p:sp>
-      <p:sp>
-        <p:nvSpPr>
-          <p:cNvPr id="4" name="Rectangle 4"/>
-          <p:cNvSpPr>
-            <a:spLocks noGrp="1" noChangeArrowheads="1"/>
-          </p:cNvSpPr>
-          <p:nvPr>
-            <p:ph type="sldNum" sz="quarter" idx="10"/>
-          </p:nvPr>
-        </p:nvSpPr>
-        <p:spPr>
-          <a:ln/>
-        </p:spPr>
-        <p:txBody>
-          <a:bodyPr/>
-          <a:lstStyle>
-            <a:lvl1pPr>
-              <a:defRPr/>
-            </a:lvl1pPr>
-          </a:lstStyle>
-          <a:p>
-            <a:pPr>
-              <a:defRPr/>
-            </a:pPr>
-            <a:r>
-              <a:rPr lang="en-US" dirty="0" smtClean="0"/>
-              <a:t>propositional ops.</a:t>
-            </a:r>
-            <a:fld id="{918B944E-E05E-401F-B34C-339DD98DC38E}" type="slidenum">
-              <a:rPr lang="en-US" smtClean="0"/>
-              <a:pPr>
-                <a:defRPr/>
-              </a:pPr>
-              <a:t>‹#›</a:t>
-            </a:fld>
-            <a:endParaRPr lang="en-US" dirty="0"/>
-          </a:p>
-        </p:txBody>
-      </p:sp>
-    </p:spTree>
-  </p:cSld>
-  <p:clrMapOvr>
-    <a:masterClrMapping/>
-  </p:clrMapOvr>
-  <p:transition xmlns:p14="http://schemas.microsoft.com/office/powerpoint/2010/main">
-    <p:fade/>
-  </p:transition>
-</p:sldLayout>
-</file>
-
-<file path=ppt/slideLayouts/slideLayout2.xml><?xml version="1.0" encoding="utf-8"?>
-<p:sldLayout xmlns:a="http://schemas.openxmlformats.org/drawingml/2006/main" xmlns:r="http://schemas.openxmlformats.org/officeDocument/2006/relationships" xmlns:p="http://schemas.openxmlformats.org/presentationml/2006/main" type="obj" preserve="1">
-  <p:cSld name="Title and Content">
-    <p:spTree>
-      <p:nvGrpSpPr>
-        <p:cNvPr id="1" name=""/>
-        <p:cNvGrpSpPr/>
-        <p:nvPr/>
-      </p:nvGrpSpPr>
-      <p:grpSpPr>
-        <a:xfrm>
-          <a:off x="0" y="0"/>
-          <a:ext cx="0" cy="0"/>
-          <a:chOff x="0" y="0"/>
-          <a:chExt cx="0" cy="0"/>
-        </a:xfrm>
-      </p:grpSpPr>
-      <p:sp>
-        <p:nvSpPr>
-          <p:cNvPr id="2" name="Title 1"/>
-          <p:cNvSpPr>
-            <a:spLocks noGrp="1"/>
-          </p:cNvSpPr>
-          <p:nvPr>
-            <p:ph type="title"/>
-          </p:nvPr>
-        </p:nvSpPr>
-        <p:spPr/>
-        <p:txBody>
-          <a:bodyPr/>
-          <a:lstStyle/>
-          <a:p>
-            <a:r>
-              <a:rPr lang="en-US" smtClean="0"/>
-              <a:t>Click to edit Master title style</a:t>
-            </a:r>
-            <a:endParaRPr lang="en-US"/>
-          </a:p>
-        </p:txBody>
-      </p:sp>
-      <p:sp>
-        <p:nvSpPr>
-          <p:cNvPr id="3" name="Content Placeholder 2"/>
-          <p:cNvSpPr>
-            <a:spLocks noGrp="1"/>
-          </p:cNvSpPr>
-          <p:nvPr>
-            <p:ph idx="1"/>
-          </p:nvPr>
-        </p:nvSpPr>
-        <p:spPr/>
-        <p:txBody>
-          <a:bodyPr/>
-          <a:lstStyle/>
-          <a:p>
-            <a:pPr lvl="0"/>
-            <a:r>
-              <a:rPr lang="en-US" smtClean="0"/>
-              <a:t>Click to edit Master text styles</a:t>
-            </a:r>
-          </a:p>
-          <a:p>
-            <a:pPr lvl="1"/>
-            <a:r>
-              <a:rPr lang="en-US" smtClean="0"/>
-              <a:t>Second level</a:t>
-            </a:r>
-          </a:p>
-          <a:p>
-            <a:pPr lvl="2"/>
-            <a:r>
-              <a:rPr lang="en-US" smtClean="0"/>
-              <a:t>Third level</a:t>
-            </a:r>
-          </a:p>
-          <a:p>
-            <a:pPr lvl="3"/>
-            <a:r>
-              <a:rPr lang="en-US" smtClean="0"/>
-              <a:t>Fourth level</a:t>
-            </a:r>
-          </a:p>
-          <a:p>
-            <a:pPr lvl="4"/>
-            <a:r>
-              <a:rPr lang="en-US" smtClean="0"/>
-              <a:t>Fifth level</a:t>
-            </a:r>
-            <a:endParaRPr lang="en-US"/>
-          </a:p>
-        </p:txBody>
-      </p:sp>
-      <p:sp>
-        <p:nvSpPr>
-          <p:cNvPr id="4" name="Rectangle 11"/>
-          <p:cNvSpPr>
-            <a:spLocks noGrp="1" noChangeArrowheads="1"/>
-          </p:cNvSpPr>
-          <p:nvPr>
-            <p:ph type="sldNum" sz="quarter" idx="10"/>
-          </p:nvPr>
-        </p:nvSpPr>
-        <p:spPr>
-          <a:xfrm>
-            <a:off x="7435108" y="6553200"/>
-            <a:ext cx="1708896" cy="276999"/>
-          </a:xfrm>
-          <a:ln/>
-        </p:spPr>
-        <p:txBody>
-          <a:bodyPr/>
-          <a:lstStyle>
-            <a:lvl1pPr>
-              <a:defRPr/>
-            </a:lvl1pPr>
-          </a:lstStyle>
-          <a:p>
-            <a:pPr>
-              <a:defRPr/>
-            </a:pPr>
-            <a:r>
-              <a:rPr lang="en-US" dirty="0" smtClean="0"/>
-              <a:t>propositional ops..</a:t>
-            </a:r>
-            <a:fld id="{A528ADE2-B74F-4D9D-8D04-FB5D781EAB51}" type="slidenum">
-              <a:rPr lang="en-US" smtClean="0"/>
-              <a:pPr>
-                <a:defRPr/>
-              </a:pPr>
-              <a:t>‹#›</a:t>
-            </a:fld>
-            <a:endParaRPr lang="en-US" dirty="0"/>
-          </a:p>
-        </p:txBody>
-      </p:sp>
-    </p:spTree>
-  </p:cSld>
-  <p:clrMapOvr>
-    <a:masterClrMapping/>
-  </p:clrMapOvr>
-  <p:transition xmlns:p14="http://schemas.microsoft.com/office/powerpoint/2010/main">
-    <p:fade/>
-  </p:transition>
-  <p:timing>
-    <p:tnLst>
-      <p:par>
-        <p:cTn xmlns:p14="http://schemas.microsoft.com/office/powerpoint/2010/main" id="1" dur="indefinite" restart="never" nodeType="tmRoot"/>
-      </p:par>
-    </p:tnLst>
-  </p:timing>
-</p:sldLayout>
-</file>
-
-<file path=ppt/slideLayouts/slideLayout20.xml><?xml version="1.0" encoding="utf-8"?>
 <p:sldLayout xmlns:a="http://schemas.openxmlformats.org/drawingml/2006/main" xmlns:r="http://schemas.openxmlformats.org/officeDocument/2006/relationships" xmlns:p="http://schemas.openxmlformats.org/presentationml/2006/main" type="title" preserve="1">
   <p:cSld name="Title Slide">
     <p:spTree>
@@ -3602,8 +1576,8 @@
         </p:nvSpPr>
         <p:spPr>
           <a:xfrm>
-            <a:off x="7435108" y="6553200"/>
-            <a:ext cx="1708896" cy="276999"/>
+            <a:off x="8222207" y="6553200"/>
+            <a:ext cx="921797" cy="276999"/>
           </a:xfrm>
           <a:ln/>
         </p:spPr>
@@ -3619,12 +1593,16 @@
               <a:defRPr/>
             </a:pPr>
             <a:r>
+              <a:rPr lang="en-US" dirty="0" smtClean="0"/>
+              <a:t>digital</a:t>
+            </a:r>
+            <a:r>
               <a:rPr lang="en-US" dirty="0" smtClean="0">
                 <a:solidFill>
                   <a:srgbClr val="000000"/>
                 </a:solidFill>
               </a:rPr>
-              <a:t>propositional ops..</a:t>
+              <a:t>.</a:t>
             </a:r>
             <a:fld id="{C3C9801B-391E-452B-A4C3-BC5EC51A0BC7}" type="slidenum">
               <a:rPr lang="en-US" smtClean="0">
@@ -3668,7 +1646,7 @@
 </p:sldLayout>
 </file>
 
-<file path=ppt/slideLayouts/slideLayout21.xml><?xml version="1.0" encoding="utf-8"?>
+<file path=ppt/slideLayouts/slideLayout11.xml><?xml version="1.0" encoding="utf-8"?>
 <p:sldLayout xmlns:a="http://schemas.openxmlformats.org/drawingml/2006/main" xmlns:r="http://schemas.openxmlformats.org/officeDocument/2006/relationships" xmlns:p="http://schemas.openxmlformats.org/presentationml/2006/main" type="obj" preserve="1">
   <p:cSld name="Title and Content">
     <p:spTree>
@@ -3772,8 +1750,8 @@
         </p:nvSpPr>
         <p:spPr>
           <a:xfrm>
-            <a:off x="7435108" y="6553200"/>
-            <a:ext cx="1708896" cy="276999"/>
+            <a:off x="8183885" y="6553200"/>
+            <a:ext cx="960119" cy="276999"/>
           </a:xfrm>
           <a:ln/>
         </p:spPr>
@@ -3794,7 +1772,7 @@
                   <a:srgbClr val="000000"/>
                 </a:solidFill>
               </a:rPr>
-              <a:t>propositional ops..</a:t>
+              <a:t>digital..</a:t>
             </a:r>
             <a:fld id="{A528ADE2-B74F-4D9D-8D04-FB5D781EAB51}" type="slidenum">
               <a:rPr lang="en-US" smtClean="0">
@@ -3838,7 +1816,7 @@
 </p:sldLayout>
 </file>
 
-<file path=ppt/slideLayouts/slideLayout22.xml><?xml version="1.0" encoding="utf-8"?>
+<file path=ppt/slideLayouts/slideLayout12.xml><?xml version="1.0" encoding="utf-8"?>
 <p:sldLayout xmlns:a="http://schemas.openxmlformats.org/drawingml/2006/main" xmlns:r="http://schemas.openxmlformats.org/officeDocument/2006/relationships" xmlns:p="http://schemas.openxmlformats.org/presentationml/2006/main" type="secHead" preserve="1">
   <p:cSld name="Section Header">
     <p:spTree>
@@ -3964,8 +1942,8 @@
         </p:nvSpPr>
         <p:spPr>
           <a:xfrm>
-            <a:off x="7435108" y="6553200"/>
-            <a:ext cx="1708896" cy="276999"/>
+            <a:off x="8183885" y="6553200"/>
+            <a:ext cx="960119" cy="276999"/>
           </a:xfrm>
           <a:ln/>
         </p:spPr>
@@ -3986,7 +1964,7 @@
                   <a:srgbClr val="000000"/>
                 </a:solidFill>
               </a:rPr>
-              <a:t>propositional ops..</a:t>
+              <a:t>digital..</a:t>
             </a:r>
             <a:fld id="{B3A503E6-B8FE-4B0A-9976-9CA65DFEA87E}" type="slidenum">
               <a:rPr lang="en-US" smtClean="0">
@@ -4030,7 +2008,7 @@
 </p:sldLayout>
 </file>
 
-<file path=ppt/slideLayouts/slideLayout23.xml><?xml version="1.0" encoding="utf-8"?>
+<file path=ppt/slideLayouts/slideLayout13.xml><?xml version="1.0" encoding="utf-8"?>
 <p:sldLayout xmlns:a="http://schemas.openxmlformats.org/drawingml/2006/main" xmlns:r="http://schemas.openxmlformats.org/officeDocument/2006/relationships" xmlns:p="http://schemas.openxmlformats.org/presentationml/2006/main" type="titleOnly" preserve="1">
   <p:cSld name="Title Only">
     <p:spTree>
@@ -4086,8 +2064,8 @@
         </p:nvSpPr>
         <p:spPr>
           <a:xfrm>
-            <a:off x="7473429" y="6553200"/>
-            <a:ext cx="1670575" cy="276999"/>
+            <a:off x="8222207" y="6553200"/>
+            <a:ext cx="921797" cy="276999"/>
           </a:xfrm>
           <a:ln/>
         </p:spPr>
@@ -4108,7 +2086,7 @@
                   <a:srgbClr val="000000"/>
                 </a:solidFill>
               </a:rPr>
-              <a:t>propositional ops.</a:t>
+              <a:t>digital.</a:t>
             </a:r>
             <a:fld id="{DB6F0ED6-FEF5-4C9C-B1CC-29B47EC66FAA}" type="slidenum">
               <a:rPr lang="en-US" smtClean="0">
@@ -4145,7 +2123,7 @@
 </p:sldLayout>
 </file>
 
-<file path=ppt/slideLayouts/slideLayout24.xml><?xml version="1.0" encoding="utf-8"?>
+<file path=ppt/slideLayouts/slideLayout14.xml><?xml version="1.0" encoding="utf-8"?>
 <p:sldLayout xmlns:a="http://schemas.openxmlformats.org/drawingml/2006/main" xmlns:r="http://schemas.openxmlformats.org/officeDocument/2006/relationships" xmlns:p="http://schemas.openxmlformats.org/presentationml/2006/main" type="blank" preserve="1">
   <p:cSld name="Blank">
     <p:spTree>
@@ -4174,8 +2152,8 @@
         </p:nvSpPr>
         <p:spPr>
           <a:xfrm>
-            <a:off x="7435108" y="6553200"/>
-            <a:ext cx="1708896" cy="276999"/>
+            <a:off x="8183885" y="6553200"/>
+            <a:ext cx="960119" cy="276999"/>
           </a:xfrm>
           <a:ln/>
         </p:spPr>
@@ -4196,7 +2174,7 @@
                   <a:srgbClr val="000000"/>
                 </a:solidFill>
               </a:rPr>
-              <a:t>propositional ops..</a:t>
+              <a:t>digital..</a:t>
             </a:r>
             <a:fld id="{7D4651B8-09C8-4A4D-BE8E-31B6C97A420D}" type="slidenum">
               <a:rPr lang="en-US" smtClean="0">
@@ -4240,7 +2218,7 @@
 </p:sldLayout>
 </file>
 
-<file path=ppt/slideLayouts/slideLayout25.xml><?xml version="1.0" encoding="utf-8"?>
+<file path=ppt/slideLayouts/slideLayout15.xml><?xml version="1.0" encoding="utf-8"?>
 <p:sldLayout xmlns:a="http://schemas.openxmlformats.org/drawingml/2006/main" xmlns:r="http://schemas.openxmlformats.org/officeDocument/2006/relationships" xmlns:p="http://schemas.openxmlformats.org/presentationml/2006/main" type="picTx" preserve="1">
   <p:cSld name="Picture with Caption">
     <p:spTree>
@@ -4428,8 +2406,8 @@
         </p:nvSpPr>
         <p:spPr>
           <a:xfrm>
-            <a:off x="7435108" y="6553200"/>
-            <a:ext cx="1708896" cy="276999"/>
+            <a:off x="8183885" y="6553200"/>
+            <a:ext cx="960119" cy="276999"/>
           </a:xfrm>
           <a:ln/>
         </p:spPr>
@@ -4450,7 +2428,7 @@
                   <a:srgbClr val="000000"/>
                 </a:solidFill>
               </a:rPr>
-              <a:t>propositional ops..</a:t>
+              <a:t>digital..</a:t>
             </a:r>
             <a:fld id="{85BC747C-4E6E-462A-A001-3C1CA56269DD}" type="slidenum">
               <a:rPr lang="en-US" smtClean="0">
@@ -4487,7 +2465,7 @@
 </p:sldLayout>
 </file>
 
-<file path=ppt/slideLayouts/slideLayout26.xml><?xml version="1.0" encoding="utf-8"?>
+<file path=ppt/slideLayouts/slideLayout16.xml><?xml version="1.0" encoding="utf-8"?>
 <p:sldLayout xmlns:a="http://schemas.openxmlformats.org/drawingml/2006/main" xmlns:r="http://schemas.openxmlformats.org/officeDocument/2006/relationships" xmlns:p="http://schemas.openxmlformats.org/presentationml/2006/main" type="txAndObj" preserve="1">
   <p:cSld name="Title, Text, and Content">
     <p:spTree>
@@ -4658,8 +2636,8 @@
         </p:nvSpPr>
         <p:spPr>
           <a:xfrm>
-            <a:off x="7435108" y="6553200"/>
-            <a:ext cx="1708896" cy="276999"/>
+            <a:off x="8183885" y="6553200"/>
+            <a:ext cx="960119" cy="276999"/>
           </a:xfrm>
           <a:ln/>
         </p:spPr>
@@ -4680,7 +2658,7 @@
                   <a:srgbClr val="000000"/>
                 </a:solidFill>
               </a:rPr>
-              <a:t>propositional ops..</a:t>
+              <a:t>digital..</a:t>
             </a:r>
             <a:fld id="{B7856ECB-7BA5-4EA4-A170-7A96316AE30B}" type="slidenum">
               <a:rPr lang="en-US" smtClean="0">
@@ -4717,7 +2695,7 @@
 </p:sldLayout>
 </file>
 
-<file path=ppt/slideLayouts/slideLayout27.xml><?xml version="1.0" encoding="utf-8"?>
+<file path=ppt/slideLayouts/slideLayout17.xml><?xml version="1.0" encoding="utf-8"?>
 <p:sldLayout xmlns:a="http://schemas.openxmlformats.org/drawingml/2006/main" xmlns:r="http://schemas.openxmlformats.org/officeDocument/2006/relationships" xmlns:p="http://schemas.openxmlformats.org/presentationml/2006/main" type="txAndTwoObj" preserve="1">
   <p:cSld name="Title, Text, and 2 Content">
     <p:spTree>
@@ -4976,7 +2954,7 @@
                   <a:srgbClr val="000000"/>
                 </a:solidFill>
               </a:rPr>
-              <a:t>propositional ops.</a:t>
+              <a:t>digital.</a:t>
             </a:r>
             <a:fld id="{883BA68D-4400-4AD9-848C-65748A4D0824}" type="slidenum">
               <a:rPr lang="en-US" smtClean="0">
@@ -5010,6 +2988,159 @@
   <p:transition xmlns:p14="http://schemas.microsoft.com/office/powerpoint/2010/main" spd="slow" advClick="0">
     <p:fade/>
   </p:transition>
+</p:sldLayout>
+</file>
+
+<file path=ppt/slideLayouts/slideLayout2.xml><?xml version="1.0" encoding="utf-8"?>
+<p:sldLayout xmlns:a="http://schemas.openxmlformats.org/drawingml/2006/main" xmlns:r="http://schemas.openxmlformats.org/officeDocument/2006/relationships" xmlns:p="http://schemas.openxmlformats.org/presentationml/2006/main" type="obj" preserve="1">
+  <p:cSld name="Title and Content">
+    <p:spTree>
+      <p:nvGrpSpPr>
+        <p:cNvPr id="1" name=""/>
+        <p:cNvGrpSpPr/>
+        <p:nvPr/>
+      </p:nvGrpSpPr>
+      <p:grpSpPr>
+        <a:xfrm>
+          <a:off x="0" y="0"/>
+          <a:ext cx="0" cy="0"/>
+          <a:chOff x="0" y="0"/>
+          <a:chExt cx="0" cy="0"/>
+        </a:xfrm>
+      </p:grpSpPr>
+      <p:sp>
+        <p:nvSpPr>
+          <p:cNvPr id="2" name="Title 1"/>
+          <p:cNvSpPr>
+            <a:spLocks noGrp="1"/>
+          </p:cNvSpPr>
+          <p:nvPr>
+            <p:ph type="title"/>
+          </p:nvPr>
+        </p:nvSpPr>
+        <p:spPr/>
+        <p:txBody>
+          <a:bodyPr/>
+          <a:lstStyle/>
+          <a:p>
+            <a:r>
+              <a:rPr lang="en-US" smtClean="0"/>
+              <a:t>Click to edit Master title style</a:t>
+            </a:r>
+            <a:endParaRPr lang="en-US"/>
+          </a:p>
+        </p:txBody>
+      </p:sp>
+      <p:sp>
+        <p:nvSpPr>
+          <p:cNvPr id="3" name="Content Placeholder 2"/>
+          <p:cNvSpPr>
+            <a:spLocks noGrp="1"/>
+          </p:cNvSpPr>
+          <p:nvPr>
+            <p:ph idx="1"/>
+          </p:nvPr>
+        </p:nvSpPr>
+        <p:spPr/>
+        <p:txBody>
+          <a:bodyPr/>
+          <a:lstStyle/>
+          <a:p>
+            <a:pPr lvl="0"/>
+            <a:r>
+              <a:rPr lang="en-US" smtClean="0"/>
+              <a:t>Click to edit Master text styles</a:t>
+            </a:r>
+          </a:p>
+          <a:p>
+            <a:pPr lvl="1"/>
+            <a:r>
+              <a:rPr lang="en-US" smtClean="0"/>
+              <a:t>Second level</a:t>
+            </a:r>
+          </a:p>
+          <a:p>
+            <a:pPr lvl="2"/>
+            <a:r>
+              <a:rPr lang="en-US" smtClean="0"/>
+              <a:t>Third level</a:t>
+            </a:r>
+          </a:p>
+          <a:p>
+            <a:pPr lvl="3"/>
+            <a:r>
+              <a:rPr lang="en-US" smtClean="0"/>
+              <a:t>Fourth level</a:t>
+            </a:r>
+          </a:p>
+          <a:p>
+            <a:pPr lvl="4"/>
+            <a:r>
+              <a:rPr lang="en-US" smtClean="0"/>
+              <a:t>Fifth level</a:t>
+            </a:r>
+            <a:endParaRPr lang="en-US"/>
+          </a:p>
+        </p:txBody>
+      </p:sp>
+      <p:sp>
+        <p:nvSpPr>
+          <p:cNvPr id="4" name="Rectangle 11"/>
+          <p:cNvSpPr>
+            <a:spLocks noGrp="1" noChangeArrowheads="1"/>
+          </p:cNvSpPr>
+          <p:nvPr>
+            <p:ph type="sldNum" sz="quarter" idx="10"/>
+          </p:nvPr>
+        </p:nvSpPr>
+        <p:spPr>
+          <a:xfrm>
+            <a:off x="8222207" y="6553200"/>
+            <a:ext cx="921797" cy="276999"/>
+          </a:xfrm>
+          <a:ln/>
+        </p:spPr>
+        <p:txBody>
+          <a:bodyPr/>
+          <a:lstStyle>
+            <a:lvl1pPr>
+              <a:defRPr/>
+            </a:lvl1pPr>
+          </a:lstStyle>
+          <a:p>
+            <a:pPr>
+              <a:defRPr/>
+            </a:pPr>
+            <a:r>
+              <a:rPr lang="en-US" dirty="0" smtClean="0"/>
+              <a:t>digital.</a:t>
+            </a:r>
+            <a:fld id="{A528ADE2-B74F-4D9D-8D04-FB5D781EAB51}" type="slidenum">
+              <a:rPr lang="en-US" smtClean="0"/>
+              <a:pPr>
+                <a:defRPr/>
+              </a:pPr>
+              <a:t>‹#›</a:t>
+            </a:fld>
+            <a:endParaRPr lang="en-US" dirty="0"/>
+          </a:p>
+        </p:txBody>
+      </p:sp>
+    </p:spTree>
+  </p:cSld>
+  <p:clrMapOvr>
+    <a:masterClrMapping/>
+  </p:clrMapOvr>
+  <p:transition xmlns:p14="http://schemas.microsoft.com/office/powerpoint/2010/main">
+    <p:fade/>
+  </p:transition>
+  <p:timing>
+    <p:tnLst>
+      <p:par>
+        <p:cTn xmlns:p14="http://schemas.microsoft.com/office/powerpoint/2010/main" id="1" dur="indefinite" restart="never" nodeType="tmRoot"/>
+      </p:par>
+    </p:tnLst>
+  </p:timing>
 </p:sldLayout>
 </file>
 
@@ -5139,8 +3270,8 @@
         </p:nvSpPr>
         <p:spPr>
           <a:xfrm>
-            <a:off x="7435108" y="6553200"/>
-            <a:ext cx="1708896" cy="276999"/>
+            <a:off x="8183885" y="6553200"/>
+            <a:ext cx="960119" cy="276999"/>
           </a:xfrm>
           <a:ln/>
         </p:spPr>
@@ -5157,7 +3288,7 @@
             </a:pPr>
             <a:r>
               <a:rPr lang="en-US" dirty="0" smtClean="0"/>
-              <a:t>propositional ops..</a:t>
+              <a:t>digital..</a:t>
             </a:r>
             <a:fld id="{B3A503E6-B8FE-4B0A-9976-9CA65DFEA87E}" type="slidenum">
               <a:rPr lang="en-US" smtClean="0"/>
@@ -5244,8 +3375,8 @@
         </p:nvSpPr>
         <p:spPr>
           <a:xfrm>
-            <a:off x="7435108" y="6553200"/>
-            <a:ext cx="1708896" cy="276999"/>
+            <a:off x="8183885" y="6553200"/>
+            <a:ext cx="960119" cy="276999"/>
           </a:xfrm>
           <a:ln/>
         </p:spPr>
@@ -5262,7 +3393,7 @@
             </a:pPr>
             <a:r>
               <a:rPr lang="en-US" dirty="0" smtClean="0"/>
-              <a:t>propositional ops..</a:t>
+              <a:t>digital..</a:t>
             </a:r>
             <a:fld id="{DB6F0ED6-FEF5-4C9C-B1CC-29B47EC66FAA}" type="slidenum">
               <a:rPr lang="en-US" smtClean="0"/>
@@ -5315,8 +3446,8 @@
         </p:nvSpPr>
         <p:spPr>
           <a:xfrm>
-            <a:off x="7435108" y="6553200"/>
-            <a:ext cx="1708896" cy="276999"/>
+            <a:off x="8183885" y="6553200"/>
+            <a:ext cx="960119" cy="276999"/>
           </a:xfrm>
           <a:ln/>
         </p:spPr>
@@ -5333,7 +3464,7 @@
             </a:pPr>
             <a:r>
               <a:rPr lang="en-US" dirty="0" smtClean="0"/>
-              <a:t>propositional ops..</a:t>
+              <a:t>digital..</a:t>
             </a:r>
             <a:fld id="{7D4651B8-09C8-4A4D-BE8E-31B6C97A420D}" type="slidenum">
               <a:rPr lang="en-US" smtClean="0"/>
@@ -5552,8 +3683,8 @@
         </p:nvSpPr>
         <p:spPr>
           <a:xfrm>
-            <a:off x="7435108" y="6553200"/>
-            <a:ext cx="1708896" cy="276999"/>
+            <a:off x="8183885" y="6553200"/>
+            <a:ext cx="960119" cy="276999"/>
           </a:xfrm>
           <a:ln/>
         </p:spPr>
@@ -5570,7 +3701,7 @@
             </a:pPr>
             <a:r>
               <a:rPr lang="en-US" dirty="0" smtClean="0"/>
-              <a:t>propositional ops..</a:t>
+              <a:t>digital..</a:t>
             </a:r>
             <a:fld id="{85BC747C-4E6E-462A-A001-3C1CA56269DD}" type="slidenum">
               <a:rPr lang="en-US" smtClean="0"/>
@@ -5765,8 +3896,8 @@
         </p:nvSpPr>
         <p:spPr>
           <a:xfrm>
-            <a:off x="7435108" y="6553200"/>
-            <a:ext cx="1708896" cy="276999"/>
+            <a:off x="8183885" y="6553200"/>
+            <a:ext cx="960119" cy="276999"/>
           </a:xfrm>
           <a:ln/>
         </p:spPr>
@@ -5783,7 +3914,7 @@
             </a:pPr>
             <a:r>
               <a:rPr lang="en-US" dirty="0" smtClean="0"/>
-              <a:t>propositional ops..</a:t>
+              <a:t>digital..</a:t>
             </a:r>
             <a:fld id="{B7856ECB-7BA5-4EA4-A170-7A96316AE30B}" type="slidenum">
               <a:rPr lang="en-US" smtClean="0"/>
@@ -6048,8 +4179,8 @@
         </p:nvSpPr>
         <p:spPr>
           <a:xfrm>
-            <a:off x="7473429" y="6553200"/>
-            <a:ext cx="1670575" cy="276999"/>
+            <a:off x="8222207" y="6553200"/>
+            <a:ext cx="921797" cy="276999"/>
           </a:xfrm>
           <a:ln/>
         </p:spPr>
@@ -6066,7 +4197,7 @@
             </a:pPr>
             <a:r>
               <a:rPr lang="en-US" dirty="0" smtClean="0"/>
-              <a:t>propositional ops.</a:t>
+              <a:t>digital.</a:t>
             </a:r>
             <a:fld id="{883BA68D-4400-4AD9-848C-65748A4D0824}" type="slidenum">
               <a:rPr lang="en-US" smtClean="0"/>
@@ -6091,8 +4222,8 @@
 </file>
 
 <file path=ppt/slideLayouts/slideLayout9.xml><?xml version="1.0" encoding="utf-8"?>
-<p:sldLayout xmlns:a="http://schemas.openxmlformats.org/drawingml/2006/main" xmlns:r="http://schemas.openxmlformats.org/officeDocument/2006/relationships" xmlns:p="http://schemas.openxmlformats.org/presentationml/2006/main" type="title" preserve="1">
-  <p:cSld name="Title Slide">
+<p:sldLayout xmlns:a="http://schemas.openxmlformats.org/drawingml/2006/main" xmlns:r="http://schemas.openxmlformats.org/officeDocument/2006/relationships" xmlns:p="http://schemas.openxmlformats.org/presentationml/2006/main" type="vertTitleAndTx" preserve="1">
+  <p:cSld name="Vertical Title and Text">
     <p:spTree>
       <p:nvGrpSpPr>
         <p:cNvPr id="1" name=""/>
@@ -6109,22 +4240,22 @@
       </p:grpSpPr>
       <p:sp>
         <p:nvSpPr>
-          <p:cNvPr id="2" name="Title 1"/>
+          <p:cNvPr id="2" name="Vertical Title 1"/>
           <p:cNvSpPr>
             <a:spLocks noGrp="1"/>
           </p:cNvSpPr>
           <p:nvPr>
-            <p:ph type="ctrTitle"/>
+            <p:ph type="title" orient="vert"/>
           </p:nvPr>
         </p:nvSpPr>
         <p:spPr>
           <a:xfrm>
-            <a:off x="685800" y="2130425"/>
-            <a:ext cx="7772400" cy="1470025"/>
+            <a:off x="6915150" y="304800"/>
+            <a:ext cx="2076450" cy="5867400"/>
           </a:xfrm>
         </p:spPr>
         <p:txBody>
-          <a:bodyPr/>
+          <a:bodyPr vert="eaVert"/>
           <a:lstStyle/>
           <a:p>
             <a:r>
@@ -6137,66 +4268,58 @@
       </p:sp>
       <p:sp>
         <p:nvSpPr>
-          <p:cNvPr id="3" name="Subtitle 2"/>
+          <p:cNvPr id="3" name="Vertical Text Placeholder 2"/>
           <p:cNvSpPr>
             <a:spLocks noGrp="1"/>
           </p:cNvSpPr>
           <p:nvPr>
-            <p:ph type="subTitle" idx="1"/>
+            <p:ph type="body" orient="vert" idx="1"/>
           </p:nvPr>
         </p:nvSpPr>
         <p:spPr>
           <a:xfrm>
-            <a:off x="1371600" y="3886200"/>
-            <a:ext cx="6400800" cy="1752600"/>
+            <a:off x="685800" y="304800"/>
+            <a:ext cx="6076950" cy="5867400"/>
           </a:xfrm>
         </p:spPr>
         <p:txBody>
-          <a:bodyPr/>
-          <a:lstStyle>
-            <a:lvl1pPr marL="0" indent="0" algn="ctr">
-              <a:buNone/>
-              <a:defRPr/>
-            </a:lvl1pPr>
-            <a:lvl2pPr marL="457200" indent="0" algn="ctr">
-              <a:buNone/>
-              <a:defRPr/>
-            </a:lvl2pPr>
-            <a:lvl3pPr marL="914400" indent="0" algn="ctr">
-              <a:buNone/>
-              <a:defRPr/>
-            </a:lvl3pPr>
-            <a:lvl4pPr marL="1371600" indent="0" algn="ctr">
-              <a:buNone/>
-              <a:defRPr/>
-            </a:lvl4pPr>
-            <a:lvl5pPr marL="1828800" indent="0" algn="ctr">
-              <a:buNone/>
-              <a:defRPr/>
-            </a:lvl5pPr>
-            <a:lvl6pPr marL="2286000" indent="0" algn="ctr">
-              <a:buNone/>
-              <a:defRPr/>
-            </a:lvl6pPr>
-            <a:lvl7pPr marL="2743200" indent="0" algn="ctr">
-              <a:buNone/>
-              <a:defRPr/>
-            </a:lvl7pPr>
-            <a:lvl8pPr marL="3200400" indent="0" algn="ctr">
-              <a:buNone/>
-              <a:defRPr/>
-            </a:lvl8pPr>
-            <a:lvl9pPr marL="3657600" indent="0" algn="ctr">
-              <a:buNone/>
-              <a:defRPr/>
-            </a:lvl9pPr>
-          </a:lstStyle>
+          <a:bodyPr vert="eaVert"/>
+          <a:lstStyle/>
           <a:p>
+            <a:pPr lvl="0"/>
             <a:r>
-              <a:rPr lang="en-US" smtClean="0"/>
-              <a:t>Click to edit Master subtitle style</a:t>
+              <a:rPr lang="en-US" dirty="0" smtClean="0"/>
+              <a:t>Click to edit Master text styles</a:t>
             </a:r>
-            <a:endParaRPr lang="en-US"/>
+          </a:p>
+          <a:p>
+            <a:pPr lvl="1"/>
+            <a:r>
+              <a:rPr lang="en-US" dirty="0" smtClean="0"/>
+              <a:t>Second level</a:t>
+            </a:r>
+          </a:p>
+          <a:p>
+            <a:pPr lvl="2"/>
+            <a:r>
+              <a:rPr lang="en-US" dirty="0" smtClean="0"/>
+              <a:t>Third level</a:t>
+            </a:r>
+          </a:p>
+          <a:p>
+            <a:pPr lvl="3"/>
+            <a:r>
+              <a:rPr lang="en-US" dirty="0" smtClean="0"/>
+              <a:t>Fourth level</a:t>
+            </a:r>
+          </a:p>
+          <a:p>
+            <a:pPr lvl="4"/>
+            <a:r>
+              <a:rPr lang="en-US" dirty="0" smtClean="0"/>
+              <a:t>Fifth level</a:t>
+            </a:r>
+            <a:endParaRPr lang="en-US" dirty="0"/>
           </a:p>
         </p:txBody>
       </p:sp>
@@ -6226,9 +4349,9 @@
             </a:pPr>
             <a:r>
               <a:rPr lang="en-US" dirty="0" smtClean="0"/>
-              <a:t>propositional ops.</a:t>
+              <a:t>digital.</a:t>
             </a:r>
-            <a:fld id="{671A9335-2B28-465B-823D-6F18B2E54319}" type="slidenum">
+            <a:fld id="{918B944E-E05E-401F-B34C-339DD98DC38E}" type="slidenum">
               <a:rPr lang="en-US" smtClean="0"/>
               <a:pPr>
                 <a:defRPr/>
@@ -6365,8 +4488,8 @@
         </p:nvSpPr>
         <p:spPr bwMode="auto">
           <a:xfrm>
-            <a:off x="7343361" y="6553200"/>
-            <a:ext cx="1800643" cy="276999"/>
+            <a:off x="8092139" y="6553200"/>
+            <a:ext cx="1051865" cy="276999"/>
           </a:xfrm>
           <a:prstGeom prst="rect">
             <a:avLst/>
@@ -6400,7 +4523,11 @@
             </a:pPr>
             <a:r>
               <a:rPr lang="en-US" dirty="0" smtClean="0"/>
-              <a:t>propositional ops I.</a:t>
+              <a:t>digital </a:t>
+            </a:r>
+            <a:r>
+              <a:rPr lang="en-US" dirty="0" smtClean="0"/>
+              <a:t>I.</a:t>
             </a:r>
             <a:fld id="{EBFB97A3-F52F-4FD6-B1AC-522A20C95467}" type="slidenum">
               <a:rPr lang="en-US" smtClean="0"/>
@@ -6456,7 +4583,7 @@
         <p:spPr bwMode="auto">
           <a:xfrm>
             <a:off x="4125913" y="6570994"/>
-            <a:ext cx="1357951" cy="261610"/>
+            <a:ext cx="1380544" cy="261610"/>
           </a:xfrm>
           <a:prstGeom prst="rect">
             <a:avLst/>
@@ -6483,13 +4610,25 @@
               <a:rPr lang="en-US" sz="1100" baseline="0" dirty="0" smtClean="0">
                 <a:latin typeface="Comic Sans MS" pitchFamily="66" charset="0"/>
               </a:rPr>
-              <a:t>February 11</a:t>
+              <a:t>February </a:t>
+            </a:r>
+            <a:r>
+              <a:rPr lang="en-US" sz="1100" baseline="0" dirty="0" smtClean="0">
+                <a:latin typeface="Comic Sans MS" pitchFamily="66" charset="0"/>
+              </a:rPr>
+              <a:t>13</a:t>
             </a:r>
             <a:r>
               <a:rPr lang="en-US" sz="1100" dirty="0" smtClean="0">
                 <a:latin typeface="Comic Sans MS" pitchFamily="66" charset="0"/>
               </a:rPr>
-              <a:t>, 2015</a:t>
+              <a:t>, </a:t>
+            </a:r>
+            <a:r>
+              <a:rPr lang="en-US" sz="1100" dirty="0" smtClean="0">
+                <a:latin typeface="Comic Sans MS" pitchFamily="66" charset="0"/>
+              </a:rPr>
+              <a:t>2015</a:t>
             </a:r>
             <a:endParaRPr lang="en-US" sz="1100" dirty="0">
               <a:latin typeface="Comic Sans MS" pitchFamily="66" charset="0"/>
@@ -7060,8 +5199,8 @@
         </p:nvSpPr>
         <p:spPr bwMode="auto">
           <a:xfrm>
-            <a:off x="7677057" y="6553200"/>
-            <a:ext cx="1466943" cy="276999"/>
+            <a:off x="8348214" y="6553200"/>
+            <a:ext cx="795786" cy="276999"/>
           </a:xfrm>
           <a:prstGeom prst="rect">
             <a:avLst/>
@@ -7093,7 +5232,7 @@
             </a:pPr>
             <a:r>
               <a:rPr lang="en-US" dirty="0" smtClean="0"/>
-              <a:t>propositional ops.</a:t>
+              <a:t>digital.</a:t>
             </a:r>
             <a:fld id="{2CE11749-3435-4A3E-A162-33970963D098}" type="slidenum">
               <a:rPr lang="en-US" smtClean="0"/>
@@ -7115,7 +5254,7 @@
           <p:nvPr userDrawn="1"/>
         </p:nvPicPr>
         <p:blipFill>
-          <a:blip r:embed="rId13"/>
+          <a:blip r:embed="rId3"/>
           <a:srcRect/>
           <a:stretch>
             <a:fillRect/>
@@ -7240,17 +5379,7 @@
   </p:cSld>
   <p:clrMap bg1="lt1" tx1="dk1" bg2="lt2" tx2="dk2" accent1="accent1" accent2="accent2" accent3="accent3" accent4="accent4" accent5="accent5" accent6="accent6" hlink="hlink" folHlink="folHlink"/>
   <p:sldLayoutIdLst>
-    <p:sldLayoutId id="2147483666" r:id="rId1"/>
-    <p:sldLayoutId id="2147483667" r:id="rId2"/>
-    <p:sldLayoutId id="2147483668" r:id="rId3"/>
-    <p:sldLayoutId id="2147483669" r:id="rId4"/>
-    <p:sldLayoutId id="2147483670" r:id="rId5"/>
-    <p:sldLayoutId id="2147483671" r:id="rId6"/>
-    <p:sldLayoutId id="2147483672" r:id="rId7"/>
-    <p:sldLayoutId id="2147483673" r:id="rId8"/>
-    <p:sldLayoutId id="2147483674" r:id="rId9"/>
-    <p:sldLayoutId id="2147483675" r:id="rId10"/>
-    <p:sldLayoutId id="2147483676" r:id="rId11"/>
+    <p:sldLayoutId id="2147483676" r:id="rId1"/>
   </p:sldLayoutIdLst>
   <p:transition xmlns:p14="http://schemas.microsoft.com/office/powerpoint/2010/main">
     <p:fade/>
@@ -7763,8 +5892,8 @@
         </p:nvSpPr>
         <p:spPr bwMode="auto">
           <a:xfrm>
-            <a:off x="7473429" y="6553200"/>
-            <a:ext cx="1670575" cy="276999"/>
+            <a:off x="8222207" y="6553200"/>
+            <a:ext cx="921797" cy="276999"/>
           </a:xfrm>
           <a:prstGeom prst="rect">
             <a:avLst/>
@@ -7797,12 +5926,8 @@
               <a:defRPr/>
             </a:pPr>
             <a:r>
-              <a:rPr lang="en-US" dirty="0" smtClean="0">
-                <a:solidFill>
-                  <a:srgbClr val="000000"/>
-                </a:solidFill>
-              </a:rPr>
-              <a:t>propositional ops.</a:t>
+              <a:rPr lang="en-US" dirty="0" smtClean="0"/>
+              <a:t>digital.</a:t>
             </a:r>
             <a:fld id="{EBFB97A3-F52F-4FD6-B1AC-522A20C95467}" type="slidenum">
               <a:rPr lang="en-US" smtClean="0">
@@ -7896,7 +6021,16 @@
                 </a:solidFill>
                 <a:latin typeface="Comic Sans MS" pitchFamily="66" charset="0"/>
               </a:rPr>
-              <a:t>February 14, 2014</a:t>
+              <a:t>February </a:t>
+            </a:r>
+            <a:r>
+              <a:rPr lang="en-US" sz="1100" dirty="0" smtClean="0">
+                <a:solidFill>
+                  <a:srgbClr val="000000"/>
+                </a:solidFill>
+                <a:latin typeface="Comic Sans MS" pitchFamily="66" charset="0"/>
+              </a:rPr>
+              <a:t>13, 2015</a:t>
             </a:r>
             <a:endParaRPr lang="en-US" sz="1100" dirty="0">
               <a:solidFill>
@@ -8421,8 +6555,8 @@
         </p:nvSpPr>
         <p:spPr>
           <a:xfrm>
-            <a:off x="7651210" y="6553200"/>
-            <a:ext cx="1492791" cy="276999"/>
+            <a:off x="8399987" y="6553200"/>
+            <a:ext cx="744014" cy="276999"/>
           </a:xfrm>
           <a:noFill/>
         </p:spPr>
@@ -8432,7 +6566,7 @@
           <a:p>
             <a:r>
               <a:rPr lang="en-US" dirty="0" smtClean="0"/>
-              <a:t>propositional ops.</a:t>
+              <a:t>digital.</a:t>
             </a:r>
             <a:fld id="{0150943C-9303-41DF-A6FA-7E32D6C5D18E}" type="slidenum">
               <a:rPr lang="en-US" smtClean="0"/>
@@ -8682,8 +6816,8 @@
         </p:nvSpPr>
         <p:spPr bwMode="auto">
           <a:xfrm>
-            <a:off x="7502691" y="6540057"/>
-            <a:ext cx="1586717" cy="276999"/>
+            <a:off x="8250717" y="6540057"/>
+            <a:ext cx="838691" cy="276999"/>
           </a:xfrm>
           <a:prstGeom prst="rect">
             <a:avLst/>
@@ -8716,7 +6850,7 @@
                 </a:solidFill>
                 <a:latin typeface="Comic Sans MS" pitchFamily="66" charset="0"/>
               </a:rPr>
-              <a:t>propositional ops.</a:t>
+              <a:t>digital.</a:t>
             </a:r>
             <a:fld id="{0150943C-9303-41DF-A6FA-7E32D6C5D18E}" type="slidenum">
               <a:rPr lang="en-US" sz="1200" smtClean="0">
@@ -8789,7 +6923,7 @@
           <a:graphicData uri="http://schemas.openxmlformats.org/presentationml/2006/ole">
             <mc:AlternateContent xmlns:mc="http://schemas.openxmlformats.org/markup-compatibility/2006">
               <mc:Choice xmlns:v="urn:schemas-microsoft-com:vml" Requires="v">
-                <p:oleObj spid="_x0000_s241716" name="Equation" r:id="rId4" imgW="5245100" imgH="647700" progId="Equation.DSMT4">
+                <p:oleObj spid="_x0000_s241723" name="Equation" r:id="rId4" imgW="5245100" imgH="647700" progId="Equation.DSMT4">
                   <p:embed/>
                 </p:oleObj>
               </mc:Choice>
@@ -9690,9 +7824,6 @@
                   </a:rPr>
                   <a:t>a</a:t>
                 </a:r>
-                <a:endParaRPr lang="en-US" sz="4400" dirty="0" smtClean="0">
-                  <a:latin typeface="Comic Sans MS" pitchFamily="66" charset="0"/>
-                </a:endParaRPr>
               </a:p>
             </p:txBody>
           </p:sp>
@@ -9724,9 +7855,6 @@
                   </a:rPr>
                   <a:t>b</a:t>
                 </a:r>
-                <a:endParaRPr lang="en-US" sz="4400" dirty="0" smtClean="0">
-                  <a:latin typeface="Comic Sans MS" pitchFamily="66" charset="0"/>
-                </a:endParaRPr>
               </a:p>
             </p:txBody>
           </p:sp>
@@ -9761,9 +7889,6 @@
               </a:rPr>
               <a:t>s</a:t>
             </a:r>
-            <a:endParaRPr lang="en-US" sz="4400" dirty="0" smtClean="0">
-              <a:latin typeface="Comic Sans MS" pitchFamily="66" charset="0"/>
-            </a:endParaRPr>
           </a:p>
         </p:txBody>
       </p:sp>
@@ -9789,7 +7914,7 @@
           <a:graphicData uri="http://schemas.openxmlformats.org/presentationml/2006/ole">
             <mc:AlternateContent xmlns:mc="http://schemas.openxmlformats.org/markup-compatibility/2006">
               <mc:Choice xmlns:v="urn:schemas-microsoft-com:vml" Requires="v">
-                <p:oleObj spid="_x0000_s241717" name="Equation" r:id="rId6" imgW="2692400" imgH="469900" progId="Equation.DSMT4">
+                <p:oleObj spid="_x0000_s241724" name="Equation" r:id="rId6" imgW="2692400" imgH="469900" progId="Equation.DSMT4">
                   <p:embed/>
                 </p:oleObj>
               </mc:Choice>
@@ -9859,7 +7984,7 @@
           <a:graphicData uri="http://schemas.openxmlformats.org/presentationml/2006/ole">
             <mc:AlternateContent xmlns:mc="http://schemas.openxmlformats.org/markup-compatibility/2006">
               <mc:Choice xmlns:v="urn:schemas-microsoft-com:vml" Requires="v">
-                <p:oleObj spid="_x0000_s241718" name="Equation" r:id="rId8" imgW="2755900" imgH="647700" progId="Equation.DSMT4">
+                <p:oleObj spid="_x0000_s241725" name="Equation" r:id="rId8" imgW="2755900" imgH="647700" progId="Equation.DSMT4">
                   <p:embed/>
                 </p:oleObj>
               </mc:Choice>
@@ -10681,7 +8806,12 @@
             <p:ph type="sldNum" sz="quarter" idx="10"/>
           </p:nvPr>
         </p:nvSpPr>
-        <p:spPr/>
+        <p:spPr>
+          <a:xfrm>
+            <a:off x="8330710" y="6553200"/>
+            <a:ext cx="813294" cy="276999"/>
+          </a:xfrm>
+        </p:spPr>
         <p:txBody>
           <a:bodyPr/>
           <a:lstStyle/>
@@ -10690,12 +8820,12 @@
               <a:defRPr/>
             </a:pPr>
             <a:r>
-              <a:rPr lang="en-US" smtClean="0">
+              <a:rPr lang="en-US" dirty="0" smtClean="0">
                 <a:solidFill>
                   <a:srgbClr val="000000"/>
                 </a:solidFill>
               </a:rPr>
-              <a:t>propositional ops.</a:t>
+              <a:t>digital.</a:t>
             </a:r>
             <a:fld id="{DB6F0ED6-FEF5-4C9C-B1CC-29B47EC66FAA}" type="slidenum">
               <a:rPr lang="en-US" smtClean="0">
@@ -13451,13 +11581,13 @@
   <p:clrMapOvr>
     <a:masterClrMapping/>
   </p:clrMapOvr>
-  <mc:AlternateContent xmlns:mc="http://schemas.openxmlformats.org/markup-compatibility/2006">
-    <mc:Choice xmlns:p14="http://schemas.microsoft.com/office/powerpoint/2010/main" Requires="p14">
+  <mc:AlternateContent xmlns:mc="http://schemas.openxmlformats.org/markup-compatibility/2006" xmlns:p14="http://schemas.microsoft.com/office/powerpoint/2010/main">
+    <mc:Choice Requires="p14">
       <p:transition spd="slow" p14:dur="900" advClick="0">
         <p:fade/>
       </p:transition>
     </mc:Choice>
-    <mc:Fallback>
+    <mc:Fallback xmlns="">
       <p:transition xmlns:p14="http://schemas.microsoft.com/office/powerpoint/2010/main" spd="slow" advClick="0">
         <p:fade/>
       </p:transition>
@@ -13528,7 +11658,12 @@
             <p:ph type="sldNum" sz="quarter" idx="10"/>
           </p:nvPr>
         </p:nvSpPr>
-        <p:spPr/>
+        <p:spPr>
+          <a:xfrm>
+            <a:off x="8306064" y="6553200"/>
+            <a:ext cx="837940" cy="276999"/>
+          </a:xfrm>
+        </p:spPr>
         <p:txBody>
           <a:bodyPr/>
           <a:lstStyle/>
@@ -13537,12 +11672,12 @@
               <a:defRPr/>
             </a:pPr>
             <a:r>
-              <a:rPr lang="en-US" smtClean="0">
+              <a:rPr lang="en-US" dirty="0" smtClean="0">
                 <a:solidFill>
                   <a:srgbClr val="000000"/>
                 </a:solidFill>
               </a:rPr>
-              <a:t>propositional ops.</a:t>
+              <a:t>digital.</a:t>
             </a:r>
             <a:fld id="{DB6F0ED6-FEF5-4C9C-B1CC-29B47EC66FAA}" type="slidenum">
               <a:rPr lang="en-US" smtClean="0">
@@ -13585,7 +11720,7 @@
           <a:graphicData uri="http://schemas.openxmlformats.org/presentationml/2006/ole">
             <mc:AlternateContent xmlns:mc="http://schemas.openxmlformats.org/markup-compatibility/2006">
               <mc:Choice xmlns:v="urn:schemas-microsoft-com:vml" Requires="v">
-                <p:oleObj spid="_x0000_s250916" name="Equation" r:id="rId3" imgW="5321300" imgH="1917700" progId="Equation.DSMT4">
+                <p:oleObj spid="_x0000_s250921" name="Equation" r:id="rId3" imgW="5321300" imgH="1917700" progId="Equation.DSMT4">
                   <p:embed/>
                 </p:oleObj>
               </mc:Choice>
@@ -13655,7 +11790,7 @@
           <a:graphicData uri="http://schemas.openxmlformats.org/presentationml/2006/ole">
             <mc:AlternateContent xmlns:mc="http://schemas.openxmlformats.org/markup-compatibility/2006">
               <mc:Choice xmlns:v="urn:schemas-microsoft-com:vml" Requires="v">
-                <p:oleObj spid="_x0000_s250917" name="Equation" r:id="rId5" imgW="2692400" imgH="1295400" progId="Equation.DSMT4">
+                <p:oleObj spid="_x0000_s250922" name="Equation" r:id="rId5" imgW="2692400" imgH="1295400" progId="Equation.DSMT4">
                   <p:embed/>
                 </p:oleObj>
               </mc:Choice>
@@ -13823,8 +11958,8 @@
         </p:nvSpPr>
         <p:spPr>
           <a:xfrm>
-            <a:off x="7557284" y="6553200"/>
-            <a:ext cx="1586717" cy="276999"/>
+            <a:off x="8375341" y="6553200"/>
+            <a:ext cx="768660" cy="276999"/>
           </a:xfrm>
           <a:noFill/>
         </p:spPr>
@@ -13838,7 +11973,7 @@
                   <a:srgbClr val="000000"/>
                 </a:solidFill>
               </a:rPr>
-              <a:t>propositional ops.</a:t>
+              <a:t>digital.</a:t>
             </a:r>
             <a:fld id="{0150943C-9303-41DF-A6FA-7E32D6C5D18E}" type="slidenum">
               <a:rPr lang="en-US" smtClean="0">
@@ -13907,7 +12042,7 @@
           <a:graphicData uri="http://schemas.openxmlformats.org/presentationml/2006/ole">
             <mc:AlternateContent xmlns:mc="http://schemas.openxmlformats.org/markup-compatibility/2006">
               <mc:Choice xmlns:v="urn:schemas-microsoft-com:vml" Requires="v">
-                <p:oleObj spid="_x0000_s239652" name="Equation" r:id="rId4" imgW="876300" imgH="1130300" progId="Equation.DSMT4">
+                <p:oleObj spid="_x0000_s239655" name="Equation" r:id="rId4" imgW="876300" imgH="1130300" progId="Equation.DSMT4">
                   <p:embed/>
                 </p:oleObj>
               </mc:Choice>
@@ -14033,7 +12168,12 @@
             <p:ph type="sldNum" sz="quarter" idx="10"/>
           </p:nvPr>
         </p:nvSpPr>
-        <p:spPr/>
+        <p:spPr>
+          <a:xfrm>
+            <a:off x="8375344" y="6553200"/>
+            <a:ext cx="768660" cy="276999"/>
+          </a:xfrm>
+        </p:spPr>
         <p:txBody>
           <a:bodyPr/>
           <a:lstStyle/>
@@ -14042,12 +12182,12 @@
               <a:defRPr/>
             </a:pPr>
             <a:r>
-              <a:rPr lang="en-US" smtClean="0">
+              <a:rPr lang="en-US" dirty="0" smtClean="0">
                 <a:solidFill>
                   <a:srgbClr val="000000"/>
                 </a:solidFill>
               </a:rPr>
-              <a:t>propositional ops.</a:t>
+              <a:t>digital.</a:t>
             </a:r>
             <a:fld id="{DB6F0ED6-FEF5-4C9C-B1CC-29B47EC66FAA}" type="slidenum">
               <a:rPr lang="en-US" smtClean="0">
@@ -15412,7 +13552,12 @@
             <p:ph type="sldNum" sz="quarter" idx="10"/>
           </p:nvPr>
         </p:nvSpPr>
-        <p:spPr/>
+        <p:spPr>
+          <a:xfrm>
+            <a:off x="8375344" y="6553200"/>
+            <a:ext cx="768660" cy="276999"/>
+          </a:xfrm>
+        </p:spPr>
         <p:txBody>
           <a:bodyPr/>
           <a:lstStyle/>
@@ -15421,12 +13566,12 @@
               <a:defRPr/>
             </a:pPr>
             <a:r>
-              <a:rPr lang="en-US" smtClean="0">
+              <a:rPr lang="en-US" dirty="0" smtClean="0">
                 <a:solidFill>
                   <a:srgbClr val="000000"/>
                 </a:solidFill>
               </a:rPr>
-              <a:t>propositional ops.</a:t>
+              <a:t>digital.</a:t>
             </a:r>
             <a:fld id="{DB6F0ED6-FEF5-4C9C-B1CC-29B47EC66FAA}" type="slidenum">
               <a:rPr lang="en-US" smtClean="0">
@@ -16109,7 +14254,12 @@
             <p:ph type="sldNum" sz="quarter" idx="10"/>
           </p:nvPr>
         </p:nvSpPr>
-        <p:spPr/>
+        <p:spPr>
+          <a:xfrm>
+            <a:off x="8375344" y="6553200"/>
+            <a:ext cx="768660" cy="276999"/>
+          </a:xfrm>
+        </p:spPr>
         <p:txBody>
           <a:bodyPr/>
           <a:lstStyle/>
@@ -16118,12 +14268,12 @@
               <a:defRPr/>
             </a:pPr>
             <a:r>
-              <a:rPr lang="en-US" smtClean="0">
+              <a:rPr lang="en-US" dirty="0" smtClean="0">
                 <a:solidFill>
                   <a:srgbClr val="000000"/>
                 </a:solidFill>
               </a:rPr>
-              <a:t>propositional ops.</a:t>
+              <a:t>digital.</a:t>
             </a:r>
             <a:fld id="{DB6F0ED6-FEF5-4C9C-B1CC-29B47EC66FAA}" type="slidenum">
               <a:rPr lang="en-US" smtClean="0">
@@ -18780,7 +16930,12 @@
             <p:ph type="sldNum" sz="quarter" idx="10"/>
           </p:nvPr>
         </p:nvSpPr>
-        <p:spPr/>
+        <p:spPr>
+          <a:xfrm>
+            <a:off x="8375344" y="6553200"/>
+            <a:ext cx="768660" cy="276999"/>
+          </a:xfrm>
+        </p:spPr>
         <p:txBody>
           <a:bodyPr/>
           <a:lstStyle/>
@@ -18789,12 +16944,12 @@
               <a:defRPr/>
             </a:pPr>
             <a:r>
-              <a:rPr lang="en-US" smtClean="0">
+              <a:rPr lang="en-US" dirty="0" smtClean="0">
                 <a:solidFill>
                   <a:srgbClr val="000000"/>
                 </a:solidFill>
               </a:rPr>
-              <a:t>propositional ops.</a:t>
+              <a:t>digital.</a:t>
             </a:r>
             <a:fld id="{DB6F0ED6-FEF5-4C9C-B1CC-29B47EC66FAA}" type="slidenum">
               <a:rPr lang="en-US" smtClean="0">
@@ -21623,7 +19778,12 @@
             <p:ph type="sldNum" sz="quarter" idx="10"/>
           </p:nvPr>
         </p:nvSpPr>
-        <p:spPr/>
+        <p:spPr>
+          <a:xfrm>
+            <a:off x="8375344" y="6553200"/>
+            <a:ext cx="768660" cy="276999"/>
+          </a:xfrm>
+        </p:spPr>
         <p:txBody>
           <a:bodyPr/>
           <a:lstStyle/>
@@ -21632,12 +19792,12 @@
               <a:defRPr/>
             </a:pPr>
             <a:r>
-              <a:rPr lang="en-US" smtClean="0">
+              <a:rPr lang="en-US" dirty="0" smtClean="0">
                 <a:solidFill>
                   <a:srgbClr val="000000"/>
                 </a:solidFill>
               </a:rPr>
-              <a:t>propositional ops.</a:t>
+              <a:t>digital.</a:t>
             </a:r>
             <a:fld id="{DB6F0ED6-FEF5-4C9C-B1CC-29B47EC66FAA}" type="slidenum">
               <a:rPr lang="en-US" smtClean="0">
@@ -24564,8 +22724,8 @@
         </p:nvSpPr>
         <p:spPr>
           <a:xfrm>
-            <a:off x="7581930" y="6553200"/>
-            <a:ext cx="1562071" cy="276999"/>
+            <a:off x="8375341" y="6553200"/>
+            <a:ext cx="768660" cy="276999"/>
           </a:xfrm>
           <a:noFill/>
         </p:spPr>
@@ -24579,7 +22739,7 @@
                   <a:srgbClr val="000000"/>
                 </a:solidFill>
               </a:rPr>
-              <a:t>propositional ops.</a:t>
+              <a:t>digital.</a:t>
             </a:r>
             <a:fld id="{0150943C-9303-41DF-A6FA-7E32D6C5D18E}" type="slidenum">
               <a:rPr lang="en-US" smtClean="0">
@@ -24648,7 +22808,7 @@
           <a:graphicData uri="http://schemas.openxmlformats.org/presentationml/2006/ole">
             <mc:AlternateContent xmlns:mc="http://schemas.openxmlformats.org/markup-compatibility/2006">
               <mc:Choice xmlns:v="urn:schemas-microsoft-com:vml" Requires="v">
-                <p:oleObj spid="_x0000_s1050" name="Equation" r:id="rId4" imgW="2286000" imgH="1041400" progId="Equation.DSMT4">
+                <p:oleObj spid="_x0000_s1055" name="Equation" r:id="rId4" imgW="2286000" imgH="1041400" progId="Equation.DSMT4">
                   <p:embed/>
                 </p:oleObj>
               </mc:Choice>
@@ -24718,7 +22878,7 @@
           <a:graphicData uri="http://schemas.openxmlformats.org/presentationml/2006/ole">
             <mc:AlternateContent xmlns:mc="http://schemas.openxmlformats.org/markup-compatibility/2006">
               <mc:Choice xmlns:v="urn:schemas-microsoft-com:vml" Requires="v">
-                <p:oleObj spid="_x0000_s1051" name="Equation" r:id="rId6" imgW="2286000" imgH="1041400" progId="Equation.DSMT4">
+                <p:oleObj spid="_x0000_s1056" name="Equation" r:id="rId6" imgW="2286000" imgH="1041400" progId="Equation.DSMT4">
                   <p:embed/>
                 </p:oleObj>
               </mc:Choice>
@@ -24937,9 +23097,6 @@
                   </a:rPr>
                   <a:t>a</a:t>
                 </a:r>
-                <a:endParaRPr lang="en-US" sz="4400" dirty="0" smtClean="0">
-                  <a:latin typeface="Comic Sans MS" pitchFamily="66" charset="0"/>
-                </a:endParaRPr>
               </a:p>
             </p:txBody>
           </p:sp>
@@ -25336,8 +23493,8 @@
         </p:nvSpPr>
         <p:spPr>
           <a:xfrm>
-            <a:off x="7581930" y="6553200"/>
-            <a:ext cx="1562071" cy="276999"/>
+            <a:off x="8375341" y="6553200"/>
+            <a:ext cx="768660" cy="276999"/>
           </a:xfrm>
           <a:noFill/>
         </p:spPr>
@@ -25351,7 +23508,7 @@
                   <a:srgbClr val="000000"/>
                 </a:solidFill>
               </a:rPr>
-              <a:t>propositional ops.</a:t>
+              <a:t>digital.</a:t>
             </a:r>
             <a:fld id="{0150943C-9303-41DF-A6FA-7E32D6C5D18E}" type="slidenum">
               <a:rPr lang="en-US" smtClean="0">
@@ -25420,7 +23577,7 @@
           <a:graphicData uri="http://schemas.openxmlformats.org/presentationml/2006/ole">
             <mc:AlternateContent xmlns:mc="http://schemas.openxmlformats.org/markup-compatibility/2006">
               <mc:Choice xmlns:v="urn:schemas-microsoft-com:vml" Requires="v">
-                <p:oleObj spid="_x0000_s252937" name="Equation" r:id="rId4" imgW="2273300" imgH="469900" progId="Equation.DSMT4">
+                <p:oleObj spid="_x0000_s252942" name="Equation" r:id="rId4" imgW="2273300" imgH="469900" progId="Equation.DSMT4">
                   <p:embed/>
                 </p:oleObj>
               </mc:Choice>
@@ -25639,9 +23796,6 @@
                   </a:rPr>
                   <a:t>a</a:t>
                 </a:r>
-                <a:endParaRPr lang="en-US" sz="4400" dirty="0" smtClean="0">
-                  <a:latin typeface="Comic Sans MS" pitchFamily="66" charset="0"/>
-                </a:endParaRPr>
               </a:p>
             </p:txBody>
           </p:sp>
@@ -25731,7 +23885,7 @@
           <a:graphicData uri="http://schemas.openxmlformats.org/presentationml/2006/ole">
             <mc:AlternateContent xmlns:mc="http://schemas.openxmlformats.org/markup-compatibility/2006">
               <mc:Choice xmlns:v="urn:schemas-microsoft-com:vml" Requires="v">
-                <p:oleObj spid="_x0000_s252938" name="Equation" r:id="rId7" imgW="2286000" imgH="1041400" progId="Equation.DSMT4">
+                <p:oleObj spid="_x0000_s252943" name="Equation" r:id="rId7" imgW="2286000" imgH="1041400" progId="Equation.DSMT4">
                   <p:embed/>
                 </p:oleObj>
               </mc:Choice>

</xml_diff>

<commit_message>
insert new slide for digital-logic.pptx
</commit_message>
<xml_diff>
--- a/spring15/slidesS15/digital-logic.pptx
+++ b/spring15/slidesS15/digital-logic.pptx
@@ -7,10 +7,10 @@
     <p:sldMasterId id="2147483677" r:id="rId3"/>
   </p:sldMasterIdLst>
   <p:notesMasterIdLst>
-    <p:notesMasterId r:id="rId16"/>
+    <p:notesMasterId r:id="rId17"/>
   </p:notesMasterIdLst>
   <p:handoutMasterIdLst>
-    <p:handoutMasterId r:id="rId17"/>
+    <p:handoutMasterId r:id="rId18"/>
   </p:handoutMasterIdLst>
   <p:sldIdLst>
     <p:sldId id="392" r:id="rId4"/>
@@ -18,18 +18,19 @@
     <p:sldId id="431" r:id="rId6"/>
     <p:sldId id="435" r:id="rId7"/>
     <p:sldId id="436" r:id="rId8"/>
-    <p:sldId id="439" r:id="rId9"/>
-    <p:sldId id="441" r:id="rId10"/>
-    <p:sldId id="444" r:id="rId11"/>
-    <p:sldId id="445" r:id="rId12"/>
-    <p:sldId id="429" r:id="rId13"/>
-    <p:sldId id="446" r:id="rId14"/>
-    <p:sldId id="443" r:id="rId15"/>
+    <p:sldId id="447" r:id="rId9"/>
+    <p:sldId id="439" r:id="rId10"/>
+    <p:sldId id="441" r:id="rId11"/>
+    <p:sldId id="444" r:id="rId12"/>
+    <p:sldId id="445" r:id="rId13"/>
+    <p:sldId id="429" r:id="rId14"/>
+    <p:sldId id="446" r:id="rId15"/>
+    <p:sldId id="443" r:id="rId16"/>
   </p:sldIdLst>
   <p:sldSz cx="9144000" cy="6858000" type="screen4x3"/>
   <p:notesSz cx="9601200" cy="7315200"/>
   <p:custDataLst>
-    <p:tags r:id="rId19"/>
+    <p:tags r:id="rId20"/>
   </p:custDataLst>
   <p:defaultTextStyle>
     <a:defPPr>
@@ -1081,7 +1082,7 @@
                 </a:solidFill>
               </a:rPr>
               <a:pPr/>
-              <a:t>8</a:t>
+              <a:t>9</a:t>
             </a:fld>
             <a:endParaRPr lang="en-US">
               <a:solidFill>
@@ -1171,7 +1172,7 @@
                 </a:solidFill>
               </a:rPr>
               <a:pPr/>
-              <a:t>9</a:t>
+              <a:t>10</a:t>
             </a:fld>
             <a:endParaRPr lang="en-US">
               <a:solidFill>
@@ -1261,7 +1262,7 @@
                 </a:solidFill>
               </a:rPr>
               <a:pPr/>
-              <a:t>10</a:t>
+              <a:t>11</a:t>
             </a:fld>
             <a:endParaRPr lang="en-US">
               <a:solidFill>
@@ -1419,11 +1420,7 @@
             </a:pPr>
             <a:r>
               <a:rPr lang="en-US" dirty="0" smtClean="0"/>
-              <a:t>digital.</a:t>
-            </a:r>
-            <a:r>
-              <a:rPr lang="en-US" dirty="0" smtClean="0"/>
-              <a:t>.</a:t>
+              <a:t>digital..</a:t>
             </a:r>
             <a:fld id="{C3C9801B-391E-452B-A4C3-BC5EC51A0BC7}" type="slidenum">
               <a:rPr lang="en-US" smtClean="0"/>
@@ -4523,11 +4520,7 @@
             </a:pPr>
             <a:r>
               <a:rPr lang="en-US" dirty="0" smtClean="0"/>
-              <a:t>digital </a:t>
-            </a:r>
-            <a:r>
-              <a:rPr lang="en-US" dirty="0" smtClean="0"/>
-              <a:t>I.</a:t>
+              <a:t>digital I.</a:t>
             </a:r>
             <a:fld id="{EBFB97A3-F52F-4FD6-B1AC-522A20C95467}" type="slidenum">
               <a:rPr lang="en-US" smtClean="0"/>
@@ -4610,25 +4603,13 @@
               <a:rPr lang="en-US" sz="1100" baseline="0" dirty="0" smtClean="0">
                 <a:latin typeface="Comic Sans MS" pitchFamily="66" charset="0"/>
               </a:rPr>
-              <a:t>February </a:t>
-            </a:r>
-            <a:r>
-              <a:rPr lang="en-US" sz="1100" baseline="0" dirty="0" smtClean="0">
-                <a:latin typeface="Comic Sans MS" pitchFamily="66" charset="0"/>
-              </a:rPr>
-              <a:t>13</a:t>
+              <a:t>February 13</a:t>
             </a:r>
             <a:r>
               <a:rPr lang="en-US" sz="1100" dirty="0" smtClean="0">
                 <a:latin typeface="Comic Sans MS" pitchFamily="66" charset="0"/>
               </a:rPr>
-              <a:t>, </a:t>
-            </a:r>
-            <a:r>
-              <a:rPr lang="en-US" sz="1100" dirty="0" smtClean="0">
-                <a:latin typeface="Comic Sans MS" pitchFamily="66" charset="0"/>
-              </a:rPr>
-              <a:t>2015</a:t>
+              <a:t>, 2015</a:t>
             </a:r>
             <a:endParaRPr lang="en-US" sz="1100" dirty="0">
               <a:latin typeface="Comic Sans MS" pitchFamily="66" charset="0"/>
@@ -6021,16 +6002,7 @@
                 </a:solidFill>
                 <a:latin typeface="Comic Sans MS" pitchFamily="66" charset="0"/>
               </a:rPr>
-              <a:t>February </a:t>
-            </a:r>
-            <a:r>
-              <a:rPr lang="en-US" sz="1100" dirty="0" smtClean="0">
-                <a:solidFill>
-                  <a:srgbClr val="000000"/>
-                </a:solidFill>
-                <a:latin typeface="Comic Sans MS" pitchFamily="66" charset="0"/>
-              </a:rPr>
-              <a:t>13, 2015</a:t>
+              <a:t>February 13, 2015</a:t>
             </a:r>
             <a:endParaRPr lang="en-US" sz="1100" dirty="0">
               <a:solidFill>
@@ -6808,6 +6780,730 @@
       </p:grpSpPr>
       <p:sp>
         <p:nvSpPr>
+          <p:cNvPr id="17" name="TextBox 16"/>
+          <p:cNvSpPr txBox="1"/>
+          <p:nvPr/>
+        </p:nvSpPr>
+        <p:spPr>
+          <a:xfrm>
+            <a:off x="4572000" y="6306671"/>
+            <a:ext cx="4216219" cy="276999"/>
+          </a:xfrm>
+          <a:prstGeom prst="rect">
+            <a:avLst/>
+          </a:prstGeom>
+          <a:noFill/>
+        </p:spPr>
+        <p:txBody>
+          <a:bodyPr wrap="none" rtlCol="0">
+            <a:spAutoFit/>
+          </a:bodyPr>
+          <a:lstStyle/>
+          <a:p>
+            <a:r>
+              <a:rPr lang="en-US" sz="1200" dirty="0" smtClean="0">
+                <a:solidFill>
+                  <a:srgbClr val="000000"/>
+                </a:solidFill>
+              </a:rPr>
+              <a:t>from </a:t>
+            </a:r>
+            <a:r>
+              <a:rPr lang="en-US" sz="1000" dirty="0" smtClean="0">
+                <a:solidFill>
+                  <a:srgbClr val="000000"/>
+                </a:solidFill>
+                <a:latin typeface="Courier New" pitchFamily="49" charset="0"/>
+                <a:cs typeface="Courier New" pitchFamily="49" charset="0"/>
+              </a:rPr>
+              <a:t>http://en.wikipedia.org/wiki/Adder_(electronics)</a:t>
+            </a:r>
+            <a:endParaRPr lang="en-US" sz="1000" dirty="0">
+              <a:solidFill>
+                <a:srgbClr val="000000"/>
+              </a:solidFill>
+              <a:latin typeface="Courier New" pitchFamily="49" charset="0"/>
+              <a:cs typeface="Courier New" pitchFamily="49" charset="0"/>
+            </a:endParaRPr>
+          </a:p>
+        </p:txBody>
+      </p:sp>
+      <p:sp>
+        <p:nvSpPr>
+          <p:cNvPr id="10" name="Slide Number Placeholder 2"/>
+          <p:cNvSpPr>
+            <a:spLocks noGrp="1"/>
+          </p:cNvSpPr>
+          <p:nvPr>
+            <p:ph type="sldNum" sz="quarter" idx="10"/>
+          </p:nvPr>
+        </p:nvSpPr>
+        <p:spPr>
+          <a:xfrm>
+            <a:off x="8375341" y="6553200"/>
+            <a:ext cx="768660" cy="276999"/>
+          </a:xfrm>
+          <a:noFill/>
+        </p:spPr>
+        <p:txBody>
+          <a:bodyPr/>
+          <a:lstStyle/>
+          <a:p>
+            <a:r>
+              <a:rPr lang="en-US" dirty="0" smtClean="0">
+                <a:solidFill>
+                  <a:srgbClr val="000000"/>
+                </a:solidFill>
+              </a:rPr>
+              <a:t>digital.</a:t>
+            </a:r>
+            <a:fld id="{0150943C-9303-41DF-A6FA-7E32D6C5D18E}" type="slidenum">
+              <a:rPr lang="en-US" smtClean="0">
+                <a:solidFill>
+                  <a:srgbClr val="000000"/>
+                </a:solidFill>
+              </a:rPr>
+              <a:pPr/>
+              <a:t>10</a:t>
+            </a:fld>
+            <a:endParaRPr lang="en-US" dirty="0" smtClean="0">
+              <a:solidFill>
+                <a:srgbClr val="000000"/>
+              </a:solidFill>
+            </a:endParaRPr>
+          </a:p>
+        </p:txBody>
+      </p:sp>
+      <p:sp>
+        <p:nvSpPr>
+          <p:cNvPr id="13" name="Title 1"/>
+          <p:cNvSpPr>
+            <a:spLocks noGrp="1"/>
+          </p:cNvSpPr>
+          <p:nvPr>
+            <p:ph type="title"/>
+          </p:nvPr>
+        </p:nvSpPr>
+        <p:spPr>
+          <a:xfrm>
+            <a:off x="2863332" y="213929"/>
+            <a:ext cx="4061861" cy="954472"/>
+          </a:xfrm>
+        </p:spPr>
+        <p:txBody>
+          <a:bodyPr/>
+          <a:lstStyle/>
+          <a:p>
+            <a:r>
+              <a:rPr lang="en-US" sz="4800" dirty="0" smtClean="0"/>
+              <a:t>half Adder</a:t>
+            </a:r>
+            <a:endParaRPr lang="en-US" sz="4800" dirty="0"/>
+          </a:p>
+        </p:txBody>
+      </p:sp>
+      <p:graphicFrame>
+        <p:nvGraphicFramePr>
+          <p:cNvPr id="18" name="Object 17"/>
+          <p:cNvGraphicFramePr>
+            <a:graphicFrameLocks noChangeAspect="1"/>
+          </p:cNvGraphicFramePr>
+          <p:nvPr>
+            <p:extLst>
+              <p:ext uri="{D42A27DB-BD31-4B8C-83A1-F6EECF244321}">
+                <p14:modId xmlns:p14="http://schemas.microsoft.com/office/powerpoint/2010/main" val="4051854167"/>
+              </p:ext>
+            </p:extLst>
+          </p:nvPr>
+        </p:nvGraphicFramePr>
+        <p:xfrm>
+          <a:off x="781050" y="2887663"/>
+          <a:ext cx="4160838" cy="860425"/>
+        </p:xfrm>
+        <a:graphic>
+          <a:graphicData uri="http://schemas.openxmlformats.org/presentationml/2006/ole">
+            <mc:AlternateContent xmlns:mc="http://schemas.openxmlformats.org/markup-compatibility/2006">
+              <mc:Choice xmlns:v="urn:schemas-microsoft-com:vml" Requires="v">
+                <p:oleObj spid="_x0000_s252953" name="Equation" r:id="rId4" imgW="2273300" imgH="469900" progId="Equation.DSMT4">
+                  <p:embed/>
+                </p:oleObj>
+              </mc:Choice>
+              <mc:Fallback>
+                <p:oleObj name="Equation" r:id="rId4" imgW="2273300" imgH="469900" progId="Equation.DSMT4">
+                  <p:embed/>
+                  <p:pic>
+                    <p:nvPicPr>
+                      <p:cNvPr id="0" name=""/>
+                      <p:cNvPicPr>
+                        <a:picLocks noChangeAspect="1" noChangeArrowheads="1"/>
+                      </p:cNvPicPr>
+                      <p:nvPr/>
+                    </p:nvPicPr>
+                    <p:blipFill>
+                      <a:blip r:embed="rId5"/>
+                      <a:srcRect/>
+                      <a:stretch>
+                        <a:fillRect/>
+                      </a:stretch>
+                    </p:blipFill>
+                    <p:spPr bwMode="auto">
+                      <a:xfrm>
+                        <a:off x="781050" y="2887663"/>
+                        <a:ext cx="4160838" cy="860425"/>
+                      </a:xfrm>
+                      <a:prstGeom prst="rect">
+                        <a:avLst/>
+                      </a:prstGeom>
+                      <a:noFill/>
+                      <a:extLst>
+                        <a:ext uri="{909E8E84-426E-40dd-AFC4-6F175D3DCCD1}">
+                          <a14:hiddenFill xmlns:a14="http://schemas.microsoft.com/office/drawing/2010/main">
+                            <a:solidFill>
+                              <a:srgbClr val="FFFFFF"/>
+                            </a:solidFill>
+                          </a14:hiddenFill>
+                        </a:ext>
+                      </a:extLst>
+                    </p:spPr>
+                  </p:pic>
+                </p:oleObj>
+              </mc:Fallback>
+            </mc:AlternateContent>
+          </a:graphicData>
+        </a:graphic>
+      </p:graphicFrame>
+      <p:grpSp>
+        <p:nvGrpSpPr>
+          <p:cNvPr id="7" name="Group 6"/>
+          <p:cNvGrpSpPr/>
+          <p:nvPr/>
+        </p:nvGrpSpPr>
+        <p:grpSpPr>
+          <a:xfrm rot="5400000">
+            <a:off x="4416245" y="2039750"/>
+            <a:ext cx="4854789" cy="2756242"/>
+            <a:chOff x="1985587" y="3221038"/>
+            <a:chExt cx="4854789" cy="2756242"/>
+          </a:xfrm>
+        </p:grpSpPr>
+        <p:grpSp>
+          <p:nvGrpSpPr>
+            <p:cNvPr id="4" name="Group 3"/>
+            <p:cNvGrpSpPr/>
+            <p:nvPr/>
+          </p:nvGrpSpPr>
+          <p:grpSpPr>
+            <a:xfrm>
+              <a:off x="1985587" y="3221038"/>
+              <a:ext cx="4693026" cy="2756242"/>
+              <a:chOff x="1985587" y="3221038"/>
+              <a:chExt cx="4693026" cy="2756242"/>
+            </a:xfrm>
+          </p:grpSpPr>
+          <p:pic>
+            <p:nvPicPr>
+              <p:cNvPr id="287748" name="Picture 4"/>
+              <p:cNvPicPr>
+                <a:picLocks noChangeAspect="1" noChangeArrowheads="1"/>
+              </p:cNvPicPr>
+              <p:nvPr/>
+            </p:nvPicPr>
+            <p:blipFill>
+              <a:blip r:embed="rId6"/>
+              <a:srcRect/>
+              <a:stretch>
+                <a:fillRect/>
+              </a:stretch>
+            </p:blipFill>
+            <p:spPr bwMode="auto">
+              <a:xfrm>
+                <a:off x="2413001" y="3221038"/>
+                <a:ext cx="4265612" cy="2756242"/>
+              </a:xfrm>
+              <a:prstGeom prst="rect">
+                <a:avLst/>
+              </a:prstGeom>
+              <a:noFill/>
+              <a:ln w="9525">
+                <a:noFill/>
+                <a:miter lim="800000"/>
+                <a:headEnd/>
+                <a:tailEnd/>
+              </a:ln>
+              <a:effectLst/>
+            </p:spPr>
+          </p:pic>
+          <p:sp useBgFill="1">
+            <p:nvSpPr>
+              <p:cNvPr id="12" name="TextBox 11"/>
+              <p:cNvSpPr txBox="1"/>
+              <p:nvPr/>
+            </p:nvSpPr>
+            <p:spPr>
+              <a:xfrm rot="16200000">
+                <a:off x="2120933" y="3810000"/>
+                <a:ext cx="519418" cy="769441"/>
+              </a:xfrm>
+              <a:prstGeom prst="rect">
+                <a:avLst/>
+              </a:prstGeom>
+            </p:spPr>
+            <p:txBody>
+              <a:bodyPr wrap="none" rtlCol="0">
+                <a:spAutoFit/>
+              </a:bodyPr>
+              <a:lstStyle/>
+              <a:p>
+                <a:pPr algn="l"/>
+                <a:r>
+                  <a:rPr lang="en-US" sz="4400" dirty="0" smtClean="0">
+                    <a:latin typeface="Comic Sans MS" pitchFamily="66" charset="0"/>
+                  </a:rPr>
+                  <a:t>b</a:t>
+                </a:r>
+              </a:p>
+            </p:txBody>
+          </p:sp>
+          <p:sp>
+            <p:nvSpPr>
+              <p:cNvPr id="15" name="Rectangle 14"/>
+              <p:cNvSpPr/>
+              <p:nvPr/>
+            </p:nvSpPr>
+            <p:spPr>
+              <a:xfrm>
+                <a:off x="3136900" y="3238500"/>
+                <a:ext cx="2832100" cy="2608262"/>
+              </a:xfrm>
+              <a:prstGeom prst="rect">
+                <a:avLst/>
+              </a:prstGeom>
+              <a:noFill/>
+              <a:ln>
+                <a:solidFill>
+                  <a:schemeClr val="tx2"/>
+                </a:solidFill>
+                <a:prstDash val="sysDash"/>
+              </a:ln>
+            </p:spPr>
+            <p:style>
+              <a:lnRef idx="2">
+                <a:schemeClr val="accent1">
+                  <a:shade val="50000"/>
+                </a:schemeClr>
+              </a:lnRef>
+              <a:fillRef idx="1">
+                <a:schemeClr val="accent1"/>
+              </a:fillRef>
+              <a:effectRef idx="0">
+                <a:schemeClr val="accent1"/>
+              </a:effectRef>
+              <a:fontRef idx="minor">
+                <a:schemeClr val="lt1"/>
+              </a:fontRef>
+            </p:style>
+            <p:txBody>
+              <a:bodyPr rtlCol="0" anchor="ctr"/>
+              <a:lstStyle/>
+              <a:p>
+                <a:endParaRPr lang="en-US">
+                  <a:solidFill>
+                    <a:srgbClr val="FFFFFF"/>
+                  </a:solidFill>
+                  <a:latin typeface="Times New Roman"/>
+                </a:endParaRPr>
+              </a:p>
+            </p:txBody>
+          </p:sp>
+          <p:sp useBgFill="1">
+            <p:nvSpPr>
+              <p:cNvPr id="14" name="TextBox 13"/>
+              <p:cNvSpPr txBox="1"/>
+              <p:nvPr/>
+            </p:nvSpPr>
+            <p:spPr>
+              <a:xfrm rot="16396041">
+                <a:off x="2133604" y="3276600"/>
+                <a:ext cx="473407" cy="769441"/>
+              </a:xfrm>
+              <a:prstGeom prst="rect">
+                <a:avLst/>
+              </a:prstGeom>
+            </p:spPr>
+            <p:txBody>
+              <a:bodyPr wrap="none" rtlCol="0">
+                <a:spAutoFit/>
+              </a:bodyPr>
+              <a:lstStyle/>
+              <a:p>
+                <a:pPr algn="l"/>
+                <a:r>
+                  <a:rPr lang="en-US" sz="4400" dirty="0" smtClean="0">
+                    <a:latin typeface="Comic Sans MS" pitchFamily="66" charset="0"/>
+                  </a:rPr>
+                  <a:t>a</a:t>
+                </a:r>
+              </a:p>
+            </p:txBody>
+          </p:sp>
+        </p:grpSp>
+        <p:sp useBgFill="1">
+          <p:nvSpPr>
+            <p:cNvPr id="5" name="TextBox 4"/>
+            <p:cNvSpPr txBox="1"/>
+            <p:nvPr/>
+          </p:nvSpPr>
+          <p:spPr>
+            <a:xfrm rot="16200000">
+              <a:off x="6197600" y="3517900"/>
+              <a:ext cx="516112" cy="769441"/>
+            </a:xfrm>
+            <a:prstGeom prst="rect">
+              <a:avLst/>
+            </a:prstGeom>
+          </p:spPr>
+          <p:txBody>
+            <a:bodyPr wrap="none" rtlCol="0">
+              <a:spAutoFit/>
+            </a:bodyPr>
+            <a:lstStyle/>
+            <a:p>
+              <a:pPr algn="l"/>
+              <a:r>
+                <a:rPr lang="en-US" sz="4400" dirty="0" smtClean="0">
+                  <a:latin typeface="Comic Sans MS" pitchFamily="66" charset="0"/>
+                </a:rPr>
+                <a:t>d</a:t>
+              </a:r>
+            </a:p>
+          </p:txBody>
+        </p:sp>
+        <p:sp useBgFill="1">
+          <p:nvSpPr>
+            <p:cNvPr id="21" name="TextBox 20"/>
+            <p:cNvSpPr txBox="1"/>
+            <p:nvPr/>
+          </p:nvSpPr>
+          <p:spPr>
+            <a:xfrm rot="16006795">
+              <a:off x="6197600" y="4953000"/>
+              <a:ext cx="474509" cy="769441"/>
+            </a:xfrm>
+            <a:prstGeom prst="rect">
+              <a:avLst/>
+            </a:prstGeom>
+          </p:spPr>
+          <p:txBody>
+            <a:bodyPr wrap="none" rtlCol="0">
+              <a:spAutoFit/>
+            </a:bodyPr>
+            <a:lstStyle/>
+            <a:p>
+              <a:pPr algn="l"/>
+              <a:r>
+                <a:rPr lang="en-US" sz="4400" dirty="0" smtClean="0">
+                  <a:latin typeface="Comic Sans MS" pitchFamily="66" charset="0"/>
+                </a:rPr>
+                <a:t>c</a:t>
+              </a:r>
+            </a:p>
+          </p:txBody>
+        </p:sp>
+      </p:grpSp>
+      <p:graphicFrame>
+        <p:nvGraphicFramePr>
+          <p:cNvPr id="16" name="Object 15"/>
+          <p:cNvGraphicFramePr>
+            <a:graphicFrameLocks noChangeAspect="1"/>
+          </p:cNvGraphicFramePr>
+          <p:nvPr>
+            <p:extLst>
+              <p:ext uri="{D42A27DB-BD31-4B8C-83A1-F6EECF244321}">
+                <p14:modId xmlns:p14="http://schemas.microsoft.com/office/powerpoint/2010/main" val="1349652803"/>
+              </p:ext>
+            </p:extLst>
+          </p:nvPr>
+        </p:nvGraphicFramePr>
+        <p:xfrm>
+          <a:off x="777875" y="2873375"/>
+          <a:ext cx="4184650" cy="1906588"/>
+        </p:xfrm>
+        <a:graphic>
+          <a:graphicData uri="http://schemas.openxmlformats.org/presentationml/2006/ole">
+            <mc:AlternateContent xmlns:mc="http://schemas.openxmlformats.org/markup-compatibility/2006">
+              <mc:Choice xmlns:v="urn:schemas-microsoft-com:vml" Requires="v">
+                <p:oleObj spid="_x0000_s252954" name="Equation" r:id="rId7" imgW="2286000" imgH="1041400" progId="Equation.DSMT4">
+                  <p:embed/>
+                </p:oleObj>
+              </mc:Choice>
+              <mc:Fallback>
+                <p:oleObj name="Equation" r:id="rId7" imgW="2286000" imgH="1041400" progId="Equation.DSMT4">
+                  <p:embed/>
+                  <p:pic>
+                    <p:nvPicPr>
+                      <p:cNvPr id="0" name=""/>
+                      <p:cNvPicPr>
+                        <a:picLocks noChangeAspect="1" noChangeArrowheads="1"/>
+                      </p:cNvPicPr>
+                      <p:nvPr/>
+                    </p:nvPicPr>
+                    <p:blipFill>
+                      <a:blip r:embed="rId8"/>
+                      <a:srcRect/>
+                      <a:stretch>
+                        <a:fillRect/>
+                      </a:stretch>
+                    </p:blipFill>
+                    <p:spPr bwMode="auto">
+                      <a:xfrm>
+                        <a:off x="777875" y="2873375"/>
+                        <a:ext cx="4184650" cy="1906588"/>
+                      </a:xfrm>
+                      <a:prstGeom prst="rect">
+                        <a:avLst/>
+                      </a:prstGeom>
+                      <a:noFill/>
+                      <a:extLst>
+                        <a:ext uri="{909E8E84-426E-40dd-AFC4-6F175D3DCCD1}">
+                          <a14:hiddenFill xmlns:a14="http://schemas.microsoft.com/office/drawing/2010/main">
+                            <a:solidFill>
+                              <a:srgbClr val="FFFFFF"/>
+                            </a:solidFill>
+                          </a14:hiddenFill>
+                        </a:ext>
+                      </a:extLst>
+                    </p:spPr>
+                  </p:pic>
+                </p:oleObj>
+              </mc:Fallback>
+            </mc:AlternateContent>
+          </a:graphicData>
+        </a:graphic>
+      </p:graphicFrame>
+    </p:spTree>
+    <p:extLst>
+      <p:ext uri="{BB962C8B-B14F-4D97-AF65-F5344CB8AC3E}">
+        <p14:creationId xmlns:p14="http://schemas.microsoft.com/office/powerpoint/2010/main" val="3354419208"/>
+      </p:ext>
+    </p:extLst>
+  </p:cSld>
+  <p:clrMapOvr>
+    <a:masterClrMapping/>
+  </p:clrMapOvr>
+  <p:transition xmlns:p14="http://schemas.microsoft.com/office/powerpoint/2010/main" spd="slow" advClick="0">
+    <p:fade thruBlk="1"/>
+  </p:transition>
+  <p:timing>
+    <p:tnLst>
+      <p:par>
+        <p:cTn xmlns:p14="http://schemas.microsoft.com/office/powerpoint/2010/main" id="1" dur="indefinite" restart="never" nodeType="tmRoot">
+          <p:childTnLst>
+            <p:seq concurrent="1" nextAc="seek">
+              <p:cTn id="2" dur="indefinite" nodeType="mainSeq">
+                <p:childTnLst>
+                  <p:par>
+                    <p:cTn id="3" fill="hold">
+                      <p:stCondLst>
+                        <p:cond delay="indefinite"/>
+                      </p:stCondLst>
+                      <p:childTnLst>
+                        <p:par>
+                          <p:cTn id="4" fill="hold">
+                            <p:stCondLst>
+                              <p:cond delay="0"/>
+                            </p:stCondLst>
+                            <p:childTnLst>
+                              <p:par>
+                                <p:cTn id="5" presetID="22" presetClass="entr" presetSubtype="1" fill="hold" nodeType="clickEffect">
+                                  <p:stCondLst>
+                                    <p:cond delay="0"/>
+                                  </p:stCondLst>
+                                  <p:childTnLst>
+                                    <p:set>
+                                      <p:cBhvr>
+                                        <p:cTn id="6" dur="1" fill="hold">
+                                          <p:stCondLst>
+                                            <p:cond delay="0"/>
+                                          </p:stCondLst>
+                                        </p:cTn>
+                                        <p:tgtEl>
+                                          <p:spTgt spid="7"/>
+                                        </p:tgtEl>
+                                        <p:attrNameLst>
+                                          <p:attrName>style.visibility</p:attrName>
+                                        </p:attrNameLst>
+                                      </p:cBhvr>
+                                      <p:to>
+                                        <p:strVal val="visible"/>
+                                      </p:to>
+                                    </p:set>
+                                    <p:animEffect transition="in" filter="wipe(up)">
+                                      <p:cBhvr>
+                                        <p:cTn id="7" dur="1000"/>
+                                        <p:tgtEl>
+                                          <p:spTgt spid="7"/>
+                                        </p:tgtEl>
+                                      </p:cBhvr>
+                                    </p:animEffect>
+                                  </p:childTnLst>
+                                </p:cTn>
+                              </p:par>
+                            </p:childTnLst>
+                          </p:cTn>
+                        </p:par>
+                      </p:childTnLst>
+                    </p:cTn>
+                  </p:par>
+                  <p:par>
+                    <p:cTn id="8" fill="hold">
+                      <p:stCondLst>
+                        <p:cond delay="indefinite"/>
+                      </p:stCondLst>
+                      <p:childTnLst>
+                        <p:par>
+                          <p:cTn id="9" fill="hold">
+                            <p:stCondLst>
+                              <p:cond delay="0"/>
+                            </p:stCondLst>
+                            <p:childTnLst>
+                              <p:par>
+                                <p:cTn id="10" presetID="22" presetClass="entr" presetSubtype="8" fill="hold" nodeType="clickEffect">
+                                  <p:stCondLst>
+                                    <p:cond delay="0"/>
+                                  </p:stCondLst>
+                                  <p:childTnLst>
+                                    <p:set>
+                                      <p:cBhvr>
+                                        <p:cTn id="11" dur="1" fill="hold">
+                                          <p:stCondLst>
+                                            <p:cond delay="0"/>
+                                          </p:stCondLst>
+                                        </p:cTn>
+                                        <p:tgtEl>
+                                          <p:spTgt spid="18"/>
+                                        </p:tgtEl>
+                                        <p:attrNameLst>
+                                          <p:attrName>style.visibility</p:attrName>
+                                        </p:attrNameLst>
+                                      </p:cBhvr>
+                                      <p:to>
+                                        <p:strVal val="visible"/>
+                                      </p:to>
+                                    </p:set>
+                                    <p:animEffect transition="in" filter="wipe(left)">
+                                      <p:cBhvr>
+                                        <p:cTn id="12" dur="1000"/>
+                                        <p:tgtEl>
+                                          <p:spTgt spid="18"/>
+                                        </p:tgtEl>
+                                      </p:cBhvr>
+                                    </p:animEffect>
+                                  </p:childTnLst>
+                                </p:cTn>
+                              </p:par>
+                            </p:childTnLst>
+                          </p:cTn>
+                        </p:par>
+                      </p:childTnLst>
+                    </p:cTn>
+                  </p:par>
+                  <p:par>
+                    <p:cTn id="13" fill="hold">
+                      <p:stCondLst>
+                        <p:cond delay="indefinite"/>
+                      </p:stCondLst>
+                      <p:childTnLst>
+                        <p:par>
+                          <p:cTn id="14" fill="hold">
+                            <p:stCondLst>
+                              <p:cond delay="0"/>
+                            </p:stCondLst>
+                            <p:childTnLst>
+                              <p:par>
+                                <p:cTn id="15" presetID="22" presetClass="entr" presetSubtype="8" fill="hold" nodeType="clickEffect">
+                                  <p:stCondLst>
+                                    <p:cond delay="0"/>
+                                  </p:stCondLst>
+                                  <p:childTnLst>
+                                    <p:set>
+                                      <p:cBhvr>
+                                        <p:cTn id="16" dur="1" fill="hold">
+                                          <p:stCondLst>
+                                            <p:cond delay="0"/>
+                                          </p:stCondLst>
+                                        </p:cTn>
+                                        <p:tgtEl>
+                                          <p:spTgt spid="16"/>
+                                        </p:tgtEl>
+                                        <p:attrNameLst>
+                                          <p:attrName>style.visibility</p:attrName>
+                                        </p:attrNameLst>
+                                      </p:cBhvr>
+                                      <p:to>
+                                        <p:strVal val="visible"/>
+                                      </p:to>
+                                    </p:set>
+                                    <p:animEffect transition="in" filter="wipe(left)">
+                                      <p:cBhvr>
+                                        <p:cTn id="17" dur="1000"/>
+                                        <p:tgtEl>
+                                          <p:spTgt spid="16"/>
+                                        </p:tgtEl>
+                                      </p:cBhvr>
+                                    </p:animEffect>
+                                  </p:childTnLst>
+                                </p:cTn>
+                              </p:par>
+                            </p:childTnLst>
+                          </p:cTn>
+                        </p:par>
+                      </p:childTnLst>
+                    </p:cTn>
+                  </p:par>
+                </p:childTnLst>
+              </p:cTn>
+              <p:prevCondLst>
+                <p:cond evt="onPrev" delay="0">
+                  <p:tgtEl>
+                    <p:sldTgt/>
+                  </p:tgtEl>
+                </p:cond>
+              </p:prevCondLst>
+              <p:nextCondLst>
+                <p:cond evt="onNext" delay="0">
+                  <p:tgtEl>
+                    <p:sldTgt/>
+                  </p:tgtEl>
+                </p:cond>
+              </p:nextCondLst>
+            </p:seq>
+          </p:childTnLst>
+        </p:cTn>
+      </p:par>
+    </p:tnLst>
+  </p:timing>
+</p:sld>
+</file>
+
+<file path=ppt/slides/slide11.xml><?xml version="1.0" encoding="utf-8"?>
+<p:sld xmlns:a="http://schemas.openxmlformats.org/drawingml/2006/main" xmlns:r="http://schemas.openxmlformats.org/officeDocument/2006/relationships" xmlns:p="http://schemas.openxmlformats.org/presentationml/2006/main">
+  <p:cSld>
+    <p:spTree>
+      <p:nvGrpSpPr>
+        <p:cNvPr id="1" name=""/>
+        <p:cNvGrpSpPr/>
+        <p:nvPr/>
+      </p:nvGrpSpPr>
+      <p:grpSpPr>
+        <a:xfrm>
+          <a:off x="0" y="0"/>
+          <a:ext cx="0" cy="0"/>
+          <a:chOff x="0" y="0"/>
+          <a:chExt cx="0" cy="0"/>
+        </a:xfrm>
+      </p:grpSpPr>
+      <p:sp>
+        <p:nvSpPr>
           <p:cNvPr id="31" name="Slide Number Placeholder 2"/>
           <p:cNvSpPr txBox="1">
             <a:spLocks/>
@@ -6862,7 +7558,7 @@
               <a:pPr algn="r">
                 <a:defRPr/>
               </a:pPr>
-              <a:t>10</a:t>
+              <a:t>11</a:t>
             </a:fld>
             <a:endParaRPr lang="en-US" sz="1200" dirty="0" smtClean="0">
               <a:solidFill>
@@ -6923,7 +7619,7 @@
           <a:graphicData uri="http://schemas.openxmlformats.org/presentationml/2006/ole">
             <mc:AlternateContent xmlns:mc="http://schemas.openxmlformats.org/markup-compatibility/2006">
               <mc:Choice xmlns:v="urn:schemas-microsoft-com:vml" Requires="v">
-                <p:oleObj spid="_x0000_s241723" name="Equation" r:id="rId4" imgW="5245100" imgH="647700" progId="Equation.DSMT4">
+                <p:oleObj spid="_x0000_s241738" name="Equation" r:id="rId4" imgW="5245100" imgH="647700" progId="Equation.DSMT4">
                   <p:embed/>
                 </p:oleObj>
               </mc:Choice>
@@ -7914,7 +8610,7 @@
           <a:graphicData uri="http://schemas.openxmlformats.org/presentationml/2006/ole">
             <mc:AlternateContent xmlns:mc="http://schemas.openxmlformats.org/markup-compatibility/2006">
               <mc:Choice xmlns:v="urn:schemas-microsoft-com:vml" Requires="v">
-                <p:oleObj spid="_x0000_s241724" name="Equation" r:id="rId6" imgW="2692400" imgH="469900" progId="Equation.DSMT4">
+                <p:oleObj spid="_x0000_s241739" name="Equation" r:id="rId6" imgW="2692400" imgH="469900" progId="Equation.DSMT4">
                   <p:embed/>
                 </p:oleObj>
               </mc:Choice>
@@ -7984,7 +8680,7 @@
           <a:graphicData uri="http://schemas.openxmlformats.org/presentationml/2006/ole">
             <mc:AlternateContent xmlns:mc="http://schemas.openxmlformats.org/markup-compatibility/2006">
               <mc:Choice xmlns:v="urn:schemas-microsoft-com:vml" Requires="v">
-                <p:oleObj spid="_x0000_s241725" name="Equation" r:id="rId8" imgW="2755900" imgH="647700" progId="Equation.DSMT4">
+                <p:oleObj spid="_x0000_s241740" name="Equation" r:id="rId8" imgW="2755900" imgH="647700" progId="Equation.DSMT4">
                   <p:embed/>
                 </p:oleObj>
               </mc:Choice>
@@ -8346,7 +9042,7 @@
 </p:sld>
 </file>
 
-<file path=ppt/slides/slide11.xml><?xml version="1.0" encoding="utf-8"?>
+<file path=ppt/slides/slide12.xml><?xml version="1.0" encoding="utf-8"?>
 <p:sld xmlns:a="http://schemas.openxmlformats.org/drawingml/2006/main" xmlns:r="http://schemas.openxmlformats.org/officeDocument/2006/relationships" xmlns:p="http://schemas.openxmlformats.org/presentationml/2006/main">
   <p:cSld>
     <p:spTree>
@@ -8836,7 +9532,7 @@
               <a:pPr>
                 <a:defRPr/>
               </a:pPr>
-              <a:t>11</a:t>
+              <a:t>12</a:t>
             </a:fld>
             <a:endParaRPr lang="en-US" dirty="0">
               <a:solidFill>
@@ -11603,7 +12299,7 @@
 </p:sld>
 </file>
 
-<file path=ppt/slides/slide12.xml><?xml version="1.0" encoding="utf-8"?>
+<file path=ppt/slides/slide13.xml><?xml version="1.0" encoding="utf-8"?>
 <p:sld xmlns:a="http://schemas.openxmlformats.org/drawingml/2006/main" xmlns:r="http://schemas.openxmlformats.org/officeDocument/2006/relationships" xmlns:p="http://schemas.openxmlformats.org/presentationml/2006/main">
   <p:cSld>
     <p:spTree>
@@ -11688,7 +12384,7 @@
               <a:pPr>
                 <a:defRPr/>
               </a:pPr>
-              <a:t>12</a:t>
+              <a:t>13</a:t>
             </a:fld>
             <a:endParaRPr lang="en-US" dirty="0">
               <a:solidFill>
@@ -11720,7 +12416,7 @@
           <a:graphicData uri="http://schemas.openxmlformats.org/presentationml/2006/ole">
             <mc:AlternateContent xmlns:mc="http://schemas.openxmlformats.org/markup-compatibility/2006">
               <mc:Choice xmlns:v="urn:schemas-microsoft-com:vml" Requires="v">
-                <p:oleObj spid="_x0000_s250921" name="Equation" r:id="rId3" imgW="5321300" imgH="1917700" progId="Equation.DSMT4">
+                <p:oleObj spid="_x0000_s250932" name="Equation" r:id="rId3" imgW="5321300" imgH="1917700" progId="Equation.DSMT4">
                   <p:embed/>
                 </p:oleObj>
               </mc:Choice>
@@ -11790,7 +12486,7 @@
           <a:graphicData uri="http://schemas.openxmlformats.org/presentationml/2006/ole">
             <mc:AlternateContent xmlns:mc="http://schemas.openxmlformats.org/markup-compatibility/2006">
               <mc:Choice xmlns:v="urn:schemas-microsoft-com:vml" Requires="v">
-                <p:oleObj spid="_x0000_s250922" name="Equation" r:id="rId5" imgW="2692400" imgH="1295400" progId="Equation.DSMT4">
+                <p:oleObj spid="_x0000_s250933" name="Equation" r:id="rId5" imgW="2692400" imgH="1295400" progId="Equation.DSMT4">
                   <p:embed/>
                 </p:oleObj>
               </mc:Choice>
@@ -12042,7 +12738,7 @@
           <a:graphicData uri="http://schemas.openxmlformats.org/presentationml/2006/ole">
             <mc:AlternateContent xmlns:mc="http://schemas.openxmlformats.org/markup-compatibility/2006">
               <mc:Choice xmlns:v="urn:schemas-microsoft-com:vml" Requires="v">
-                <p:oleObj spid="_x0000_s239655" name="Equation" r:id="rId4" imgW="876300" imgH="1130300" progId="Equation.DSMT4">
+                <p:oleObj spid="_x0000_s239662" name="Equation" r:id="rId4" imgW="876300" imgH="1130300" progId="Equation.DSMT4">
                   <p:embed/>
                 </p:oleObj>
               </mc:Choice>
@@ -16150,6 +16846,2786 @@
           <a:chExt cx="0" cy="0"/>
         </a:xfrm>
       </p:grpSpPr>
+      <p:grpSp>
+        <p:nvGrpSpPr>
+          <p:cNvPr id="12" name="Group 11"/>
+          <p:cNvGrpSpPr/>
+          <p:nvPr/>
+        </p:nvGrpSpPr>
+        <p:grpSpPr>
+          <a:xfrm>
+            <a:off x="889000" y="2336800"/>
+            <a:ext cx="6849810" cy="684431"/>
+            <a:chOff x="889000" y="2349500"/>
+            <a:chExt cx="6849810" cy="684431"/>
+          </a:xfrm>
+        </p:grpSpPr>
+        <p:sp>
+          <p:nvSpPr>
+            <p:cNvPr id="161" name="TextBox 160"/>
+            <p:cNvSpPr txBox="1"/>
+            <p:nvPr/>
+          </p:nvSpPr>
+          <p:spPr>
+            <a:xfrm>
+              <a:off x="7277100" y="2349500"/>
+              <a:ext cx="461710" cy="646331"/>
+            </a:xfrm>
+            <a:prstGeom prst="rect">
+              <a:avLst/>
+            </a:prstGeom>
+            <a:noFill/>
+          </p:spPr>
+          <p:txBody>
+            <a:bodyPr wrap="none" rtlCol="0">
+              <a:spAutoFit/>
+            </a:bodyPr>
+            <a:lstStyle/>
+            <a:p>
+              <a:pPr lvl="0" algn="l"/>
+              <a:r>
+                <a:rPr lang="en-US" sz="3600" b="1" dirty="0">
+                  <a:solidFill>
+                    <a:srgbClr val="000000"/>
+                  </a:solidFill>
+                  <a:latin typeface="Courier New"/>
+                  <a:cs typeface="Courier New"/>
+                </a:rPr>
+                <a:t>0</a:t>
+              </a:r>
+              <a:endParaRPr lang="en-US" sz="3600" b="1" baseline="-25000" dirty="0">
+                <a:solidFill>
+                  <a:srgbClr val="000000"/>
+                </a:solidFill>
+                <a:latin typeface="Courier New"/>
+                <a:cs typeface="Courier New"/>
+              </a:endParaRPr>
+            </a:p>
+          </p:txBody>
+        </p:sp>
+        <p:sp>
+          <p:nvSpPr>
+            <p:cNvPr id="162" name="TextBox 161"/>
+            <p:cNvSpPr txBox="1"/>
+            <p:nvPr/>
+          </p:nvSpPr>
+          <p:spPr>
+            <a:xfrm>
+              <a:off x="5905500" y="2349500"/>
+              <a:ext cx="461710" cy="646331"/>
+            </a:xfrm>
+            <a:prstGeom prst="rect">
+              <a:avLst/>
+            </a:prstGeom>
+            <a:noFill/>
+          </p:spPr>
+          <p:txBody>
+            <a:bodyPr wrap="none" rtlCol="0">
+              <a:spAutoFit/>
+            </a:bodyPr>
+            <a:lstStyle/>
+            <a:p>
+              <a:pPr algn="l"/>
+              <a:r>
+                <a:rPr lang="en-US" sz="3600" b="1" dirty="0" smtClean="0">
+                  <a:latin typeface="Courier New"/>
+                  <a:cs typeface="Courier New"/>
+                </a:rPr>
+                <a:t>0</a:t>
+              </a:r>
+              <a:endParaRPr lang="en-US" sz="3600" b="1" baseline="-25000" dirty="0">
+                <a:latin typeface="Courier New"/>
+                <a:cs typeface="Courier New"/>
+              </a:endParaRPr>
+            </a:p>
+          </p:txBody>
+        </p:sp>
+        <p:sp>
+          <p:nvSpPr>
+            <p:cNvPr id="163" name="TextBox 162"/>
+            <p:cNvSpPr txBox="1"/>
+            <p:nvPr/>
+          </p:nvSpPr>
+          <p:spPr>
+            <a:xfrm>
+              <a:off x="4597400" y="2362200"/>
+              <a:ext cx="461710" cy="646331"/>
+            </a:xfrm>
+            <a:prstGeom prst="rect">
+              <a:avLst/>
+            </a:prstGeom>
+            <a:noFill/>
+          </p:spPr>
+          <p:txBody>
+            <a:bodyPr wrap="none" rtlCol="0">
+              <a:spAutoFit/>
+            </a:bodyPr>
+            <a:lstStyle/>
+            <a:p>
+              <a:pPr lvl="0" algn="l"/>
+              <a:r>
+                <a:rPr lang="en-US" sz="3600" b="1" dirty="0">
+                  <a:solidFill>
+                    <a:srgbClr val="000000"/>
+                  </a:solidFill>
+                  <a:latin typeface="Courier New"/>
+                  <a:cs typeface="Courier New"/>
+                </a:rPr>
+                <a:t>1</a:t>
+              </a:r>
+              <a:endParaRPr lang="en-US" sz="3600" b="1" baseline="-25000" dirty="0">
+                <a:solidFill>
+                  <a:srgbClr val="000000"/>
+                </a:solidFill>
+                <a:latin typeface="Courier New"/>
+                <a:cs typeface="Courier New"/>
+              </a:endParaRPr>
+            </a:p>
+          </p:txBody>
+        </p:sp>
+        <p:sp>
+          <p:nvSpPr>
+            <p:cNvPr id="164" name="TextBox 163"/>
+            <p:cNvSpPr txBox="1"/>
+            <p:nvPr/>
+          </p:nvSpPr>
+          <p:spPr>
+            <a:xfrm>
+              <a:off x="3454400" y="2374900"/>
+              <a:ext cx="461710" cy="646331"/>
+            </a:xfrm>
+            <a:prstGeom prst="rect">
+              <a:avLst/>
+            </a:prstGeom>
+            <a:noFill/>
+          </p:spPr>
+          <p:txBody>
+            <a:bodyPr wrap="none" rtlCol="0">
+              <a:spAutoFit/>
+            </a:bodyPr>
+            <a:lstStyle/>
+            <a:p>
+              <a:pPr lvl="0" algn="l"/>
+              <a:r>
+                <a:rPr lang="en-US" sz="3600" b="1" dirty="0">
+                  <a:solidFill>
+                    <a:srgbClr val="000000"/>
+                  </a:solidFill>
+                  <a:latin typeface="Courier New"/>
+                  <a:cs typeface="Courier New"/>
+                </a:rPr>
+                <a:t>1</a:t>
+              </a:r>
+              <a:endParaRPr lang="en-US" sz="3600" b="1" baseline="-25000" dirty="0">
+                <a:solidFill>
+                  <a:srgbClr val="000000"/>
+                </a:solidFill>
+                <a:latin typeface="Courier New"/>
+                <a:cs typeface="Courier New"/>
+              </a:endParaRPr>
+            </a:p>
+          </p:txBody>
+        </p:sp>
+        <p:sp>
+          <p:nvSpPr>
+            <p:cNvPr id="165" name="TextBox 164"/>
+            <p:cNvSpPr txBox="1"/>
+            <p:nvPr/>
+          </p:nvSpPr>
+          <p:spPr>
+            <a:xfrm>
+              <a:off x="2159000" y="2374900"/>
+              <a:ext cx="461710" cy="646331"/>
+            </a:xfrm>
+            <a:prstGeom prst="rect">
+              <a:avLst/>
+            </a:prstGeom>
+            <a:noFill/>
+          </p:spPr>
+          <p:txBody>
+            <a:bodyPr wrap="none" rtlCol="0">
+              <a:spAutoFit/>
+            </a:bodyPr>
+            <a:lstStyle/>
+            <a:p>
+              <a:pPr lvl="0" algn="l"/>
+              <a:r>
+                <a:rPr lang="en-US" sz="3600" b="1" dirty="0">
+                  <a:solidFill>
+                    <a:srgbClr val="000000"/>
+                  </a:solidFill>
+                  <a:latin typeface="Courier New"/>
+                  <a:cs typeface="Courier New"/>
+                </a:rPr>
+                <a:t>1</a:t>
+              </a:r>
+              <a:endParaRPr lang="en-US" sz="3600" b="1" baseline="-25000" dirty="0">
+                <a:solidFill>
+                  <a:srgbClr val="000000"/>
+                </a:solidFill>
+                <a:latin typeface="Courier New"/>
+                <a:cs typeface="Courier New"/>
+              </a:endParaRPr>
+            </a:p>
+          </p:txBody>
+        </p:sp>
+        <p:sp>
+          <p:nvSpPr>
+            <p:cNvPr id="166" name="TextBox 165"/>
+            <p:cNvSpPr txBox="1"/>
+            <p:nvPr/>
+          </p:nvSpPr>
+          <p:spPr>
+            <a:xfrm>
+              <a:off x="889000" y="2387600"/>
+              <a:ext cx="461710" cy="646331"/>
+            </a:xfrm>
+            <a:prstGeom prst="rect">
+              <a:avLst/>
+            </a:prstGeom>
+            <a:noFill/>
+          </p:spPr>
+          <p:txBody>
+            <a:bodyPr wrap="none" rtlCol="0">
+              <a:spAutoFit/>
+            </a:bodyPr>
+            <a:lstStyle/>
+            <a:p>
+              <a:pPr algn="l"/>
+              <a:r>
+                <a:rPr lang="en-US" sz="3600" b="1" dirty="0" smtClean="0">
+                  <a:latin typeface="Courier New"/>
+                  <a:cs typeface="Courier New"/>
+                </a:rPr>
+                <a:t>0</a:t>
+              </a:r>
+              <a:endParaRPr lang="en-US" sz="3600" b="1" baseline="-25000" dirty="0">
+                <a:latin typeface="Courier New"/>
+                <a:cs typeface="Courier New"/>
+              </a:endParaRPr>
+            </a:p>
+          </p:txBody>
+        </p:sp>
+      </p:grpSp>
+      <p:grpSp>
+        <p:nvGrpSpPr>
+          <p:cNvPr id="66" name="Group 65"/>
+          <p:cNvGrpSpPr/>
+          <p:nvPr/>
+        </p:nvGrpSpPr>
+        <p:grpSpPr>
+          <a:xfrm>
+            <a:off x="889000" y="2387600"/>
+            <a:ext cx="6931897" cy="561320"/>
+            <a:chOff x="889000" y="2349500"/>
+            <a:chExt cx="6931897" cy="561320"/>
+          </a:xfrm>
+        </p:grpSpPr>
+        <p:sp>
+          <p:nvSpPr>
+            <p:cNvPr id="67" name="TextBox 66"/>
+            <p:cNvSpPr txBox="1"/>
+            <p:nvPr/>
+          </p:nvSpPr>
+          <p:spPr>
+            <a:xfrm>
+              <a:off x="7277100" y="2349500"/>
+              <a:ext cx="543797" cy="523220"/>
+            </a:xfrm>
+            <a:prstGeom prst="rect">
+              <a:avLst/>
+            </a:prstGeom>
+            <a:noFill/>
+          </p:spPr>
+          <p:txBody>
+            <a:bodyPr wrap="none" rtlCol="0">
+              <a:spAutoFit/>
+            </a:bodyPr>
+            <a:lstStyle/>
+            <a:p>
+              <a:pPr algn="l"/>
+              <a:r>
+                <a:rPr lang="en-US" sz="2800" dirty="0" smtClean="0">
+                  <a:latin typeface="Comic Sans MS" pitchFamily="66" charset="0"/>
+                </a:rPr>
+                <a:t>b</a:t>
+              </a:r>
+              <a:r>
+                <a:rPr lang="en-US" sz="2800" baseline="-25000" dirty="0" smtClean="0">
+                  <a:latin typeface="Comic Sans MS" pitchFamily="66" charset="0"/>
+                </a:rPr>
+                <a:t>0</a:t>
+              </a:r>
+              <a:endParaRPr lang="en-US" sz="2800" dirty="0" smtClean="0">
+                <a:latin typeface="Comic Sans MS" pitchFamily="66" charset="0"/>
+              </a:endParaRPr>
+            </a:p>
+          </p:txBody>
+        </p:sp>
+        <p:sp>
+          <p:nvSpPr>
+            <p:cNvPr id="68" name="TextBox 67"/>
+            <p:cNvSpPr txBox="1"/>
+            <p:nvPr/>
+          </p:nvSpPr>
+          <p:spPr>
+            <a:xfrm>
+              <a:off x="5905500" y="2349500"/>
+              <a:ext cx="505458" cy="523220"/>
+            </a:xfrm>
+            <a:prstGeom prst="rect">
+              <a:avLst/>
+            </a:prstGeom>
+            <a:noFill/>
+          </p:spPr>
+          <p:txBody>
+            <a:bodyPr wrap="none" rtlCol="0">
+              <a:spAutoFit/>
+            </a:bodyPr>
+            <a:lstStyle/>
+            <a:p>
+              <a:pPr algn="l"/>
+              <a:r>
+                <a:rPr lang="en-US" sz="2800" dirty="0" smtClean="0">
+                  <a:latin typeface="Comic Sans MS" pitchFamily="66" charset="0"/>
+                </a:rPr>
+                <a:t>b</a:t>
+              </a:r>
+              <a:r>
+                <a:rPr lang="en-US" sz="2800" baseline="-25000" dirty="0" smtClean="0">
+                  <a:latin typeface="Comic Sans MS" pitchFamily="66" charset="0"/>
+                </a:rPr>
+                <a:t>1</a:t>
+              </a:r>
+              <a:endParaRPr lang="en-US" sz="2800" dirty="0" smtClean="0">
+                <a:latin typeface="Comic Sans MS" pitchFamily="66" charset="0"/>
+              </a:endParaRPr>
+            </a:p>
+          </p:txBody>
+        </p:sp>
+        <p:sp>
+          <p:nvSpPr>
+            <p:cNvPr id="69" name="TextBox 68"/>
+            <p:cNvSpPr txBox="1"/>
+            <p:nvPr/>
+          </p:nvSpPr>
+          <p:spPr>
+            <a:xfrm>
+              <a:off x="4597400" y="2362200"/>
+              <a:ext cx="543797" cy="523220"/>
+            </a:xfrm>
+            <a:prstGeom prst="rect">
+              <a:avLst/>
+            </a:prstGeom>
+            <a:noFill/>
+          </p:spPr>
+          <p:txBody>
+            <a:bodyPr wrap="none" rtlCol="0">
+              <a:spAutoFit/>
+            </a:bodyPr>
+            <a:lstStyle/>
+            <a:p>
+              <a:pPr algn="l"/>
+              <a:r>
+                <a:rPr lang="en-US" sz="2800" dirty="0" smtClean="0">
+                  <a:latin typeface="Comic Sans MS" pitchFamily="66" charset="0"/>
+                </a:rPr>
+                <a:t>b</a:t>
+              </a:r>
+              <a:r>
+                <a:rPr lang="en-US" sz="2800" baseline="-25000" dirty="0" smtClean="0">
+                  <a:latin typeface="Comic Sans MS" pitchFamily="66" charset="0"/>
+                </a:rPr>
+                <a:t>2</a:t>
+              </a:r>
+              <a:endParaRPr lang="en-US" sz="2800" dirty="0" smtClean="0">
+                <a:latin typeface="Comic Sans MS" pitchFamily="66" charset="0"/>
+              </a:endParaRPr>
+            </a:p>
+          </p:txBody>
+        </p:sp>
+        <p:sp>
+          <p:nvSpPr>
+            <p:cNvPr id="70" name="TextBox 69"/>
+            <p:cNvSpPr txBox="1"/>
+            <p:nvPr/>
+          </p:nvSpPr>
+          <p:spPr>
+            <a:xfrm>
+              <a:off x="3454400" y="2374900"/>
+              <a:ext cx="543797" cy="523220"/>
+            </a:xfrm>
+            <a:prstGeom prst="rect">
+              <a:avLst/>
+            </a:prstGeom>
+            <a:noFill/>
+          </p:spPr>
+          <p:txBody>
+            <a:bodyPr wrap="none" rtlCol="0">
+              <a:spAutoFit/>
+            </a:bodyPr>
+            <a:lstStyle/>
+            <a:p>
+              <a:pPr algn="l"/>
+              <a:r>
+                <a:rPr lang="en-US" sz="2800" dirty="0" smtClean="0">
+                  <a:latin typeface="Comic Sans MS" pitchFamily="66" charset="0"/>
+                </a:rPr>
+                <a:t>b</a:t>
+              </a:r>
+              <a:r>
+                <a:rPr lang="en-US" sz="2800" baseline="-25000" dirty="0" smtClean="0">
+                  <a:latin typeface="Comic Sans MS" pitchFamily="66" charset="0"/>
+                </a:rPr>
+                <a:t>3</a:t>
+              </a:r>
+            </a:p>
+          </p:txBody>
+        </p:sp>
+        <p:sp>
+          <p:nvSpPr>
+            <p:cNvPr id="71" name="TextBox 70"/>
+            <p:cNvSpPr txBox="1"/>
+            <p:nvPr/>
+          </p:nvSpPr>
+          <p:spPr>
+            <a:xfrm>
+              <a:off x="2159000" y="2374900"/>
+              <a:ext cx="543797" cy="523220"/>
+            </a:xfrm>
+            <a:prstGeom prst="rect">
+              <a:avLst/>
+            </a:prstGeom>
+            <a:noFill/>
+          </p:spPr>
+          <p:txBody>
+            <a:bodyPr wrap="none" rtlCol="0">
+              <a:spAutoFit/>
+            </a:bodyPr>
+            <a:lstStyle/>
+            <a:p>
+              <a:pPr algn="l"/>
+              <a:r>
+                <a:rPr lang="en-US" sz="2800" dirty="0" smtClean="0">
+                  <a:latin typeface="Comic Sans MS" pitchFamily="66" charset="0"/>
+                </a:rPr>
+                <a:t>b</a:t>
+              </a:r>
+              <a:r>
+                <a:rPr lang="en-US" sz="2800" baseline="-25000" dirty="0" smtClean="0">
+                  <a:latin typeface="Comic Sans MS" pitchFamily="66" charset="0"/>
+                </a:rPr>
+                <a:t>4</a:t>
+              </a:r>
+              <a:endParaRPr lang="en-US" sz="2800" dirty="0" smtClean="0">
+                <a:latin typeface="Comic Sans MS" pitchFamily="66" charset="0"/>
+              </a:endParaRPr>
+            </a:p>
+          </p:txBody>
+        </p:sp>
+        <p:sp>
+          <p:nvSpPr>
+            <p:cNvPr id="72" name="TextBox 71"/>
+            <p:cNvSpPr txBox="1"/>
+            <p:nvPr/>
+          </p:nvSpPr>
+          <p:spPr>
+            <a:xfrm>
+              <a:off x="889000" y="2387600"/>
+              <a:ext cx="543797" cy="523220"/>
+            </a:xfrm>
+            <a:prstGeom prst="rect">
+              <a:avLst/>
+            </a:prstGeom>
+            <a:noFill/>
+          </p:spPr>
+          <p:txBody>
+            <a:bodyPr wrap="none" rtlCol="0">
+              <a:spAutoFit/>
+            </a:bodyPr>
+            <a:lstStyle/>
+            <a:p>
+              <a:pPr algn="l"/>
+              <a:r>
+                <a:rPr lang="en-US" sz="2800" dirty="0" smtClean="0">
+                  <a:latin typeface="Comic Sans MS" pitchFamily="66" charset="0"/>
+                </a:rPr>
+                <a:t>b</a:t>
+              </a:r>
+              <a:r>
+                <a:rPr lang="en-US" sz="2800" baseline="-25000" dirty="0" smtClean="0">
+                  <a:latin typeface="Comic Sans MS" pitchFamily="66" charset="0"/>
+                </a:rPr>
+                <a:t>5</a:t>
+              </a:r>
+            </a:p>
+          </p:txBody>
+        </p:sp>
+      </p:grpSp>
+      <p:grpSp>
+        <p:nvGrpSpPr>
+          <p:cNvPr id="15" name="Group 14"/>
+          <p:cNvGrpSpPr/>
+          <p:nvPr/>
+        </p:nvGrpSpPr>
+        <p:grpSpPr>
+          <a:xfrm>
+            <a:off x="1054100" y="3594100"/>
+            <a:ext cx="7099300" cy="685800"/>
+            <a:chOff x="1054100" y="3594100"/>
+            <a:chExt cx="7099300" cy="685800"/>
+          </a:xfrm>
+        </p:grpSpPr>
+        <p:sp>
+          <p:nvSpPr>
+            <p:cNvPr id="4" name="Rectangle 3"/>
+            <p:cNvSpPr/>
+            <p:nvPr/>
+          </p:nvSpPr>
+          <p:spPr bwMode="auto">
+            <a:xfrm>
+              <a:off x="7378700" y="3619500"/>
+              <a:ext cx="774700" cy="660400"/>
+            </a:xfrm>
+            <a:prstGeom prst="rect">
+              <a:avLst/>
+            </a:prstGeom>
+            <a:solidFill>
+              <a:schemeClr val="accent1"/>
+            </a:solidFill>
+            <a:ln w="9525" cap="flat" cmpd="sng" algn="ctr">
+              <a:solidFill>
+                <a:schemeClr val="tx1"/>
+              </a:solidFill>
+              <a:prstDash val="solid"/>
+              <a:round/>
+              <a:headEnd type="none" w="med" len="med"/>
+              <a:tailEnd type="none" w="med" len="med"/>
+            </a:ln>
+            <a:effectLst/>
+          </p:spPr>
+          <p:txBody>
+            <a:bodyPr vert="horz" wrap="none" lIns="91440" tIns="45720" rIns="91440" bIns="45720" numCol="1" rtlCol="0" anchor="ctr" anchorCtr="0" compatLnSpc="1">
+              <a:prstTxWarp prst="textNoShape">
+                <a:avLst/>
+              </a:prstTxWarp>
+            </a:bodyPr>
+            <a:lstStyle/>
+            <a:p>
+              <a:pPr marL="0" marR="0" indent="0" algn="ctr" defTabSz="914400" rtl="0" eaLnBrk="1" fontAlgn="base" latinLnBrk="0" hangingPunct="1">
+                <a:lnSpc>
+                  <a:spcPct val="100000"/>
+                </a:lnSpc>
+                <a:spcBef>
+                  <a:spcPct val="0"/>
+                </a:spcBef>
+                <a:spcAft>
+                  <a:spcPct val="0"/>
+                </a:spcAft>
+                <a:buClrTx/>
+                <a:buSzTx/>
+                <a:buFontTx/>
+                <a:buNone/>
+                <a:tabLst/>
+              </a:pPr>
+              <a:endParaRPr kumimoji="0" lang="en-US" sz="3200" b="0" i="0" u="none" strike="noStrike" cap="none" normalizeH="0" baseline="0" smtClean="0">
+                <a:ln>
+                  <a:noFill/>
+                </a:ln>
+                <a:solidFill>
+                  <a:schemeClr val="tx1"/>
+                </a:solidFill>
+                <a:effectLst/>
+                <a:latin typeface="Times New Roman" pitchFamily="18" charset="0"/>
+              </a:endParaRPr>
+            </a:p>
+          </p:txBody>
+        </p:sp>
+        <p:sp>
+          <p:nvSpPr>
+            <p:cNvPr id="20" name="Rectangle 19"/>
+            <p:cNvSpPr/>
+            <p:nvPr/>
+          </p:nvSpPr>
+          <p:spPr bwMode="auto">
+            <a:xfrm>
+              <a:off x="6134100" y="3594100"/>
+              <a:ext cx="774700" cy="660400"/>
+            </a:xfrm>
+            <a:prstGeom prst="rect">
+              <a:avLst/>
+            </a:prstGeom>
+            <a:solidFill>
+              <a:schemeClr val="accent1"/>
+            </a:solidFill>
+            <a:ln w="9525" cap="flat" cmpd="sng" algn="ctr">
+              <a:solidFill>
+                <a:schemeClr val="tx1"/>
+              </a:solidFill>
+              <a:prstDash val="solid"/>
+              <a:round/>
+              <a:headEnd type="none" w="med" len="med"/>
+              <a:tailEnd type="none" w="med" len="med"/>
+            </a:ln>
+            <a:effectLst/>
+          </p:spPr>
+          <p:txBody>
+            <a:bodyPr vert="horz" wrap="none" lIns="91440" tIns="45720" rIns="91440" bIns="45720" numCol="1" rtlCol="0" anchor="ctr" anchorCtr="0" compatLnSpc="1">
+              <a:prstTxWarp prst="textNoShape">
+                <a:avLst/>
+              </a:prstTxWarp>
+            </a:bodyPr>
+            <a:lstStyle/>
+            <a:p>
+              <a:pPr marL="0" marR="0" indent="0" algn="ctr" defTabSz="914400" rtl="0" eaLnBrk="1" fontAlgn="base" latinLnBrk="0" hangingPunct="1">
+                <a:lnSpc>
+                  <a:spcPct val="100000"/>
+                </a:lnSpc>
+                <a:spcBef>
+                  <a:spcPct val="0"/>
+                </a:spcBef>
+                <a:spcAft>
+                  <a:spcPct val="0"/>
+                </a:spcAft>
+                <a:buClrTx/>
+                <a:buSzTx/>
+                <a:buFontTx/>
+                <a:buNone/>
+                <a:tabLst/>
+              </a:pPr>
+              <a:endParaRPr kumimoji="0" lang="en-US" sz="3200" b="0" i="0" u="none" strike="noStrike" cap="none" normalizeH="0" baseline="0" smtClean="0">
+                <a:ln>
+                  <a:noFill/>
+                </a:ln>
+                <a:solidFill>
+                  <a:schemeClr val="tx1"/>
+                </a:solidFill>
+                <a:effectLst/>
+                <a:latin typeface="Times New Roman" pitchFamily="18" charset="0"/>
+              </a:endParaRPr>
+            </a:p>
+          </p:txBody>
+        </p:sp>
+        <p:sp>
+          <p:nvSpPr>
+            <p:cNvPr id="85" name="Rectangle 84"/>
+            <p:cNvSpPr/>
+            <p:nvPr/>
+          </p:nvSpPr>
+          <p:spPr bwMode="auto">
+            <a:xfrm>
+              <a:off x="4826000" y="3594100"/>
+              <a:ext cx="774700" cy="660400"/>
+            </a:xfrm>
+            <a:prstGeom prst="rect">
+              <a:avLst/>
+            </a:prstGeom>
+            <a:solidFill>
+              <a:schemeClr val="accent1"/>
+            </a:solidFill>
+            <a:ln w="9525" cap="flat" cmpd="sng" algn="ctr">
+              <a:solidFill>
+                <a:schemeClr val="tx1"/>
+              </a:solidFill>
+              <a:prstDash val="solid"/>
+              <a:round/>
+              <a:headEnd type="none" w="med" len="med"/>
+              <a:tailEnd type="none" w="med" len="med"/>
+            </a:ln>
+            <a:effectLst/>
+          </p:spPr>
+          <p:txBody>
+            <a:bodyPr vert="horz" wrap="none" lIns="91440" tIns="45720" rIns="91440" bIns="45720" numCol="1" rtlCol="0" anchor="ctr" anchorCtr="0" compatLnSpc="1">
+              <a:prstTxWarp prst="textNoShape">
+                <a:avLst/>
+              </a:prstTxWarp>
+            </a:bodyPr>
+            <a:lstStyle/>
+            <a:p>
+              <a:pPr marL="0" marR="0" indent="0" algn="ctr" defTabSz="914400" rtl="0" eaLnBrk="1" fontAlgn="base" latinLnBrk="0" hangingPunct="1">
+                <a:lnSpc>
+                  <a:spcPct val="100000"/>
+                </a:lnSpc>
+                <a:spcBef>
+                  <a:spcPct val="0"/>
+                </a:spcBef>
+                <a:spcAft>
+                  <a:spcPct val="0"/>
+                </a:spcAft>
+                <a:buClrTx/>
+                <a:buSzTx/>
+                <a:buFontTx/>
+                <a:buNone/>
+                <a:tabLst/>
+              </a:pPr>
+              <a:endParaRPr kumimoji="0" lang="en-US" sz="3200" b="0" i="0" u="none" strike="noStrike" cap="none" normalizeH="0" baseline="0" smtClean="0">
+                <a:ln>
+                  <a:noFill/>
+                </a:ln>
+                <a:solidFill>
+                  <a:schemeClr val="tx1"/>
+                </a:solidFill>
+                <a:effectLst/>
+                <a:latin typeface="Times New Roman" pitchFamily="18" charset="0"/>
+              </a:endParaRPr>
+            </a:p>
+          </p:txBody>
+        </p:sp>
+        <p:sp>
+          <p:nvSpPr>
+            <p:cNvPr id="109" name="Rectangle 108"/>
+            <p:cNvSpPr/>
+            <p:nvPr/>
+          </p:nvSpPr>
+          <p:spPr bwMode="auto">
+            <a:xfrm>
+              <a:off x="3644900" y="3594100"/>
+              <a:ext cx="774700" cy="660400"/>
+            </a:xfrm>
+            <a:prstGeom prst="rect">
+              <a:avLst/>
+            </a:prstGeom>
+            <a:solidFill>
+              <a:schemeClr val="accent1"/>
+            </a:solidFill>
+            <a:ln w="9525" cap="flat" cmpd="sng" algn="ctr">
+              <a:solidFill>
+                <a:schemeClr val="tx1"/>
+              </a:solidFill>
+              <a:prstDash val="solid"/>
+              <a:round/>
+              <a:headEnd type="none" w="med" len="med"/>
+              <a:tailEnd type="none" w="med" len="med"/>
+            </a:ln>
+            <a:effectLst/>
+          </p:spPr>
+          <p:txBody>
+            <a:bodyPr vert="horz" wrap="none" lIns="91440" tIns="45720" rIns="91440" bIns="45720" numCol="1" rtlCol="0" anchor="ctr" anchorCtr="0" compatLnSpc="1">
+              <a:prstTxWarp prst="textNoShape">
+                <a:avLst/>
+              </a:prstTxWarp>
+            </a:bodyPr>
+            <a:lstStyle/>
+            <a:p>
+              <a:pPr marL="0" marR="0" indent="0" algn="ctr" defTabSz="914400" rtl="0" eaLnBrk="1" fontAlgn="base" latinLnBrk="0" hangingPunct="1">
+                <a:lnSpc>
+                  <a:spcPct val="100000"/>
+                </a:lnSpc>
+                <a:spcBef>
+                  <a:spcPct val="0"/>
+                </a:spcBef>
+                <a:spcAft>
+                  <a:spcPct val="0"/>
+                </a:spcAft>
+                <a:buClrTx/>
+                <a:buSzTx/>
+                <a:buFontTx/>
+                <a:buNone/>
+                <a:tabLst/>
+              </a:pPr>
+              <a:endParaRPr kumimoji="0" lang="en-US" sz="3200" b="0" i="0" u="none" strike="noStrike" cap="none" normalizeH="0" baseline="0" smtClean="0">
+                <a:ln>
+                  <a:noFill/>
+                </a:ln>
+                <a:solidFill>
+                  <a:schemeClr val="tx1"/>
+                </a:solidFill>
+                <a:effectLst/>
+                <a:latin typeface="Times New Roman" pitchFamily="18" charset="0"/>
+              </a:endParaRPr>
+            </a:p>
+          </p:txBody>
+        </p:sp>
+        <p:sp>
+          <p:nvSpPr>
+            <p:cNvPr id="99" name="Rectangle 98"/>
+            <p:cNvSpPr/>
+            <p:nvPr/>
+          </p:nvSpPr>
+          <p:spPr bwMode="auto">
+            <a:xfrm>
+              <a:off x="2336800" y="3594100"/>
+              <a:ext cx="774700" cy="660400"/>
+            </a:xfrm>
+            <a:prstGeom prst="rect">
+              <a:avLst/>
+            </a:prstGeom>
+            <a:solidFill>
+              <a:schemeClr val="accent1"/>
+            </a:solidFill>
+            <a:ln w="9525" cap="flat" cmpd="sng" algn="ctr">
+              <a:solidFill>
+                <a:schemeClr val="tx1"/>
+              </a:solidFill>
+              <a:prstDash val="solid"/>
+              <a:round/>
+              <a:headEnd type="none" w="med" len="med"/>
+              <a:tailEnd type="none" w="med" len="med"/>
+            </a:ln>
+            <a:effectLst/>
+          </p:spPr>
+          <p:txBody>
+            <a:bodyPr vert="horz" wrap="none" lIns="91440" tIns="45720" rIns="91440" bIns="45720" numCol="1" rtlCol="0" anchor="ctr" anchorCtr="0" compatLnSpc="1">
+              <a:prstTxWarp prst="textNoShape">
+                <a:avLst/>
+              </a:prstTxWarp>
+            </a:bodyPr>
+            <a:lstStyle/>
+            <a:p>
+              <a:pPr marL="0" marR="0" indent="0" algn="ctr" defTabSz="914400" rtl="0" eaLnBrk="1" fontAlgn="base" latinLnBrk="0" hangingPunct="1">
+                <a:lnSpc>
+                  <a:spcPct val="100000"/>
+                </a:lnSpc>
+                <a:spcBef>
+                  <a:spcPct val="0"/>
+                </a:spcBef>
+                <a:spcAft>
+                  <a:spcPct val="0"/>
+                </a:spcAft>
+                <a:buClrTx/>
+                <a:buSzTx/>
+                <a:buFontTx/>
+                <a:buNone/>
+                <a:tabLst/>
+              </a:pPr>
+              <a:endParaRPr kumimoji="0" lang="en-US" sz="3200" b="0" i="0" u="none" strike="noStrike" cap="none" normalizeH="0" baseline="0" smtClean="0">
+                <a:ln>
+                  <a:noFill/>
+                </a:ln>
+                <a:solidFill>
+                  <a:schemeClr val="tx1"/>
+                </a:solidFill>
+                <a:effectLst/>
+                <a:latin typeface="Times New Roman" pitchFamily="18" charset="0"/>
+              </a:endParaRPr>
+            </a:p>
+          </p:txBody>
+        </p:sp>
+        <p:sp>
+          <p:nvSpPr>
+            <p:cNvPr id="132" name="Rectangle 131"/>
+            <p:cNvSpPr/>
+            <p:nvPr/>
+          </p:nvSpPr>
+          <p:spPr bwMode="auto">
+            <a:xfrm>
+              <a:off x="1054100" y="3594100"/>
+              <a:ext cx="774700" cy="660400"/>
+            </a:xfrm>
+            <a:prstGeom prst="rect">
+              <a:avLst/>
+            </a:prstGeom>
+            <a:solidFill>
+              <a:schemeClr val="accent1"/>
+            </a:solidFill>
+            <a:ln w="9525" cap="flat" cmpd="sng" algn="ctr">
+              <a:solidFill>
+                <a:schemeClr val="tx1"/>
+              </a:solidFill>
+              <a:prstDash val="solid"/>
+              <a:round/>
+              <a:headEnd type="none" w="med" len="med"/>
+              <a:tailEnd type="none" w="med" len="med"/>
+            </a:ln>
+            <a:effectLst/>
+          </p:spPr>
+          <p:txBody>
+            <a:bodyPr vert="horz" wrap="none" lIns="91440" tIns="45720" rIns="91440" bIns="45720" numCol="1" rtlCol="0" anchor="ctr" anchorCtr="0" compatLnSpc="1">
+              <a:prstTxWarp prst="textNoShape">
+                <a:avLst/>
+              </a:prstTxWarp>
+            </a:bodyPr>
+            <a:lstStyle/>
+            <a:p>
+              <a:pPr marL="0" marR="0" indent="0" algn="ctr" defTabSz="914400" rtl="0" eaLnBrk="1" fontAlgn="base" latinLnBrk="0" hangingPunct="1">
+                <a:lnSpc>
+                  <a:spcPct val="100000"/>
+                </a:lnSpc>
+                <a:spcBef>
+                  <a:spcPct val="0"/>
+                </a:spcBef>
+                <a:spcAft>
+                  <a:spcPct val="0"/>
+                </a:spcAft>
+                <a:buClrTx/>
+                <a:buSzTx/>
+                <a:buFontTx/>
+                <a:buNone/>
+                <a:tabLst/>
+              </a:pPr>
+              <a:endParaRPr kumimoji="0" lang="en-US" sz="3200" b="0" i="0" u="none" strike="noStrike" cap="none" normalizeH="0" baseline="0" smtClean="0">
+                <a:ln>
+                  <a:noFill/>
+                </a:ln>
+                <a:solidFill>
+                  <a:schemeClr val="tx1"/>
+                </a:solidFill>
+                <a:effectLst/>
+                <a:latin typeface="Times New Roman" pitchFamily="18" charset="0"/>
+              </a:endParaRPr>
+            </a:p>
+          </p:txBody>
+        </p:sp>
+      </p:grpSp>
+      <p:sp>
+        <p:nvSpPr>
+          <p:cNvPr id="2" name="Title 1"/>
+          <p:cNvSpPr>
+            <a:spLocks noGrp="1"/>
+          </p:cNvSpPr>
+          <p:nvPr>
+            <p:ph type="title"/>
+          </p:nvPr>
+        </p:nvSpPr>
+        <p:spPr>
+          <a:xfrm>
+            <a:off x="2209800" y="203200"/>
+            <a:ext cx="6007100" cy="1066800"/>
+          </a:xfrm>
+        </p:spPr>
+        <p:txBody>
+          <a:bodyPr/>
+          <a:lstStyle/>
+          <a:p>
+            <a:r>
+              <a:rPr lang="en-US" dirty="0" smtClean="0"/>
+              <a:t>Binary addition circuit</a:t>
+            </a:r>
+            <a:endParaRPr lang="en-US" dirty="0"/>
+          </a:p>
+        </p:txBody>
+      </p:sp>
+      <p:sp>
+        <p:nvSpPr>
+          <p:cNvPr id="3" name="Slide Number Placeholder 2"/>
+          <p:cNvSpPr>
+            <a:spLocks noGrp="1"/>
+          </p:cNvSpPr>
+          <p:nvPr>
+            <p:ph type="sldNum" sz="quarter" idx="10"/>
+          </p:nvPr>
+        </p:nvSpPr>
+        <p:spPr>
+          <a:xfrm>
+            <a:off x="8375344" y="6553200"/>
+            <a:ext cx="768660" cy="276999"/>
+          </a:xfrm>
+        </p:spPr>
+        <p:txBody>
+          <a:bodyPr/>
+          <a:lstStyle/>
+          <a:p>
+            <a:pPr>
+              <a:defRPr/>
+            </a:pPr>
+            <a:r>
+              <a:rPr lang="en-US" dirty="0" smtClean="0">
+                <a:solidFill>
+                  <a:srgbClr val="000000"/>
+                </a:solidFill>
+              </a:rPr>
+              <a:t>digital.</a:t>
+            </a:r>
+            <a:fld id="{DB6F0ED6-FEF5-4C9C-B1CC-29B47EC66FAA}" type="slidenum">
+              <a:rPr lang="en-US" smtClean="0">
+                <a:solidFill>
+                  <a:srgbClr val="000000"/>
+                </a:solidFill>
+              </a:rPr>
+              <a:pPr>
+                <a:defRPr/>
+              </a:pPr>
+              <a:t>6</a:t>
+            </a:fld>
+            <a:endParaRPr lang="en-US" dirty="0">
+              <a:solidFill>
+                <a:srgbClr val="000000"/>
+              </a:solidFill>
+            </a:endParaRPr>
+          </a:p>
+        </p:txBody>
+      </p:sp>
+      <p:grpSp>
+        <p:nvGrpSpPr>
+          <p:cNvPr id="16" name="Group 15"/>
+          <p:cNvGrpSpPr/>
+          <p:nvPr/>
+        </p:nvGrpSpPr>
+        <p:grpSpPr>
+          <a:xfrm>
+            <a:off x="1168400" y="2933700"/>
+            <a:ext cx="6451600" cy="673100"/>
+            <a:chOff x="1168400" y="2933700"/>
+            <a:chExt cx="6451600" cy="673100"/>
+          </a:xfrm>
+        </p:grpSpPr>
+        <p:cxnSp>
+          <p:nvCxnSpPr>
+            <p:cNvPr id="6" name="Straight Connector 5"/>
+            <p:cNvCxnSpPr/>
+            <p:nvPr/>
+          </p:nvCxnSpPr>
+          <p:spPr bwMode="auto">
+            <a:xfrm>
+              <a:off x="7620000" y="2959100"/>
+              <a:ext cx="0" cy="647700"/>
+            </a:xfrm>
+            <a:prstGeom prst="line">
+              <a:avLst/>
+            </a:prstGeom>
+            <a:solidFill>
+              <a:schemeClr val="accent1"/>
+            </a:solidFill>
+            <a:ln w="9525" cap="flat" cmpd="sng" algn="ctr">
+              <a:solidFill>
+                <a:schemeClr val="tx1"/>
+              </a:solidFill>
+              <a:prstDash val="solid"/>
+              <a:round/>
+              <a:headEnd type="none" w="med" len="med"/>
+              <a:tailEnd type="none" w="med" len="med"/>
+            </a:ln>
+            <a:effectLst/>
+          </p:spPr>
+        </p:cxnSp>
+        <p:cxnSp>
+          <p:nvCxnSpPr>
+            <p:cNvPr id="21" name="Straight Connector 20"/>
+            <p:cNvCxnSpPr/>
+            <p:nvPr/>
+          </p:nvCxnSpPr>
+          <p:spPr bwMode="auto">
+            <a:xfrm>
+              <a:off x="6248400" y="2933700"/>
+              <a:ext cx="0" cy="647700"/>
+            </a:xfrm>
+            <a:prstGeom prst="line">
+              <a:avLst/>
+            </a:prstGeom>
+            <a:solidFill>
+              <a:schemeClr val="accent1"/>
+            </a:solidFill>
+            <a:ln w="9525" cap="flat" cmpd="sng" algn="ctr">
+              <a:solidFill>
+                <a:schemeClr val="tx1"/>
+              </a:solidFill>
+              <a:prstDash val="solid"/>
+              <a:round/>
+              <a:headEnd type="none" w="med" len="med"/>
+              <a:tailEnd type="none" w="med" len="med"/>
+            </a:ln>
+            <a:effectLst/>
+          </p:spPr>
+        </p:cxnSp>
+        <p:cxnSp>
+          <p:nvCxnSpPr>
+            <p:cNvPr id="86" name="Straight Connector 85"/>
+            <p:cNvCxnSpPr/>
+            <p:nvPr/>
+          </p:nvCxnSpPr>
+          <p:spPr bwMode="auto">
+            <a:xfrm>
+              <a:off x="4940300" y="2933700"/>
+              <a:ext cx="0" cy="647700"/>
+            </a:xfrm>
+            <a:prstGeom prst="line">
+              <a:avLst/>
+            </a:prstGeom>
+            <a:solidFill>
+              <a:schemeClr val="accent1"/>
+            </a:solidFill>
+            <a:ln w="9525" cap="flat" cmpd="sng" algn="ctr">
+              <a:solidFill>
+                <a:schemeClr val="tx1"/>
+              </a:solidFill>
+              <a:prstDash val="solid"/>
+              <a:round/>
+              <a:headEnd type="none" w="med" len="med"/>
+              <a:tailEnd type="none" w="med" len="med"/>
+            </a:ln>
+            <a:effectLst/>
+          </p:spPr>
+        </p:cxnSp>
+        <p:cxnSp>
+          <p:nvCxnSpPr>
+            <p:cNvPr id="110" name="Straight Connector 109"/>
+            <p:cNvCxnSpPr/>
+            <p:nvPr/>
+          </p:nvCxnSpPr>
+          <p:spPr bwMode="auto">
+            <a:xfrm>
+              <a:off x="3759200" y="2933700"/>
+              <a:ext cx="0" cy="647700"/>
+            </a:xfrm>
+            <a:prstGeom prst="line">
+              <a:avLst/>
+            </a:prstGeom>
+            <a:solidFill>
+              <a:schemeClr val="accent1"/>
+            </a:solidFill>
+            <a:ln w="9525" cap="flat" cmpd="sng" algn="ctr">
+              <a:solidFill>
+                <a:schemeClr val="tx1"/>
+              </a:solidFill>
+              <a:prstDash val="solid"/>
+              <a:round/>
+              <a:headEnd type="none" w="med" len="med"/>
+              <a:tailEnd type="none" w="med" len="med"/>
+            </a:ln>
+            <a:effectLst/>
+          </p:spPr>
+        </p:cxnSp>
+        <p:cxnSp>
+          <p:nvCxnSpPr>
+            <p:cNvPr id="100" name="Straight Connector 99"/>
+            <p:cNvCxnSpPr/>
+            <p:nvPr/>
+          </p:nvCxnSpPr>
+          <p:spPr bwMode="auto">
+            <a:xfrm>
+              <a:off x="2451100" y="2933700"/>
+              <a:ext cx="0" cy="647700"/>
+            </a:xfrm>
+            <a:prstGeom prst="line">
+              <a:avLst/>
+            </a:prstGeom>
+            <a:solidFill>
+              <a:schemeClr val="accent1"/>
+            </a:solidFill>
+            <a:ln w="9525" cap="flat" cmpd="sng" algn="ctr">
+              <a:solidFill>
+                <a:schemeClr val="tx1"/>
+              </a:solidFill>
+              <a:prstDash val="solid"/>
+              <a:round/>
+              <a:headEnd type="none" w="med" len="med"/>
+              <a:tailEnd type="none" w="med" len="med"/>
+            </a:ln>
+            <a:effectLst/>
+          </p:spPr>
+        </p:cxnSp>
+        <p:cxnSp>
+          <p:nvCxnSpPr>
+            <p:cNvPr id="133" name="Straight Connector 132"/>
+            <p:cNvCxnSpPr/>
+            <p:nvPr/>
+          </p:nvCxnSpPr>
+          <p:spPr bwMode="auto">
+            <a:xfrm>
+              <a:off x="1168400" y="2933700"/>
+              <a:ext cx="0" cy="647700"/>
+            </a:xfrm>
+            <a:prstGeom prst="line">
+              <a:avLst/>
+            </a:prstGeom>
+            <a:solidFill>
+              <a:schemeClr val="accent1"/>
+            </a:solidFill>
+            <a:ln w="9525" cap="flat" cmpd="sng" algn="ctr">
+              <a:solidFill>
+                <a:schemeClr val="tx1"/>
+              </a:solidFill>
+              <a:prstDash val="solid"/>
+              <a:round/>
+              <a:headEnd type="none" w="med" len="med"/>
+              <a:tailEnd type="none" w="med" len="med"/>
+            </a:ln>
+            <a:effectLst/>
+          </p:spPr>
+        </p:cxnSp>
+      </p:grpSp>
+      <p:grpSp>
+        <p:nvGrpSpPr>
+          <p:cNvPr id="11" name="Group 10"/>
+          <p:cNvGrpSpPr/>
+          <p:nvPr/>
+        </p:nvGrpSpPr>
+        <p:grpSpPr>
+          <a:xfrm>
+            <a:off x="1447800" y="2120900"/>
+            <a:ext cx="6451600" cy="1511300"/>
+            <a:chOff x="1447800" y="2095500"/>
+            <a:chExt cx="6451600" cy="1511300"/>
+          </a:xfrm>
+        </p:grpSpPr>
+        <p:cxnSp>
+          <p:nvCxnSpPr>
+            <p:cNvPr id="7" name="Straight Connector 6"/>
+            <p:cNvCxnSpPr/>
+            <p:nvPr/>
+          </p:nvCxnSpPr>
+          <p:spPr bwMode="auto">
+            <a:xfrm>
+              <a:off x="7899400" y="2120900"/>
+              <a:ext cx="0" cy="1485900"/>
+            </a:xfrm>
+            <a:prstGeom prst="line">
+              <a:avLst/>
+            </a:prstGeom>
+            <a:solidFill>
+              <a:schemeClr val="accent1"/>
+            </a:solidFill>
+            <a:ln w="9525" cap="flat" cmpd="sng" algn="ctr">
+              <a:solidFill>
+                <a:schemeClr val="tx1"/>
+              </a:solidFill>
+              <a:prstDash val="solid"/>
+              <a:round/>
+              <a:headEnd type="none" w="med" len="med"/>
+              <a:tailEnd type="none" w="med" len="med"/>
+            </a:ln>
+            <a:effectLst/>
+          </p:spPr>
+        </p:cxnSp>
+        <p:cxnSp>
+          <p:nvCxnSpPr>
+            <p:cNvPr id="22" name="Straight Connector 21"/>
+            <p:cNvCxnSpPr/>
+            <p:nvPr/>
+          </p:nvCxnSpPr>
+          <p:spPr bwMode="auto">
+            <a:xfrm>
+              <a:off x="6527800" y="2095500"/>
+              <a:ext cx="0" cy="1485900"/>
+            </a:xfrm>
+            <a:prstGeom prst="line">
+              <a:avLst/>
+            </a:prstGeom>
+            <a:solidFill>
+              <a:schemeClr val="accent1"/>
+            </a:solidFill>
+            <a:ln w="9525" cap="flat" cmpd="sng" algn="ctr">
+              <a:solidFill>
+                <a:schemeClr val="tx1"/>
+              </a:solidFill>
+              <a:prstDash val="solid"/>
+              <a:round/>
+              <a:headEnd type="none" w="med" len="med"/>
+              <a:tailEnd type="none" w="med" len="med"/>
+            </a:ln>
+            <a:effectLst/>
+          </p:spPr>
+        </p:cxnSp>
+        <p:cxnSp>
+          <p:nvCxnSpPr>
+            <p:cNvPr id="87" name="Straight Connector 86"/>
+            <p:cNvCxnSpPr/>
+            <p:nvPr/>
+          </p:nvCxnSpPr>
+          <p:spPr bwMode="auto">
+            <a:xfrm>
+              <a:off x="5219700" y="2095500"/>
+              <a:ext cx="0" cy="1485900"/>
+            </a:xfrm>
+            <a:prstGeom prst="line">
+              <a:avLst/>
+            </a:prstGeom>
+            <a:solidFill>
+              <a:schemeClr val="accent1"/>
+            </a:solidFill>
+            <a:ln w="9525" cap="flat" cmpd="sng" algn="ctr">
+              <a:solidFill>
+                <a:schemeClr val="tx1"/>
+              </a:solidFill>
+              <a:prstDash val="solid"/>
+              <a:round/>
+              <a:headEnd type="none" w="med" len="med"/>
+              <a:tailEnd type="none" w="med" len="med"/>
+            </a:ln>
+            <a:effectLst/>
+          </p:spPr>
+        </p:cxnSp>
+        <p:cxnSp>
+          <p:nvCxnSpPr>
+            <p:cNvPr id="111" name="Straight Connector 110"/>
+            <p:cNvCxnSpPr/>
+            <p:nvPr/>
+          </p:nvCxnSpPr>
+          <p:spPr bwMode="auto">
+            <a:xfrm>
+              <a:off x="4038600" y="2095500"/>
+              <a:ext cx="0" cy="1485900"/>
+            </a:xfrm>
+            <a:prstGeom prst="line">
+              <a:avLst/>
+            </a:prstGeom>
+            <a:solidFill>
+              <a:schemeClr val="accent1"/>
+            </a:solidFill>
+            <a:ln w="9525" cap="flat" cmpd="sng" algn="ctr">
+              <a:solidFill>
+                <a:schemeClr val="tx1"/>
+              </a:solidFill>
+              <a:prstDash val="solid"/>
+              <a:round/>
+              <a:headEnd type="none" w="med" len="med"/>
+              <a:tailEnd type="none" w="med" len="med"/>
+            </a:ln>
+            <a:effectLst/>
+          </p:spPr>
+        </p:cxnSp>
+        <p:cxnSp>
+          <p:nvCxnSpPr>
+            <p:cNvPr id="101" name="Straight Connector 100"/>
+            <p:cNvCxnSpPr/>
+            <p:nvPr/>
+          </p:nvCxnSpPr>
+          <p:spPr bwMode="auto">
+            <a:xfrm>
+              <a:off x="2730500" y="2095500"/>
+              <a:ext cx="0" cy="1485900"/>
+            </a:xfrm>
+            <a:prstGeom prst="line">
+              <a:avLst/>
+            </a:prstGeom>
+            <a:solidFill>
+              <a:schemeClr val="accent1"/>
+            </a:solidFill>
+            <a:ln w="9525" cap="flat" cmpd="sng" algn="ctr">
+              <a:solidFill>
+                <a:schemeClr val="tx1"/>
+              </a:solidFill>
+              <a:prstDash val="solid"/>
+              <a:round/>
+              <a:headEnd type="none" w="med" len="med"/>
+              <a:tailEnd type="none" w="med" len="med"/>
+            </a:ln>
+            <a:effectLst/>
+          </p:spPr>
+        </p:cxnSp>
+        <p:cxnSp>
+          <p:nvCxnSpPr>
+            <p:cNvPr id="134" name="Straight Connector 133"/>
+            <p:cNvCxnSpPr/>
+            <p:nvPr/>
+          </p:nvCxnSpPr>
+          <p:spPr bwMode="auto">
+            <a:xfrm>
+              <a:off x="1447800" y="2095500"/>
+              <a:ext cx="0" cy="1485900"/>
+            </a:xfrm>
+            <a:prstGeom prst="line">
+              <a:avLst/>
+            </a:prstGeom>
+            <a:solidFill>
+              <a:schemeClr val="accent1"/>
+            </a:solidFill>
+            <a:ln w="9525" cap="flat" cmpd="sng" algn="ctr">
+              <a:solidFill>
+                <a:schemeClr val="tx1"/>
+              </a:solidFill>
+              <a:prstDash val="solid"/>
+              <a:round/>
+              <a:headEnd type="none" w="med" len="med"/>
+              <a:tailEnd type="none" w="med" len="med"/>
+            </a:ln>
+            <a:effectLst/>
+          </p:spPr>
+        </p:cxnSp>
+      </p:grpSp>
+      <p:grpSp>
+        <p:nvGrpSpPr>
+          <p:cNvPr id="152" name="Group 151"/>
+          <p:cNvGrpSpPr/>
+          <p:nvPr/>
+        </p:nvGrpSpPr>
+        <p:grpSpPr>
+          <a:xfrm>
+            <a:off x="1231900" y="1549400"/>
+            <a:ext cx="6849810" cy="684431"/>
+            <a:chOff x="1231900" y="1079500"/>
+            <a:chExt cx="6849810" cy="684431"/>
+          </a:xfrm>
+        </p:grpSpPr>
+        <p:sp>
+          <p:nvSpPr>
+            <p:cNvPr id="146" name="TextBox 145"/>
+            <p:cNvSpPr txBox="1"/>
+            <p:nvPr/>
+          </p:nvSpPr>
+          <p:spPr>
+            <a:xfrm>
+              <a:off x="7620000" y="1079500"/>
+              <a:ext cx="461710" cy="646331"/>
+            </a:xfrm>
+            <a:prstGeom prst="rect">
+              <a:avLst/>
+            </a:prstGeom>
+            <a:noFill/>
+          </p:spPr>
+          <p:txBody>
+            <a:bodyPr wrap="none" rtlCol="0">
+              <a:spAutoFit/>
+            </a:bodyPr>
+            <a:lstStyle/>
+            <a:p>
+              <a:pPr lvl="0" algn="l"/>
+              <a:r>
+                <a:rPr lang="en-US" sz="3600" b="1" dirty="0" smtClean="0">
+                  <a:solidFill>
+                    <a:srgbClr val="000000"/>
+                  </a:solidFill>
+                  <a:latin typeface="Courier New"/>
+                  <a:cs typeface="Courier New"/>
+                </a:rPr>
+                <a:t>1</a:t>
+              </a:r>
+              <a:endParaRPr lang="en-US" sz="3600" b="1" baseline="-25000" dirty="0">
+                <a:solidFill>
+                  <a:srgbClr val="000000"/>
+                </a:solidFill>
+                <a:latin typeface="Courier New"/>
+                <a:cs typeface="Courier New"/>
+              </a:endParaRPr>
+            </a:p>
+          </p:txBody>
+        </p:sp>
+        <p:sp>
+          <p:nvSpPr>
+            <p:cNvPr id="147" name="TextBox 146"/>
+            <p:cNvSpPr txBox="1"/>
+            <p:nvPr/>
+          </p:nvSpPr>
+          <p:spPr>
+            <a:xfrm>
+              <a:off x="6248400" y="1079500"/>
+              <a:ext cx="461710" cy="646331"/>
+            </a:xfrm>
+            <a:prstGeom prst="rect">
+              <a:avLst/>
+            </a:prstGeom>
+            <a:noFill/>
+          </p:spPr>
+          <p:txBody>
+            <a:bodyPr wrap="none" rtlCol="0">
+              <a:spAutoFit/>
+            </a:bodyPr>
+            <a:lstStyle/>
+            <a:p>
+              <a:pPr lvl="0" algn="l"/>
+              <a:r>
+                <a:rPr lang="en-US" sz="3600" b="1" dirty="0">
+                  <a:solidFill>
+                    <a:srgbClr val="000000"/>
+                  </a:solidFill>
+                  <a:latin typeface="Courier New"/>
+                  <a:cs typeface="Courier New"/>
+                </a:rPr>
+                <a:t>1</a:t>
+              </a:r>
+              <a:endParaRPr lang="en-US" sz="3600" b="1" baseline="-25000" dirty="0">
+                <a:solidFill>
+                  <a:srgbClr val="000000"/>
+                </a:solidFill>
+                <a:latin typeface="Courier New"/>
+                <a:cs typeface="Courier New"/>
+              </a:endParaRPr>
+            </a:p>
+          </p:txBody>
+        </p:sp>
+        <p:sp>
+          <p:nvSpPr>
+            <p:cNvPr id="148" name="TextBox 147"/>
+            <p:cNvSpPr txBox="1"/>
+            <p:nvPr/>
+          </p:nvSpPr>
+          <p:spPr>
+            <a:xfrm>
+              <a:off x="4940300" y="1092200"/>
+              <a:ext cx="461710" cy="646331"/>
+            </a:xfrm>
+            <a:prstGeom prst="rect">
+              <a:avLst/>
+            </a:prstGeom>
+            <a:noFill/>
+          </p:spPr>
+          <p:txBody>
+            <a:bodyPr wrap="none" rtlCol="0">
+              <a:spAutoFit/>
+            </a:bodyPr>
+            <a:lstStyle/>
+            <a:p>
+              <a:pPr algn="l"/>
+              <a:r>
+                <a:rPr lang="en-US" sz="3600" b="1" dirty="0" smtClean="0">
+                  <a:latin typeface="Courier New"/>
+                  <a:cs typeface="Courier New"/>
+                </a:rPr>
+                <a:t>1</a:t>
+              </a:r>
+              <a:endParaRPr lang="en-US" sz="3600" b="1" baseline="-25000" dirty="0">
+                <a:latin typeface="Courier New"/>
+                <a:cs typeface="Courier New"/>
+              </a:endParaRPr>
+            </a:p>
+          </p:txBody>
+        </p:sp>
+        <p:sp>
+          <p:nvSpPr>
+            <p:cNvPr id="149" name="TextBox 148"/>
+            <p:cNvSpPr txBox="1"/>
+            <p:nvPr/>
+          </p:nvSpPr>
+          <p:spPr>
+            <a:xfrm>
+              <a:off x="3797300" y="1104900"/>
+              <a:ext cx="461710" cy="646331"/>
+            </a:xfrm>
+            <a:prstGeom prst="rect">
+              <a:avLst/>
+            </a:prstGeom>
+            <a:noFill/>
+          </p:spPr>
+          <p:txBody>
+            <a:bodyPr wrap="none" rtlCol="0">
+              <a:spAutoFit/>
+            </a:bodyPr>
+            <a:lstStyle/>
+            <a:p>
+              <a:pPr lvl="0" algn="l"/>
+              <a:r>
+                <a:rPr lang="en-US" sz="3600" b="1" dirty="0" smtClean="0">
+                  <a:solidFill>
+                    <a:srgbClr val="000000"/>
+                  </a:solidFill>
+                  <a:latin typeface="Courier New"/>
+                  <a:cs typeface="Courier New"/>
+                </a:rPr>
+                <a:t>0</a:t>
+              </a:r>
+              <a:endParaRPr lang="en-US" sz="3600" b="1" baseline="-25000" dirty="0">
+                <a:solidFill>
+                  <a:srgbClr val="000000"/>
+                </a:solidFill>
+                <a:latin typeface="Courier New"/>
+                <a:cs typeface="Courier New"/>
+              </a:endParaRPr>
+            </a:p>
+          </p:txBody>
+        </p:sp>
+        <p:sp>
+          <p:nvSpPr>
+            <p:cNvPr id="150" name="TextBox 149"/>
+            <p:cNvSpPr txBox="1"/>
+            <p:nvPr/>
+          </p:nvSpPr>
+          <p:spPr>
+            <a:xfrm>
+              <a:off x="2501900" y="1104900"/>
+              <a:ext cx="461710" cy="646331"/>
+            </a:xfrm>
+            <a:prstGeom prst="rect">
+              <a:avLst/>
+            </a:prstGeom>
+            <a:noFill/>
+          </p:spPr>
+          <p:txBody>
+            <a:bodyPr wrap="none" rtlCol="0">
+              <a:spAutoFit/>
+            </a:bodyPr>
+            <a:lstStyle/>
+            <a:p>
+              <a:pPr algn="l"/>
+              <a:r>
+                <a:rPr lang="en-US" sz="3600" b="1" dirty="0" smtClean="0">
+                  <a:latin typeface="Courier New"/>
+                  <a:cs typeface="Courier New"/>
+                </a:rPr>
+                <a:t>0</a:t>
+              </a:r>
+              <a:endParaRPr lang="en-US" sz="3600" dirty="0" smtClean="0">
+                <a:latin typeface="Comic Sans MS" pitchFamily="66" charset="0"/>
+              </a:endParaRPr>
+            </a:p>
+          </p:txBody>
+        </p:sp>
+        <p:sp>
+          <p:nvSpPr>
+            <p:cNvPr id="151" name="TextBox 150"/>
+            <p:cNvSpPr txBox="1"/>
+            <p:nvPr/>
+          </p:nvSpPr>
+          <p:spPr>
+            <a:xfrm>
+              <a:off x="1231900" y="1117600"/>
+              <a:ext cx="461710" cy="646331"/>
+            </a:xfrm>
+            <a:prstGeom prst="rect">
+              <a:avLst/>
+            </a:prstGeom>
+            <a:noFill/>
+          </p:spPr>
+          <p:txBody>
+            <a:bodyPr wrap="none" rtlCol="0">
+              <a:spAutoFit/>
+            </a:bodyPr>
+            <a:lstStyle/>
+            <a:p>
+              <a:pPr algn="l"/>
+              <a:r>
+                <a:rPr lang="en-US" sz="3600" b="1" dirty="0">
+                  <a:latin typeface="Courier New"/>
+                  <a:cs typeface="Courier New"/>
+                </a:rPr>
+                <a:t>1</a:t>
+              </a:r>
+              <a:endParaRPr lang="en-US" sz="3600" b="1" baseline="-25000" dirty="0" smtClean="0">
+                <a:latin typeface="Courier New"/>
+                <a:cs typeface="Courier New"/>
+              </a:endParaRPr>
+            </a:p>
+          </p:txBody>
+        </p:sp>
+      </p:grpSp>
+      <p:grpSp>
+        <p:nvGrpSpPr>
+          <p:cNvPr id="56" name="Group 55"/>
+          <p:cNvGrpSpPr/>
+          <p:nvPr/>
+        </p:nvGrpSpPr>
+        <p:grpSpPr>
+          <a:xfrm>
+            <a:off x="647699" y="4470400"/>
+            <a:ext cx="7599111" cy="1001931"/>
+            <a:chOff x="647699" y="4470400"/>
+            <a:chExt cx="7599111" cy="1001931"/>
+          </a:xfrm>
+        </p:grpSpPr>
+        <p:sp>
+          <p:nvSpPr>
+            <p:cNvPr id="57" name="TextBox 56"/>
+            <p:cNvSpPr txBox="1"/>
+            <p:nvPr/>
+          </p:nvSpPr>
+          <p:spPr>
+            <a:xfrm flipH="1">
+              <a:off x="647699" y="4470400"/>
+              <a:ext cx="622300" cy="646331"/>
+            </a:xfrm>
+            <a:prstGeom prst="rect">
+              <a:avLst/>
+            </a:prstGeom>
+            <a:noFill/>
+          </p:spPr>
+          <p:txBody>
+            <a:bodyPr wrap="square" rtlCol="0">
+              <a:spAutoFit/>
+            </a:bodyPr>
+            <a:lstStyle/>
+            <a:p>
+              <a:pPr lvl="0" algn="l"/>
+              <a:r>
+                <a:rPr lang="en-US" sz="3600" b="1" dirty="0">
+                  <a:solidFill>
+                    <a:srgbClr val="000000"/>
+                  </a:solidFill>
+                  <a:latin typeface="Courier New"/>
+                  <a:cs typeface="Courier New"/>
+                </a:rPr>
+                <a:t>1</a:t>
+              </a:r>
+              <a:endParaRPr lang="en-US" sz="3600" b="1" baseline="-25000" dirty="0">
+                <a:solidFill>
+                  <a:srgbClr val="000000"/>
+                </a:solidFill>
+                <a:latin typeface="Courier New"/>
+                <a:cs typeface="Courier New"/>
+              </a:endParaRPr>
+            </a:p>
+          </p:txBody>
+        </p:sp>
+        <p:grpSp>
+          <p:nvGrpSpPr>
+            <p:cNvPr id="58" name="Group 57"/>
+            <p:cNvGrpSpPr/>
+            <p:nvPr/>
+          </p:nvGrpSpPr>
+          <p:grpSpPr>
+            <a:xfrm>
+              <a:off x="1397000" y="4787900"/>
+              <a:ext cx="6849810" cy="684431"/>
+              <a:chOff x="1397000" y="4787900"/>
+              <a:chExt cx="6849810" cy="684431"/>
+            </a:xfrm>
+          </p:grpSpPr>
+          <p:sp>
+            <p:nvSpPr>
+              <p:cNvPr id="59" name="TextBox 58"/>
+              <p:cNvSpPr txBox="1"/>
+              <p:nvPr/>
+            </p:nvSpPr>
+            <p:spPr>
+              <a:xfrm>
+                <a:off x="7785100" y="4787900"/>
+                <a:ext cx="461710" cy="646331"/>
+              </a:xfrm>
+              <a:prstGeom prst="rect">
+                <a:avLst/>
+              </a:prstGeom>
+              <a:noFill/>
+            </p:spPr>
+            <p:txBody>
+              <a:bodyPr wrap="none" rtlCol="0">
+                <a:spAutoFit/>
+              </a:bodyPr>
+              <a:lstStyle/>
+              <a:p>
+                <a:pPr lvl="0" algn="l"/>
+                <a:r>
+                  <a:rPr lang="en-US" sz="3600" b="1" dirty="0" smtClean="0">
+                    <a:solidFill>
+                      <a:srgbClr val="000000"/>
+                    </a:solidFill>
+                    <a:latin typeface="Courier New"/>
+                    <a:cs typeface="Courier New"/>
+                  </a:rPr>
+                  <a:t>1</a:t>
+                </a:r>
+                <a:endParaRPr lang="en-US" sz="3600" b="1" baseline="-25000" dirty="0">
+                  <a:solidFill>
+                    <a:srgbClr val="000000"/>
+                  </a:solidFill>
+                  <a:latin typeface="Courier New"/>
+                  <a:cs typeface="Courier New"/>
+                </a:endParaRPr>
+              </a:p>
+            </p:txBody>
+          </p:sp>
+          <p:sp>
+            <p:nvSpPr>
+              <p:cNvPr id="60" name="TextBox 59"/>
+              <p:cNvSpPr txBox="1"/>
+              <p:nvPr/>
+            </p:nvSpPr>
+            <p:spPr>
+              <a:xfrm>
+                <a:off x="6413500" y="4787900"/>
+                <a:ext cx="461710" cy="646331"/>
+              </a:xfrm>
+              <a:prstGeom prst="rect">
+                <a:avLst/>
+              </a:prstGeom>
+              <a:noFill/>
+            </p:spPr>
+            <p:txBody>
+              <a:bodyPr wrap="none" rtlCol="0">
+                <a:spAutoFit/>
+              </a:bodyPr>
+              <a:lstStyle/>
+              <a:p>
+                <a:pPr lvl="0" algn="l"/>
+                <a:r>
+                  <a:rPr lang="en-US" sz="3600" b="1" dirty="0">
+                    <a:solidFill>
+                      <a:srgbClr val="000000"/>
+                    </a:solidFill>
+                    <a:latin typeface="Courier New"/>
+                    <a:cs typeface="Courier New"/>
+                  </a:rPr>
+                  <a:t>0</a:t>
+                </a:r>
+                <a:endParaRPr lang="en-US" sz="3600" b="1" baseline="-25000" dirty="0">
+                  <a:solidFill>
+                    <a:srgbClr val="000000"/>
+                  </a:solidFill>
+                  <a:latin typeface="Courier New"/>
+                  <a:cs typeface="Courier New"/>
+                </a:endParaRPr>
+              </a:p>
+            </p:txBody>
+          </p:sp>
+          <p:sp>
+            <p:nvSpPr>
+              <p:cNvPr id="61" name="TextBox 60"/>
+              <p:cNvSpPr txBox="1"/>
+              <p:nvPr/>
+            </p:nvSpPr>
+            <p:spPr>
+              <a:xfrm>
+                <a:off x="5105400" y="4800600"/>
+                <a:ext cx="461710" cy="646331"/>
+              </a:xfrm>
+              <a:prstGeom prst="rect">
+                <a:avLst/>
+              </a:prstGeom>
+              <a:noFill/>
+            </p:spPr>
+            <p:txBody>
+              <a:bodyPr wrap="none" rtlCol="0">
+                <a:spAutoFit/>
+              </a:bodyPr>
+              <a:lstStyle/>
+              <a:p>
+                <a:pPr lvl="0" algn="l"/>
+                <a:r>
+                  <a:rPr lang="en-US" sz="3600" b="1" dirty="0">
+                    <a:solidFill>
+                      <a:srgbClr val="000000"/>
+                    </a:solidFill>
+                    <a:latin typeface="Courier New"/>
+                    <a:cs typeface="Courier New"/>
+                  </a:rPr>
+                  <a:t>0</a:t>
+                </a:r>
+                <a:endParaRPr lang="en-US" sz="3600" b="1" baseline="-25000" dirty="0">
+                  <a:solidFill>
+                    <a:srgbClr val="000000"/>
+                  </a:solidFill>
+                  <a:latin typeface="Courier New"/>
+                  <a:cs typeface="Courier New"/>
+                </a:endParaRPr>
+              </a:p>
+            </p:txBody>
+          </p:sp>
+          <p:sp>
+            <p:nvSpPr>
+              <p:cNvPr id="62" name="TextBox 61"/>
+              <p:cNvSpPr txBox="1"/>
+              <p:nvPr/>
+            </p:nvSpPr>
+            <p:spPr>
+              <a:xfrm>
+                <a:off x="3962400" y="4813300"/>
+                <a:ext cx="461710" cy="646331"/>
+              </a:xfrm>
+              <a:prstGeom prst="rect">
+                <a:avLst/>
+              </a:prstGeom>
+              <a:noFill/>
+            </p:spPr>
+            <p:txBody>
+              <a:bodyPr wrap="none" rtlCol="0">
+                <a:spAutoFit/>
+              </a:bodyPr>
+              <a:lstStyle/>
+              <a:p>
+                <a:pPr lvl="0" algn="l"/>
+                <a:r>
+                  <a:rPr lang="en-US" sz="3600" b="1" dirty="0">
+                    <a:solidFill>
+                      <a:srgbClr val="000000"/>
+                    </a:solidFill>
+                    <a:latin typeface="Courier New"/>
+                    <a:cs typeface="Courier New"/>
+                  </a:rPr>
+                  <a:t>0</a:t>
+                </a:r>
+                <a:endParaRPr lang="en-US" sz="3600" b="1" baseline="-25000" dirty="0">
+                  <a:solidFill>
+                    <a:srgbClr val="000000"/>
+                  </a:solidFill>
+                  <a:latin typeface="Courier New"/>
+                  <a:cs typeface="Courier New"/>
+                </a:endParaRPr>
+              </a:p>
+            </p:txBody>
+          </p:sp>
+          <p:sp>
+            <p:nvSpPr>
+              <p:cNvPr id="63" name="TextBox 62"/>
+              <p:cNvSpPr txBox="1"/>
+              <p:nvPr/>
+            </p:nvSpPr>
+            <p:spPr>
+              <a:xfrm>
+                <a:off x="2667000" y="4813300"/>
+                <a:ext cx="461710" cy="646331"/>
+              </a:xfrm>
+              <a:prstGeom prst="rect">
+                <a:avLst/>
+              </a:prstGeom>
+              <a:noFill/>
+            </p:spPr>
+            <p:txBody>
+              <a:bodyPr wrap="none" rtlCol="0">
+                <a:spAutoFit/>
+              </a:bodyPr>
+              <a:lstStyle/>
+              <a:p>
+                <a:pPr lvl="0" algn="l"/>
+                <a:r>
+                  <a:rPr lang="en-US" sz="3600" b="1" dirty="0">
+                    <a:solidFill>
+                      <a:srgbClr val="000000"/>
+                    </a:solidFill>
+                    <a:latin typeface="Courier New"/>
+                    <a:cs typeface="Courier New"/>
+                  </a:rPr>
+                  <a:t>0</a:t>
+                </a:r>
+                <a:endParaRPr lang="en-US" sz="3600" b="1" baseline="-25000" dirty="0">
+                  <a:solidFill>
+                    <a:srgbClr val="000000"/>
+                  </a:solidFill>
+                  <a:latin typeface="Courier New"/>
+                  <a:cs typeface="Courier New"/>
+                </a:endParaRPr>
+              </a:p>
+            </p:txBody>
+          </p:sp>
+          <p:sp>
+            <p:nvSpPr>
+              <p:cNvPr id="64" name="TextBox 63"/>
+              <p:cNvSpPr txBox="1"/>
+              <p:nvPr/>
+            </p:nvSpPr>
+            <p:spPr>
+              <a:xfrm>
+                <a:off x="1397000" y="4826000"/>
+                <a:ext cx="461710" cy="646331"/>
+              </a:xfrm>
+              <a:prstGeom prst="rect">
+                <a:avLst/>
+              </a:prstGeom>
+              <a:noFill/>
+            </p:spPr>
+            <p:txBody>
+              <a:bodyPr wrap="none" rtlCol="0">
+                <a:spAutoFit/>
+              </a:bodyPr>
+              <a:lstStyle/>
+              <a:p>
+                <a:pPr lvl="0" algn="l"/>
+                <a:r>
+                  <a:rPr lang="en-US" sz="3600" b="1" dirty="0">
+                    <a:solidFill>
+                      <a:srgbClr val="000000"/>
+                    </a:solidFill>
+                    <a:latin typeface="Courier New"/>
+                    <a:cs typeface="Courier New"/>
+                  </a:rPr>
+                  <a:t>1</a:t>
+                </a:r>
+                <a:endParaRPr lang="en-US" sz="3600" b="1" baseline="-25000" dirty="0">
+                  <a:solidFill>
+                    <a:srgbClr val="000000"/>
+                  </a:solidFill>
+                  <a:latin typeface="Courier New"/>
+                  <a:cs typeface="Courier New"/>
+                </a:endParaRPr>
+              </a:p>
+            </p:txBody>
+          </p:sp>
+        </p:grpSp>
+      </p:grpSp>
+      <p:grpSp>
+        <p:nvGrpSpPr>
+          <p:cNvPr id="5" name="Group 4"/>
+          <p:cNvGrpSpPr/>
+          <p:nvPr/>
+        </p:nvGrpSpPr>
+        <p:grpSpPr>
+          <a:xfrm>
+            <a:off x="876300" y="4254500"/>
+            <a:ext cx="7061200" cy="673100"/>
+            <a:chOff x="876300" y="4254500"/>
+            <a:chExt cx="7061200" cy="673100"/>
+          </a:xfrm>
+        </p:grpSpPr>
+        <p:grpSp>
+          <p:nvGrpSpPr>
+            <p:cNvPr id="17" name="Group 16"/>
+            <p:cNvGrpSpPr/>
+            <p:nvPr/>
+          </p:nvGrpSpPr>
+          <p:grpSpPr>
+            <a:xfrm>
+              <a:off x="1612900" y="4254500"/>
+              <a:ext cx="6324600" cy="673100"/>
+              <a:chOff x="1612900" y="4254500"/>
+              <a:chExt cx="6324600" cy="673100"/>
+            </a:xfrm>
+          </p:grpSpPr>
+          <p:cxnSp>
+            <p:nvCxnSpPr>
+              <p:cNvPr id="9" name="Straight Connector 8"/>
+              <p:cNvCxnSpPr/>
+              <p:nvPr/>
+            </p:nvCxnSpPr>
+            <p:spPr bwMode="auto">
+              <a:xfrm>
+                <a:off x="7937500" y="4279900"/>
+                <a:ext cx="0" cy="647700"/>
+              </a:xfrm>
+              <a:prstGeom prst="line">
+                <a:avLst/>
+              </a:prstGeom>
+              <a:solidFill>
+                <a:schemeClr val="accent1"/>
+              </a:solidFill>
+              <a:ln w="9525" cap="flat" cmpd="sng" algn="ctr">
+                <a:solidFill>
+                  <a:schemeClr val="tx1"/>
+                </a:solidFill>
+                <a:prstDash val="solid"/>
+                <a:round/>
+                <a:headEnd type="none" w="med" len="med"/>
+                <a:tailEnd type="none" w="med" len="med"/>
+              </a:ln>
+              <a:effectLst/>
+            </p:spPr>
+          </p:cxnSp>
+          <p:cxnSp>
+            <p:nvCxnSpPr>
+              <p:cNvPr id="23" name="Straight Connector 22"/>
+              <p:cNvCxnSpPr/>
+              <p:nvPr/>
+            </p:nvCxnSpPr>
+            <p:spPr bwMode="auto">
+              <a:xfrm>
+                <a:off x="6692900" y="4254500"/>
+                <a:ext cx="0" cy="647700"/>
+              </a:xfrm>
+              <a:prstGeom prst="line">
+                <a:avLst/>
+              </a:prstGeom>
+              <a:solidFill>
+                <a:schemeClr val="accent1"/>
+              </a:solidFill>
+              <a:ln w="9525" cap="flat" cmpd="sng" algn="ctr">
+                <a:solidFill>
+                  <a:schemeClr val="tx1"/>
+                </a:solidFill>
+                <a:prstDash val="solid"/>
+                <a:round/>
+                <a:headEnd type="none" w="med" len="med"/>
+                <a:tailEnd type="none" w="med" len="med"/>
+              </a:ln>
+              <a:effectLst/>
+            </p:spPr>
+          </p:cxnSp>
+          <p:cxnSp>
+            <p:nvCxnSpPr>
+              <p:cNvPr id="88" name="Straight Connector 87"/>
+              <p:cNvCxnSpPr/>
+              <p:nvPr/>
+            </p:nvCxnSpPr>
+            <p:spPr bwMode="auto">
+              <a:xfrm>
+                <a:off x="5384800" y="4254500"/>
+                <a:ext cx="0" cy="647700"/>
+              </a:xfrm>
+              <a:prstGeom prst="line">
+                <a:avLst/>
+              </a:prstGeom>
+              <a:solidFill>
+                <a:schemeClr val="accent1"/>
+              </a:solidFill>
+              <a:ln w="9525" cap="flat" cmpd="sng" algn="ctr">
+                <a:solidFill>
+                  <a:schemeClr val="tx1"/>
+                </a:solidFill>
+                <a:prstDash val="solid"/>
+                <a:round/>
+                <a:headEnd type="none" w="med" len="med"/>
+                <a:tailEnd type="none" w="med" len="med"/>
+              </a:ln>
+              <a:effectLst/>
+            </p:spPr>
+          </p:cxnSp>
+          <p:cxnSp>
+            <p:nvCxnSpPr>
+              <p:cNvPr id="112" name="Straight Connector 111"/>
+              <p:cNvCxnSpPr/>
+              <p:nvPr/>
+            </p:nvCxnSpPr>
+            <p:spPr bwMode="auto">
+              <a:xfrm>
+                <a:off x="4203700" y="4254500"/>
+                <a:ext cx="0" cy="647700"/>
+              </a:xfrm>
+              <a:prstGeom prst="line">
+                <a:avLst/>
+              </a:prstGeom>
+              <a:solidFill>
+                <a:schemeClr val="accent1"/>
+              </a:solidFill>
+              <a:ln w="9525" cap="flat" cmpd="sng" algn="ctr">
+                <a:solidFill>
+                  <a:schemeClr val="tx1"/>
+                </a:solidFill>
+                <a:prstDash val="solid"/>
+                <a:round/>
+                <a:headEnd type="none" w="med" len="med"/>
+                <a:tailEnd type="none" w="med" len="med"/>
+              </a:ln>
+              <a:effectLst/>
+            </p:spPr>
+          </p:cxnSp>
+          <p:cxnSp>
+            <p:nvCxnSpPr>
+              <p:cNvPr id="102" name="Straight Connector 101"/>
+              <p:cNvCxnSpPr/>
+              <p:nvPr/>
+            </p:nvCxnSpPr>
+            <p:spPr bwMode="auto">
+              <a:xfrm>
+                <a:off x="2895600" y="4254500"/>
+                <a:ext cx="0" cy="647700"/>
+              </a:xfrm>
+              <a:prstGeom prst="line">
+                <a:avLst/>
+              </a:prstGeom>
+              <a:solidFill>
+                <a:schemeClr val="accent1"/>
+              </a:solidFill>
+              <a:ln w="9525" cap="flat" cmpd="sng" algn="ctr">
+                <a:solidFill>
+                  <a:schemeClr val="tx1"/>
+                </a:solidFill>
+                <a:prstDash val="solid"/>
+                <a:round/>
+                <a:headEnd type="none" w="med" len="med"/>
+                <a:tailEnd type="none" w="med" len="med"/>
+              </a:ln>
+              <a:effectLst/>
+            </p:spPr>
+          </p:cxnSp>
+          <p:cxnSp>
+            <p:nvCxnSpPr>
+              <p:cNvPr id="135" name="Straight Connector 134"/>
+              <p:cNvCxnSpPr/>
+              <p:nvPr/>
+            </p:nvCxnSpPr>
+            <p:spPr bwMode="auto">
+              <a:xfrm>
+                <a:off x="1612900" y="4254500"/>
+                <a:ext cx="0" cy="647700"/>
+              </a:xfrm>
+              <a:prstGeom prst="line">
+                <a:avLst/>
+              </a:prstGeom>
+              <a:solidFill>
+                <a:schemeClr val="accent1"/>
+              </a:solidFill>
+              <a:ln w="9525" cap="flat" cmpd="sng" algn="ctr">
+                <a:solidFill>
+                  <a:schemeClr val="tx1"/>
+                </a:solidFill>
+                <a:prstDash val="solid"/>
+                <a:round/>
+                <a:headEnd type="none" w="med" len="med"/>
+                <a:tailEnd type="none" w="med" len="med"/>
+              </a:ln>
+              <a:effectLst/>
+            </p:spPr>
+          </p:cxnSp>
+        </p:grpSp>
+        <p:cxnSp>
+          <p:nvCxnSpPr>
+            <p:cNvPr id="55" name="Straight Connector 54"/>
+            <p:cNvCxnSpPr/>
+            <p:nvPr/>
+          </p:nvCxnSpPr>
+          <p:spPr bwMode="auto">
+            <a:xfrm>
+              <a:off x="1257300" y="4267200"/>
+              <a:ext cx="12700" cy="304800"/>
+            </a:xfrm>
+            <a:prstGeom prst="line">
+              <a:avLst/>
+            </a:prstGeom>
+            <a:solidFill>
+              <a:schemeClr val="accent1"/>
+            </a:solidFill>
+            <a:ln w="9525" cap="flat" cmpd="sng" algn="ctr">
+              <a:solidFill>
+                <a:schemeClr val="tx1"/>
+              </a:solidFill>
+              <a:prstDash val="solid"/>
+              <a:round/>
+              <a:headEnd type="none" w="med" len="med"/>
+              <a:tailEnd type="none" w="med" len="med"/>
+            </a:ln>
+            <a:effectLst/>
+          </p:spPr>
+        </p:cxnSp>
+        <p:cxnSp>
+          <p:nvCxnSpPr>
+            <p:cNvPr id="65" name="Straight Connector 64"/>
+            <p:cNvCxnSpPr/>
+            <p:nvPr/>
+          </p:nvCxnSpPr>
+          <p:spPr bwMode="auto">
+            <a:xfrm flipV="1">
+              <a:off x="876300" y="4572000"/>
+              <a:ext cx="381000" cy="25400"/>
+            </a:xfrm>
+            <a:prstGeom prst="line">
+              <a:avLst/>
+            </a:prstGeom>
+            <a:solidFill>
+              <a:schemeClr val="accent1"/>
+            </a:solidFill>
+            <a:ln w="9525" cap="flat" cmpd="sng" algn="ctr">
+              <a:solidFill>
+                <a:schemeClr val="tx1"/>
+              </a:solidFill>
+              <a:prstDash val="solid"/>
+              <a:round/>
+              <a:headEnd type="none" w="med" len="med"/>
+              <a:tailEnd type="none" w="med" len="med"/>
+            </a:ln>
+            <a:effectLst/>
+          </p:spPr>
+        </p:cxnSp>
+      </p:grpSp>
+      <p:grpSp>
+        <p:nvGrpSpPr>
+          <p:cNvPr id="73" name="Group 72"/>
+          <p:cNvGrpSpPr/>
+          <p:nvPr/>
+        </p:nvGrpSpPr>
+        <p:grpSpPr>
+          <a:xfrm>
+            <a:off x="647699" y="4470400"/>
+            <a:ext cx="7679094" cy="878820"/>
+            <a:chOff x="647699" y="4470400"/>
+            <a:chExt cx="7679094" cy="878820"/>
+          </a:xfrm>
+        </p:grpSpPr>
+        <p:sp>
+          <p:nvSpPr>
+            <p:cNvPr id="74" name="TextBox 73"/>
+            <p:cNvSpPr txBox="1"/>
+            <p:nvPr/>
+          </p:nvSpPr>
+          <p:spPr>
+            <a:xfrm flipH="1">
+              <a:off x="647699" y="4470400"/>
+              <a:ext cx="622300" cy="523220"/>
+            </a:xfrm>
+            <a:prstGeom prst="rect">
+              <a:avLst/>
+            </a:prstGeom>
+            <a:noFill/>
+          </p:spPr>
+          <p:txBody>
+            <a:bodyPr wrap="square" rtlCol="0">
+              <a:spAutoFit/>
+            </a:bodyPr>
+            <a:lstStyle/>
+            <a:p>
+              <a:pPr algn="l"/>
+              <a:r>
+                <a:rPr lang="en-US" sz="2800" dirty="0" smtClean="0">
+                  <a:latin typeface="Comic Sans MS" pitchFamily="66" charset="0"/>
+                </a:rPr>
+                <a:t>c</a:t>
+              </a:r>
+              <a:r>
+                <a:rPr lang="en-US" sz="2800" baseline="-25000" dirty="0" smtClean="0">
+                  <a:latin typeface="Comic Sans MS" pitchFamily="66" charset="0"/>
+                </a:rPr>
+                <a:t>5</a:t>
+              </a:r>
+            </a:p>
+          </p:txBody>
+        </p:sp>
+        <p:grpSp>
+          <p:nvGrpSpPr>
+            <p:cNvPr id="75" name="Group 74"/>
+            <p:cNvGrpSpPr/>
+            <p:nvPr/>
+          </p:nvGrpSpPr>
+          <p:grpSpPr>
+            <a:xfrm>
+              <a:off x="1397000" y="4787900"/>
+              <a:ext cx="6929793" cy="561320"/>
+              <a:chOff x="1397000" y="4787900"/>
+              <a:chExt cx="6929793" cy="561320"/>
+            </a:xfrm>
+          </p:grpSpPr>
+          <p:sp>
+            <p:nvSpPr>
+              <p:cNvPr id="76" name="TextBox 75"/>
+              <p:cNvSpPr txBox="1"/>
+              <p:nvPr/>
+            </p:nvSpPr>
+            <p:spPr>
+              <a:xfrm>
+                <a:off x="7785100" y="4787900"/>
+                <a:ext cx="541693" cy="523220"/>
+              </a:xfrm>
+              <a:prstGeom prst="rect">
+                <a:avLst/>
+              </a:prstGeom>
+              <a:noFill/>
+            </p:spPr>
+            <p:txBody>
+              <a:bodyPr wrap="none" rtlCol="0">
+                <a:spAutoFit/>
+              </a:bodyPr>
+              <a:lstStyle/>
+              <a:p>
+                <a:pPr algn="l"/>
+                <a:r>
+                  <a:rPr lang="en-US" sz="2800" dirty="0" smtClean="0">
+                    <a:latin typeface="Comic Sans MS" pitchFamily="66" charset="0"/>
+                  </a:rPr>
+                  <a:t>d</a:t>
+                </a:r>
+                <a:r>
+                  <a:rPr lang="en-US" sz="2800" baseline="-25000" dirty="0" smtClean="0">
+                    <a:latin typeface="Comic Sans MS" pitchFamily="66" charset="0"/>
+                  </a:rPr>
+                  <a:t>0</a:t>
+                </a:r>
+                <a:endParaRPr lang="en-US" sz="2800" dirty="0" smtClean="0">
+                  <a:latin typeface="Comic Sans MS" pitchFamily="66" charset="0"/>
+                </a:endParaRPr>
+              </a:p>
+            </p:txBody>
+          </p:sp>
+          <p:sp>
+            <p:nvSpPr>
+              <p:cNvPr id="77" name="TextBox 76"/>
+              <p:cNvSpPr txBox="1"/>
+              <p:nvPr/>
+            </p:nvSpPr>
+            <p:spPr>
+              <a:xfrm>
+                <a:off x="6413500" y="4787900"/>
+                <a:ext cx="503355" cy="523220"/>
+              </a:xfrm>
+              <a:prstGeom prst="rect">
+                <a:avLst/>
+              </a:prstGeom>
+              <a:noFill/>
+            </p:spPr>
+            <p:txBody>
+              <a:bodyPr wrap="none" rtlCol="0">
+                <a:spAutoFit/>
+              </a:bodyPr>
+              <a:lstStyle/>
+              <a:p>
+                <a:pPr algn="l"/>
+                <a:r>
+                  <a:rPr lang="en-US" sz="2800" dirty="0" smtClean="0">
+                    <a:latin typeface="Comic Sans MS" pitchFamily="66" charset="0"/>
+                  </a:rPr>
+                  <a:t>d</a:t>
+                </a:r>
+                <a:r>
+                  <a:rPr lang="en-US" sz="2800" baseline="-25000" dirty="0" smtClean="0">
+                    <a:latin typeface="Comic Sans MS" pitchFamily="66" charset="0"/>
+                  </a:rPr>
+                  <a:t>1</a:t>
+                </a:r>
+                <a:endParaRPr lang="en-US" sz="2800" dirty="0" smtClean="0">
+                  <a:latin typeface="Comic Sans MS" pitchFamily="66" charset="0"/>
+                </a:endParaRPr>
+              </a:p>
+            </p:txBody>
+          </p:sp>
+          <p:sp>
+            <p:nvSpPr>
+              <p:cNvPr id="78" name="TextBox 77"/>
+              <p:cNvSpPr txBox="1"/>
+              <p:nvPr/>
+            </p:nvSpPr>
+            <p:spPr>
+              <a:xfrm>
+                <a:off x="5105400" y="4800600"/>
+                <a:ext cx="541693" cy="523220"/>
+              </a:xfrm>
+              <a:prstGeom prst="rect">
+                <a:avLst/>
+              </a:prstGeom>
+              <a:noFill/>
+            </p:spPr>
+            <p:txBody>
+              <a:bodyPr wrap="none" rtlCol="0">
+                <a:spAutoFit/>
+              </a:bodyPr>
+              <a:lstStyle/>
+              <a:p>
+                <a:pPr algn="l"/>
+                <a:r>
+                  <a:rPr lang="en-US" sz="2800" dirty="0" smtClean="0">
+                    <a:latin typeface="Comic Sans MS" pitchFamily="66" charset="0"/>
+                  </a:rPr>
+                  <a:t>d</a:t>
+                </a:r>
+                <a:r>
+                  <a:rPr lang="en-US" sz="2800" baseline="-25000" dirty="0" smtClean="0">
+                    <a:latin typeface="Comic Sans MS" pitchFamily="66" charset="0"/>
+                  </a:rPr>
+                  <a:t>2</a:t>
+                </a:r>
+                <a:endParaRPr lang="en-US" sz="2800" dirty="0" smtClean="0">
+                  <a:latin typeface="Comic Sans MS" pitchFamily="66" charset="0"/>
+                </a:endParaRPr>
+              </a:p>
+            </p:txBody>
+          </p:sp>
+          <p:sp>
+            <p:nvSpPr>
+              <p:cNvPr id="79" name="TextBox 78"/>
+              <p:cNvSpPr txBox="1"/>
+              <p:nvPr/>
+            </p:nvSpPr>
+            <p:spPr>
+              <a:xfrm>
+                <a:off x="3962400" y="4813300"/>
+                <a:ext cx="541693" cy="523220"/>
+              </a:xfrm>
+              <a:prstGeom prst="rect">
+                <a:avLst/>
+              </a:prstGeom>
+              <a:noFill/>
+            </p:spPr>
+            <p:txBody>
+              <a:bodyPr wrap="none" rtlCol="0">
+                <a:spAutoFit/>
+              </a:bodyPr>
+              <a:lstStyle/>
+              <a:p>
+                <a:pPr algn="l"/>
+                <a:r>
+                  <a:rPr lang="en-US" sz="2800" dirty="0" smtClean="0">
+                    <a:latin typeface="Comic Sans MS" pitchFamily="66" charset="0"/>
+                  </a:rPr>
+                  <a:t>d</a:t>
+                </a:r>
+                <a:r>
+                  <a:rPr lang="en-US" sz="2800" baseline="-25000" dirty="0" smtClean="0">
+                    <a:latin typeface="Comic Sans MS" pitchFamily="66" charset="0"/>
+                  </a:rPr>
+                  <a:t>3</a:t>
+                </a:r>
+              </a:p>
+            </p:txBody>
+          </p:sp>
+          <p:sp>
+            <p:nvSpPr>
+              <p:cNvPr id="80" name="TextBox 79"/>
+              <p:cNvSpPr txBox="1"/>
+              <p:nvPr/>
+            </p:nvSpPr>
+            <p:spPr>
+              <a:xfrm>
+                <a:off x="2667000" y="4813300"/>
+                <a:ext cx="541693" cy="523220"/>
+              </a:xfrm>
+              <a:prstGeom prst="rect">
+                <a:avLst/>
+              </a:prstGeom>
+              <a:noFill/>
+            </p:spPr>
+            <p:txBody>
+              <a:bodyPr wrap="none" rtlCol="0">
+                <a:spAutoFit/>
+              </a:bodyPr>
+              <a:lstStyle/>
+              <a:p>
+                <a:pPr algn="l"/>
+                <a:r>
+                  <a:rPr lang="en-US" sz="2800" dirty="0" smtClean="0">
+                    <a:latin typeface="Comic Sans MS" pitchFamily="66" charset="0"/>
+                  </a:rPr>
+                  <a:t>d</a:t>
+                </a:r>
+                <a:r>
+                  <a:rPr lang="en-US" sz="2800" baseline="-25000" dirty="0" smtClean="0">
+                    <a:latin typeface="Comic Sans MS" pitchFamily="66" charset="0"/>
+                  </a:rPr>
+                  <a:t>4</a:t>
+                </a:r>
+                <a:endParaRPr lang="en-US" sz="2800" dirty="0" smtClean="0">
+                  <a:latin typeface="Comic Sans MS" pitchFamily="66" charset="0"/>
+                </a:endParaRPr>
+              </a:p>
+            </p:txBody>
+          </p:sp>
+          <p:sp>
+            <p:nvSpPr>
+              <p:cNvPr id="81" name="TextBox 80"/>
+              <p:cNvSpPr txBox="1"/>
+              <p:nvPr/>
+            </p:nvSpPr>
+            <p:spPr>
+              <a:xfrm>
+                <a:off x="1397000" y="4826000"/>
+                <a:ext cx="541693" cy="523220"/>
+              </a:xfrm>
+              <a:prstGeom prst="rect">
+                <a:avLst/>
+              </a:prstGeom>
+              <a:noFill/>
+            </p:spPr>
+            <p:txBody>
+              <a:bodyPr wrap="none" rtlCol="0">
+                <a:spAutoFit/>
+              </a:bodyPr>
+              <a:lstStyle/>
+              <a:p>
+                <a:pPr algn="l"/>
+                <a:r>
+                  <a:rPr lang="en-US" sz="2800" dirty="0" smtClean="0">
+                    <a:latin typeface="Comic Sans MS" pitchFamily="66" charset="0"/>
+                  </a:rPr>
+                  <a:t>d</a:t>
+                </a:r>
+                <a:r>
+                  <a:rPr lang="en-US" sz="2800" baseline="-25000" dirty="0" smtClean="0">
+                    <a:latin typeface="Comic Sans MS" pitchFamily="66" charset="0"/>
+                  </a:rPr>
+                  <a:t>5</a:t>
+                </a:r>
+              </a:p>
+            </p:txBody>
+          </p:sp>
+        </p:grpSp>
+      </p:grpSp>
+    </p:spTree>
+    <p:extLst>
+      <p:ext uri="{BB962C8B-B14F-4D97-AF65-F5344CB8AC3E}">
+        <p14:creationId xmlns:p14="http://schemas.microsoft.com/office/powerpoint/2010/main" val="762864566"/>
+      </p:ext>
+    </p:extLst>
+  </p:cSld>
+  <p:clrMapOvr>
+    <a:masterClrMapping/>
+  </p:clrMapOvr>
+  <mc:AlternateContent xmlns:mc="http://schemas.openxmlformats.org/markup-compatibility/2006" xmlns:p14="http://schemas.microsoft.com/office/powerpoint/2010/main">
+    <mc:Choice Requires="p14">
+      <p:transition p14:dur="400" advClick="0">
+        <p:fade/>
+      </p:transition>
+    </mc:Choice>
+    <mc:Fallback xmlns="">
+      <p:transition xmlns:p14="http://schemas.microsoft.com/office/powerpoint/2010/main" advClick="0">
+        <p:fade/>
+      </p:transition>
+    </mc:Fallback>
+  </mc:AlternateContent>
+  <p:timing>
+    <p:tnLst>
+      <p:par>
+        <p:cTn xmlns:p14="http://schemas.microsoft.com/office/powerpoint/2010/main" id="1" dur="indefinite" restart="never" nodeType="tmRoot">
+          <p:childTnLst>
+            <p:seq concurrent="1" nextAc="seek">
+              <p:cTn id="2" dur="indefinite" nodeType="mainSeq">
+                <p:childTnLst>
+                  <p:par>
+                    <p:cTn id="3" fill="hold">
+                      <p:stCondLst>
+                        <p:cond delay="indefinite"/>
+                      </p:stCondLst>
+                      <p:childTnLst>
+                        <p:par>
+                          <p:cTn id="4" fill="hold">
+                            <p:stCondLst>
+                              <p:cond delay="0"/>
+                            </p:stCondLst>
+                            <p:childTnLst>
+                              <p:par>
+                                <p:cTn id="5" presetID="10" presetClass="entr" presetSubtype="0" fill="hold" nodeType="clickEffect">
+                                  <p:stCondLst>
+                                    <p:cond delay="0"/>
+                                  </p:stCondLst>
+                                  <p:childTnLst>
+                                    <p:set>
+                                      <p:cBhvr>
+                                        <p:cTn id="6" dur="1" fill="hold">
+                                          <p:stCondLst>
+                                            <p:cond delay="0"/>
+                                          </p:stCondLst>
+                                        </p:cTn>
+                                        <p:tgtEl>
+                                          <p:spTgt spid="12"/>
+                                        </p:tgtEl>
+                                        <p:attrNameLst>
+                                          <p:attrName>style.visibility</p:attrName>
+                                        </p:attrNameLst>
+                                      </p:cBhvr>
+                                      <p:to>
+                                        <p:strVal val="visible"/>
+                                      </p:to>
+                                    </p:set>
+                                    <p:animEffect transition="in" filter="fade">
+                                      <p:cBhvr>
+                                        <p:cTn id="7" dur="500"/>
+                                        <p:tgtEl>
+                                          <p:spTgt spid="12"/>
+                                        </p:tgtEl>
+                                      </p:cBhvr>
+                                    </p:animEffect>
+                                  </p:childTnLst>
+                                </p:cTn>
+                              </p:par>
+                              <p:par>
+                                <p:cTn id="8" presetID="9" presetClass="exit" presetSubtype="0" fill="hold" nodeType="withEffect">
+                                  <p:stCondLst>
+                                    <p:cond delay="0"/>
+                                  </p:stCondLst>
+                                  <p:childTnLst>
+                                    <p:animEffect transition="out" filter="dissolve">
+                                      <p:cBhvr>
+                                        <p:cTn id="9" dur="500"/>
+                                        <p:tgtEl>
+                                          <p:spTgt spid="66"/>
+                                        </p:tgtEl>
+                                      </p:cBhvr>
+                                    </p:animEffect>
+                                    <p:set>
+                                      <p:cBhvr>
+                                        <p:cTn id="10" dur="1" fill="hold">
+                                          <p:stCondLst>
+                                            <p:cond delay="499"/>
+                                          </p:stCondLst>
+                                        </p:cTn>
+                                        <p:tgtEl>
+                                          <p:spTgt spid="66"/>
+                                        </p:tgtEl>
+                                        <p:attrNameLst>
+                                          <p:attrName>style.visibility</p:attrName>
+                                        </p:attrNameLst>
+                                      </p:cBhvr>
+                                      <p:to>
+                                        <p:strVal val="hidden"/>
+                                      </p:to>
+                                    </p:set>
+                                  </p:childTnLst>
+                                </p:cTn>
+                              </p:par>
+                            </p:childTnLst>
+                          </p:cTn>
+                        </p:par>
+                      </p:childTnLst>
+                    </p:cTn>
+                  </p:par>
+                  <p:par>
+                    <p:cTn id="11" fill="hold">
+                      <p:stCondLst>
+                        <p:cond delay="indefinite"/>
+                      </p:stCondLst>
+                      <p:childTnLst>
+                        <p:par>
+                          <p:cTn id="12" fill="hold">
+                            <p:stCondLst>
+                              <p:cond delay="0"/>
+                            </p:stCondLst>
+                            <p:childTnLst>
+                              <p:par>
+                                <p:cTn id="13" presetID="22" presetClass="entr" presetSubtype="2" fill="hold" nodeType="clickEffect">
+                                  <p:stCondLst>
+                                    <p:cond delay="0"/>
+                                  </p:stCondLst>
+                                  <p:childTnLst>
+                                    <p:set>
+                                      <p:cBhvr>
+                                        <p:cTn id="14" dur="1" fill="hold">
+                                          <p:stCondLst>
+                                            <p:cond delay="0"/>
+                                          </p:stCondLst>
+                                        </p:cTn>
+                                        <p:tgtEl>
+                                          <p:spTgt spid="56"/>
+                                        </p:tgtEl>
+                                        <p:attrNameLst>
+                                          <p:attrName>style.visibility</p:attrName>
+                                        </p:attrNameLst>
+                                      </p:cBhvr>
+                                      <p:to>
+                                        <p:strVal val="visible"/>
+                                      </p:to>
+                                    </p:set>
+                                    <p:animEffect transition="in" filter="wipe(right)">
+                                      <p:cBhvr>
+                                        <p:cTn id="15" dur="1000"/>
+                                        <p:tgtEl>
+                                          <p:spTgt spid="56"/>
+                                        </p:tgtEl>
+                                      </p:cBhvr>
+                                    </p:animEffect>
+                                  </p:childTnLst>
+                                </p:cTn>
+                              </p:par>
+                              <p:par>
+                                <p:cTn id="16" presetID="22" presetClass="exit" presetSubtype="2" fill="hold" nodeType="withEffect">
+                                  <p:stCondLst>
+                                    <p:cond delay="0"/>
+                                  </p:stCondLst>
+                                  <p:childTnLst>
+                                    <p:animEffect transition="out" filter="wipe(right)">
+                                      <p:cBhvr>
+                                        <p:cTn id="17" dur="1000"/>
+                                        <p:tgtEl>
+                                          <p:spTgt spid="73"/>
+                                        </p:tgtEl>
+                                      </p:cBhvr>
+                                    </p:animEffect>
+                                    <p:set>
+                                      <p:cBhvr>
+                                        <p:cTn id="18" dur="1" fill="hold">
+                                          <p:stCondLst>
+                                            <p:cond delay="999"/>
+                                          </p:stCondLst>
+                                        </p:cTn>
+                                        <p:tgtEl>
+                                          <p:spTgt spid="73"/>
+                                        </p:tgtEl>
+                                        <p:attrNameLst>
+                                          <p:attrName>style.visibility</p:attrName>
+                                        </p:attrNameLst>
+                                      </p:cBhvr>
+                                      <p:to>
+                                        <p:strVal val="hidden"/>
+                                      </p:to>
+                                    </p:set>
+                                  </p:childTnLst>
+                                </p:cTn>
+                              </p:par>
+                            </p:childTnLst>
+                          </p:cTn>
+                        </p:par>
+                      </p:childTnLst>
+                    </p:cTn>
+                  </p:par>
+                </p:childTnLst>
+              </p:cTn>
+              <p:prevCondLst>
+                <p:cond evt="onPrev" delay="0">
+                  <p:tgtEl>
+                    <p:sldTgt/>
+                  </p:tgtEl>
+                </p:cond>
+              </p:prevCondLst>
+              <p:nextCondLst>
+                <p:cond evt="onNext" delay="0">
+                  <p:tgtEl>
+                    <p:sldTgt/>
+                  </p:tgtEl>
+                </p:cond>
+              </p:nextCondLst>
+            </p:seq>
+          </p:childTnLst>
+        </p:cTn>
+      </p:par>
+    </p:tnLst>
+  </p:timing>
+</p:sld>
+</file>
+
+<file path=ppt/slides/slide7.xml><?xml version="1.0" encoding="utf-8"?>
+<p:sld xmlns:a="http://schemas.openxmlformats.org/drawingml/2006/main" xmlns:r="http://schemas.openxmlformats.org/officeDocument/2006/relationships" xmlns:p="http://schemas.openxmlformats.org/presentationml/2006/main">
+  <p:cSld>
+    <p:spTree>
+      <p:nvGrpSpPr>
+        <p:cNvPr id="1" name=""/>
+        <p:cNvGrpSpPr/>
+        <p:nvPr/>
+      </p:nvGrpSpPr>
+      <p:grpSpPr>
+        <a:xfrm>
+          <a:off x="0" y="0"/>
+          <a:ext cx="0" cy="0"/>
+          <a:chOff x="0" y="0"/>
+          <a:chExt cx="0" cy="0"/>
+        </a:xfrm>
+      </p:grpSpPr>
       <p:cxnSp>
         <p:nvCxnSpPr>
           <p:cNvPr id="142" name="Straight Connector 141"/>
@@ -16960,7 +20436,7 @@
               <a:pPr>
                 <a:defRPr/>
               </a:pPr>
-              <a:t>6</a:t>
+              <a:t>7</a:t>
             </a:fld>
             <a:endParaRPr lang="en-US" dirty="0">
               <a:solidFill>
@@ -19318,7 +22794,7 @@
 </p:sld>
 </file>
 
-<file path=ppt/slides/slide7.xml><?xml version="1.0" encoding="utf-8"?>
+<file path=ppt/slides/slide8.xml><?xml version="1.0" encoding="utf-8"?>
 <p:sld xmlns:a="http://schemas.openxmlformats.org/drawingml/2006/main" xmlns:r="http://schemas.openxmlformats.org/officeDocument/2006/relationships" xmlns:p="http://schemas.openxmlformats.org/presentationml/2006/main">
   <p:cSld>
     <p:spTree>
@@ -19808,7 +23284,7 @@
               <a:pPr>
                 <a:defRPr/>
               </a:pPr>
-              <a:t>7</a:t>
+              <a:t>8</a:t>
             </a:fld>
             <a:endParaRPr lang="en-US" dirty="0">
               <a:solidFill>
@@ -22645,7 +26121,7 @@
 </p:sld>
 </file>
 
-<file path=ppt/slides/slide8.xml><?xml version="1.0" encoding="utf-8"?>
+<file path=ppt/slides/slide9.xml><?xml version="1.0" encoding="utf-8"?>
 <p:sld xmlns:a="http://schemas.openxmlformats.org/drawingml/2006/main" xmlns:r="http://schemas.openxmlformats.org/officeDocument/2006/relationships" xmlns:p="http://schemas.openxmlformats.org/presentationml/2006/main" show="0">
   <p:cSld>
     <p:spTree>
@@ -22748,7 +26224,7 @@
                 </a:solidFill>
               </a:rPr>
               <a:pPr/>
-              <a:t>8</a:t>
+              <a:t>9</a:t>
             </a:fld>
             <a:endParaRPr lang="en-US" dirty="0" smtClean="0">
               <a:solidFill>
@@ -22808,7 +26284,7 @@
           <a:graphicData uri="http://schemas.openxmlformats.org/presentationml/2006/ole">
             <mc:AlternateContent xmlns:mc="http://schemas.openxmlformats.org/markup-compatibility/2006">
               <mc:Choice xmlns:v="urn:schemas-microsoft-com:vml" Requires="v">
-                <p:oleObj spid="_x0000_s1055" name="Equation" r:id="rId4" imgW="2286000" imgH="1041400" progId="Equation.DSMT4">
+                <p:oleObj spid="_x0000_s1066" name="Equation" r:id="rId4" imgW="2286000" imgH="1041400" progId="Equation.DSMT4">
                   <p:embed/>
                 </p:oleObj>
               </mc:Choice>
@@ -22878,7 +26354,7 @@
           <a:graphicData uri="http://schemas.openxmlformats.org/presentationml/2006/ole">
             <mc:AlternateContent xmlns:mc="http://schemas.openxmlformats.org/markup-compatibility/2006">
               <mc:Choice xmlns:v="urn:schemas-microsoft-com:vml" Requires="v">
-                <p:oleObj spid="_x0000_s1056" name="Equation" r:id="rId6" imgW="2286000" imgH="1041400" progId="Equation.DSMT4">
+                <p:oleObj spid="_x0000_s1067" name="Equation" r:id="rId6" imgW="2286000" imgH="1041400" progId="Equation.DSMT4">
                   <p:embed/>
                 </p:oleObj>
               </mc:Choice>
@@ -23380,730 +26856,6 @@
                                         <p:strVal val="hidden"/>
                                       </p:to>
                                     </p:set>
-                                  </p:childTnLst>
-                                </p:cTn>
-                              </p:par>
-                            </p:childTnLst>
-                          </p:cTn>
-                        </p:par>
-                      </p:childTnLst>
-                    </p:cTn>
-                  </p:par>
-                </p:childTnLst>
-              </p:cTn>
-              <p:prevCondLst>
-                <p:cond evt="onPrev" delay="0">
-                  <p:tgtEl>
-                    <p:sldTgt/>
-                  </p:tgtEl>
-                </p:cond>
-              </p:prevCondLst>
-              <p:nextCondLst>
-                <p:cond evt="onNext" delay="0">
-                  <p:tgtEl>
-                    <p:sldTgt/>
-                  </p:tgtEl>
-                </p:cond>
-              </p:nextCondLst>
-            </p:seq>
-          </p:childTnLst>
-        </p:cTn>
-      </p:par>
-    </p:tnLst>
-  </p:timing>
-</p:sld>
-</file>
-
-<file path=ppt/slides/slide9.xml><?xml version="1.0" encoding="utf-8"?>
-<p:sld xmlns:a="http://schemas.openxmlformats.org/drawingml/2006/main" xmlns:r="http://schemas.openxmlformats.org/officeDocument/2006/relationships" xmlns:p="http://schemas.openxmlformats.org/presentationml/2006/main">
-  <p:cSld>
-    <p:spTree>
-      <p:nvGrpSpPr>
-        <p:cNvPr id="1" name=""/>
-        <p:cNvGrpSpPr/>
-        <p:nvPr/>
-      </p:nvGrpSpPr>
-      <p:grpSpPr>
-        <a:xfrm>
-          <a:off x="0" y="0"/>
-          <a:ext cx="0" cy="0"/>
-          <a:chOff x="0" y="0"/>
-          <a:chExt cx="0" cy="0"/>
-        </a:xfrm>
-      </p:grpSpPr>
-      <p:sp>
-        <p:nvSpPr>
-          <p:cNvPr id="17" name="TextBox 16"/>
-          <p:cNvSpPr txBox="1"/>
-          <p:nvPr/>
-        </p:nvSpPr>
-        <p:spPr>
-          <a:xfrm>
-            <a:off x="4572000" y="6306671"/>
-            <a:ext cx="4216219" cy="276999"/>
-          </a:xfrm>
-          <a:prstGeom prst="rect">
-            <a:avLst/>
-          </a:prstGeom>
-          <a:noFill/>
-        </p:spPr>
-        <p:txBody>
-          <a:bodyPr wrap="none" rtlCol="0">
-            <a:spAutoFit/>
-          </a:bodyPr>
-          <a:lstStyle/>
-          <a:p>
-            <a:r>
-              <a:rPr lang="en-US" sz="1200" dirty="0" smtClean="0">
-                <a:solidFill>
-                  <a:srgbClr val="000000"/>
-                </a:solidFill>
-              </a:rPr>
-              <a:t>from </a:t>
-            </a:r>
-            <a:r>
-              <a:rPr lang="en-US" sz="1000" dirty="0" smtClean="0">
-                <a:solidFill>
-                  <a:srgbClr val="000000"/>
-                </a:solidFill>
-                <a:latin typeface="Courier New" pitchFamily="49" charset="0"/>
-                <a:cs typeface="Courier New" pitchFamily="49" charset="0"/>
-              </a:rPr>
-              <a:t>http://en.wikipedia.org/wiki/Adder_(electronics)</a:t>
-            </a:r>
-            <a:endParaRPr lang="en-US" sz="1000" dirty="0">
-              <a:solidFill>
-                <a:srgbClr val="000000"/>
-              </a:solidFill>
-              <a:latin typeface="Courier New" pitchFamily="49" charset="0"/>
-              <a:cs typeface="Courier New" pitchFamily="49" charset="0"/>
-            </a:endParaRPr>
-          </a:p>
-        </p:txBody>
-      </p:sp>
-      <p:sp>
-        <p:nvSpPr>
-          <p:cNvPr id="10" name="Slide Number Placeholder 2"/>
-          <p:cNvSpPr>
-            <a:spLocks noGrp="1"/>
-          </p:cNvSpPr>
-          <p:nvPr>
-            <p:ph type="sldNum" sz="quarter" idx="10"/>
-          </p:nvPr>
-        </p:nvSpPr>
-        <p:spPr>
-          <a:xfrm>
-            <a:off x="8375341" y="6553200"/>
-            <a:ext cx="768660" cy="276999"/>
-          </a:xfrm>
-          <a:noFill/>
-        </p:spPr>
-        <p:txBody>
-          <a:bodyPr/>
-          <a:lstStyle/>
-          <a:p>
-            <a:r>
-              <a:rPr lang="en-US" dirty="0" smtClean="0">
-                <a:solidFill>
-                  <a:srgbClr val="000000"/>
-                </a:solidFill>
-              </a:rPr>
-              <a:t>digital.</a:t>
-            </a:r>
-            <a:fld id="{0150943C-9303-41DF-A6FA-7E32D6C5D18E}" type="slidenum">
-              <a:rPr lang="en-US" smtClean="0">
-                <a:solidFill>
-                  <a:srgbClr val="000000"/>
-                </a:solidFill>
-              </a:rPr>
-              <a:pPr/>
-              <a:t>9</a:t>
-            </a:fld>
-            <a:endParaRPr lang="en-US" dirty="0" smtClean="0">
-              <a:solidFill>
-                <a:srgbClr val="000000"/>
-              </a:solidFill>
-            </a:endParaRPr>
-          </a:p>
-        </p:txBody>
-      </p:sp>
-      <p:sp>
-        <p:nvSpPr>
-          <p:cNvPr id="13" name="Title 1"/>
-          <p:cNvSpPr>
-            <a:spLocks noGrp="1"/>
-          </p:cNvSpPr>
-          <p:nvPr>
-            <p:ph type="title"/>
-          </p:nvPr>
-        </p:nvSpPr>
-        <p:spPr>
-          <a:xfrm>
-            <a:off x="2863332" y="213929"/>
-            <a:ext cx="4061861" cy="954472"/>
-          </a:xfrm>
-        </p:spPr>
-        <p:txBody>
-          <a:bodyPr/>
-          <a:lstStyle/>
-          <a:p>
-            <a:r>
-              <a:rPr lang="en-US" sz="4800" dirty="0" smtClean="0"/>
-              <a:t>half Adder</a:t>
-            </a:r>
-            <a:endParaRPr lang="en-US" sz="4800" dirty="0"/>
-          </a:p>
-        </p:txBody>
-      </p:sp>
-      <p:graphicFrame>
-        <p:nvGraphicFramePr>
-          <p:cNvPr id="18" name="Object 17"/>
-          <p:cNvGraphicFramePr>
-            <a:graphicFrameLocks noChangeAspect="1"/>
-          </p:cNvGraphicFramePr>
-          <p:nvPr>
-            <p:extLst>
-              <p:ext uri="{D42A27DB-BD31-4B8C-83A1-F6EECF244321}">
-                <p14:modId xmlns:p14="http://schemas.microsoft.com/office/powerpoint/2010/main" val="4051854167"/>
-              </p:ext>
-            </p:extLst>
-          </p:nvPr>
-        </p:nvGraphicFramePr>
-        <p:xfrm>
-          <a:off x="781050" y="2887663"/>
-          <a:ext cx="4160838" cy="860425"/>
-        </p:xfrm>
-        <a:graphic>
-          <a:graphicData uri="http://schemas.openxmlformats.org/presentationml/2006/ole">
-            <mc:AlternateContent xmlns:mc="http://schemas.openxmlformats.org/markup-compatibility/2006">
-              <mc:Choice xmlns:v="urn:schemas-microsoft-com:vml" Requires="v">
-                <p:oleObj spid="_x0000_s252942" name="Equation" r:id="rId4" imgW="2273300" imgH="469900" progId="Equation.DSMT4">
-                  <p:embed/>
-                </p:oleObj>
-              </mc:Choice>
-              <mc:Fallback>
-                <p:oleObj name="Equation" r:id="rId4" imgW="2273300" imgH="469900" progId="Equation.DSMT4">
-                  <p:embed/>
-                  <p:pic>
-                    <p:nvPicPr>
-                      <p:cNvPr id="0" name=""/>
-                      <p:cNvPicPr>
-                        <a:picLocks noChangeAspect="1" noChangeArrowheads="1"/>
-                      </p:cNvPicPr>
-                      <p:nvPr/>
-                    </p:nvPicPr>
-                    <p:blipFill>
-                      <a:blip r:embed="rId5"/>
-                      <a:srcRect/>
-                      <a:stretch>
-                        <a:fillRect/>
-                      </a:stretch>
-                    </p:blipFill>
-                    <p:spPr bwMode="auto">
-                      <a:xfrm>
-                        <a:off x="781050" y="2887663"/>
-                        <a:ext cx="4160838" cy="860425"/>
-                      </a:xfrm>
-                      <a:prstGeom prst="rect">
-                        <a:avLst/>
-                      </a:prstGeom>
-                      <a:noFill/>
-                      <a:extLst>
-                        <a:ext uri="{909E8E84-426E-40dd-AFC4-6F175D3DCCD1}">
-                          <a14:hiddenFill xmlns:a14="http://schemas.microsoft.com/office/drawing/2010/main">
-                            <a:solidFill>
-                              <a:srgbClr val="FFFFFF"/>
-                            </a:solidFill>
-                          </a14:hiddenFill>
-                        </a:ext>
-                      </a:extLst>
-                    </p:spPr>
-                  </p:pic>
-                </p:oleObj>
-              </mc:Fallback>
-            </mc:AlternateContent>
-          </a:graphicData>
-        </a:graphic>
-      </p:graphicFrame>
-      <p:grpSp>
-        <p:nvGrpSpPr>
-          <p:cNvPr id="7" name="Group 6"/>
-          <p:cNvGrpSpPr/>
-          <p:nvPr/>
-        </p:nvGrpSpPr>
-        <p:grpSpPr>
-          <a:xfrm rot="5400000">
-            <a:off x="4416245" y="2039750"/>
-            <a:ext cx="4854789" cy="2756242"/>
-            <a:chOff x="1985587" y="3221038"/>
-            <a:chExt cx="4854789" cy="2756242"/>
-          </a:xfrm>
-        </p:grpSpPr>
-        <p:grpSp>
-          <p:nvGrpSpPr>
-            <p:cNvPr id="4" name="Group 3"/>
-            <p:cNvGrpSpPr/>
-            <p:nvPr/>
-          </p:nvGrpSpPr>
-          <p:grpSpPr>
-            <a:xfrm>
-              <a:off x="1985587" y="3221038"/>
-              <a:ext cx="4693026" cy="2756242"/>
-              <a:chOff x="1985587" y="3221038"/>
-              <a:chExt cx="4693026" cy="2756242"/>
-            </a:xfrm>
-          </p:grpSpPr>
-          <p:pic>
-            <p:nvPicPr>
-              <p:cNvPr id="287748" name="Picture 4"/>
-              <p:cNvPicPr>
-                <a:picLocks noChangeAspect="1" noChangeArrowheads="1"/>
-              </p:cNvPicPr>
-              <p:nvPr/>
-            </p:nvPicPr>
-            <p:blipFill>
-              <a:blip r:embed="rId6"/>
-              <a:srcRect/>
-              <a:stretch>
-                <a:fillRect/>
-              </a:stretch>
-            </p:blipFill>
-            <p:spPr bwMode="auto">
-              <a:xfrm>
-                <a:off x="2413001" y="3221038"/>
-                <a:ext cx="4265612" cy="2756242"/>
-              </a:xfrm>
-              <a:prstGeom prst="rect">
-                <a:avLst/>
-              </a:prstGeom>
-              <a:noFill/>
-              <a:ln w="9525">
-                <a:noFill/>
-                <a:miter lim="800000"/>
-                <a:headEnd/>
-                <a:tailEnd/>
-              </a:ln>
-              <a:effectLst/>
-            </p:spPr>
-          </p:pic>
-          <p:sp useBgFill="1">
-            <p:nvSpPr>
-              <p:cNvPr id="12" name="TextBox 11"/>
-              <p:cNvSpPr txBox="1"/>
-              <p:nvPr/>
-            </p:nvSpPr>
-            <p:spPr>
-              <a:xfrm rot="16200000">
-                <a:off x="2120933" y="3810000"/>
-                <a:ext cx="519418" cy="769441"/>
-              </a:xfrm>
-              <a:prstGeom prst="rect">
-                <a:avLst/>
-              </a:prstGeom>
-            </p:spPr>
-            <p:txBody>
-              <a:bodyPr wrap="none" rtlCol="0">
-                <a:spAutoFit/>
-              </a:bodyPr>
-              <a:lstStyle/>
-              <a:p>
-                <a:pPr algn="l"/>
-                <a:r>
-                  <a:rPr lang="en-US" sz="4400" dirty="0" smtClean="0">
-                    <a:latin typeface="Comic Sans MS" pitchFamily="66" charset="0"/>
-                  </a:rPr>
-                  <a:t>b</a:t>
-                </a:r>
-              </a:p>
-            </p:txBody>
-          </p:sp>
-          <p:sp>
-            <p:nvSpPr>
-              <p:cNvPr id="15" name="Rectangle 14"/>
-              <p:cNvSpPr/>
-              <p:nvPr/>
-            </p:nvSpPr>
-            <p:spPr>
-              <a:xfrm>
-                <a:off x="3136900" y="3238500"/>
-                <a:ext cx="2832100" cy="2608262"/>
-              </a:xfrm>
-              <a:prstGeom prst="rect">
-                <a:avLst/>
-              </a:prstGeom>
-              <a:noFill/>
-              <a:ln>
-                <a:solidFill>
-                  <a:schemeClr val="tx2"/>
-                </a:solidFill>
-                <a:prstDash val="sysDash"/>
-              </a:ln>
-            </p:spPr>
-            <p:style>
-              <a:lnRef idx="2">
-                <a:schemeClr val="accent1">
-                  <a:shade val="50000"/>
-                </a:schemeClr>
-              </a:lnRef>
-              <a:fillRef idx="1">
-                <a:schemeClr val="accent1"/>
-              </a:fillRef>
-              <a:effectRef idx="0">
-                <a:schemeClr val="accent1"/>
-              </a:effectRef>
-              <a:fontRef idx="minor">
-                <a:schemeClr val="lt1"/>
-              </a:fontRef>
-            </p:style>
-            <p:txBody>
-              <a:bodyPr rtlCol="0" anchor="ctr"/>
-              <a:lstStyle/>
-              <a:p>
-                <a:endParaRPr lang="en-US">
-                  <a:solidFill>
-                    <a:srgbClr val="FFFFFF"/>
-                  </a:solidFill>
-                  <a:latin typeface="Times New Roman"/>
-                </a:endParaRPr>
-              </a:p>
-            </p:txBody>
-          </p:sp>
-          <p:sp useBgFill="1">
-            <p:nvSpPr>
-              <p:cNvPr id="14" name="TextBox 13"/>
-              <p:cNvSpPr txBox="1"/>
-              <p:nvPr/>
-            </p:nvSpPr>
-            <p:spPr>
-              <a:xfrm rot="16396041">
-                <a:off x="2133604" y="3276600"/>
-                <a:ext cx="473407" cy="769441"/>
-              </a:xfrm>
-              <a:prstGeom prst="rect">
-                <a:avLst/>
-              </a:prstGeom>
-            </p:spPr>
-            <p:txBody>
-              <a:bodyPr wrap="none" rtlCol="0">
-                <a:spAutoFit/>
-              </a:bodyPr>
-              <a:lstStyle/>
-              <a:p>
-                <a:pPr algn="l"/>
-                <a:r>
-                  <a:rPr lang="en-US" sz="4400" dirty="0" smtClean="0">
-                    <a:latin typeface="Comic Sans MS" pitchFamily="66" charset="0"/>
-                  </a:rPr>
-                  <a:t>a</a:t>
-                </a:r>
-              </a:p>
-            </p:txBody>
-          </p:sp>
-        </p:grpSp>
-        <p:sp useBgFill="1">
-          <p:nvSpPr>
-            <p:cNvPr id="5" name="TextBox 4"/>
-            <p:cNvSpPr txBox="1"/>
-            <p:nvPr/>
-          </p:nvSpPr>
-          <p:spPr>
-            <a:xfrm rot="16200000">
-              <a:off x="6197600" y="3517900"/>
-              <a:ext cx="516112" cy="769441"/>
-            </a:xfrm>
-            <a:prstGeom prst="rect">
-              <a:avLst/>
-            </a:prstGeom>
-          </p:spPr>
-          <p:txBody>
-            <a:bodyPr wrap="none" rtlCol="0">
-              <a:spAutoFit/>
-            </a:bodyPr>
-            <a:lstStyle/>
-            <a:p>
-              <a:pPr algn="l"/>
-              <a:r>
-                <a:rPr lang="en-US" sz="4400" dirty="0" smtClean="0">
-                  <a:latin typeface="Comic Sans MS" pitchFamily="66" charset="0"/>
-                </a:rPr>
-                <a:t>d</a:t>
-              </a:r>
-            </a:p>
-          </p:txBody>
-        </p:sp>
-        <p:sp useBgFill="1">
-          <p:nvSpPr>
-            <p:cNvPr id="21" name="TextBox 20"/>
-            <p:cNvSpPr txBox="1"/>
-            <p:nvPr/>
-          </p:nvSpPr>
-          <p:spPr>
-            <a:xfrm rot="16006795">
-              <a:off x="6197600" y="4953000"/>
-              <a:ext cx="474509" cy="769441"/>
-            </a:xfrm>
-            <a:prstGeom prst="rect">
-              <a:avLst/>
-            </a:prstGeom>
-          </p:spPr>
-          <p:txBody>
-            <a:bodyPr wrap="none" rtlCol="0">
-              <a:spAutoFit/>
-            </a:bodyPr>
-            <a:lstStyle/>
-            <a:p>
-              <a:pPr algn="l"/>
-              <a:r>
-                <a:rPr lang="en-US" sz="4400" dirty="0" smtClean="0">
-                  <a:latin typeface="Comic Sans MS" pitchFamily="66" charset="0"/>
-                </a:rPr>
-                <a:t>c</a:t>
-              </a:r>
-            </a:p>
-          </p:txBody>
-        </p:sp>
-      </p:grpSp>
-      <p:graphicFrame>
-        <p:nvGraphicFramePr>
-          <p:cNvPr id="16" name="Object 15"/>
-          <p:cNvGraphicFramePr>
-            <a:graphicFrameLocks noChangeAspect="1"/>
-          </p:cNvGraphicFramePr>
-          <p:nvPr>
-            <p:extLst>
-              <p:ext uri="{D42A27DB-BD31-4B8C-83A1-F6EECF244321}">
-                <p14:modId xmlns:p14="http://schemas.microsoft.com/office/powerpoint/2010/main" val="1349652803"/>
-              </p:ext>
-            </p:extLst>
-          </p:nvPr>
-        </p:nvGraphicFramePr>
-        <p:xfrm>
-          <a:off x="777875" y="2873375"/>
-          <a:ext cx="4184650" cy="1906588"/>
-        </p:xfrm>
-        <a:graphic>
-          <a:graphicData uri="http://schemas.openxmlformats.org/presentationml/2006/ole">
-            <mc:AlternateContent xmlns:mc="http://schemas.openxmlformats.org/markup-compatibility/2006">
-              <mc:Choice xmlns:v="urn:schemas-microsoft-com:vml" Requires="v">
-                <p:oleObj spid="_x0000_s252943" name="Equation" r:id="rId7" imgW="2286000" imgH="1041400" progId="Equation.DSMT4">
-                  <p:embed/>
-                </p:oleObj>
-              </mc:Choice>
-              <mc:Fallback>
-                <p:oleObj name="Equation" r:id="rId7" imgW="2286000" imgH="1041400" progId="Equation.DSMT4">
-                  <p:embed/>
-                  <p:pic>
-                    <p:nvPicPr>
-                      <p:cNvPr id="0" name=""/>
-                      <p:cNvPicPr>
-                        <a:picLocks noChangeAspect="1" noChangeArrowheads="1"/>
-                      </p:cNvPicPr>
-                      <p:nvPr/>
-                    </p:nvPicPr>
-                    <p:blipFill>
-                      <a:blip r:embed="rId8"/>
-                      <a:srcRect/>
-                      <a:stretch>
-                        <a:fillRect/>
-                      </a:stretch>
-                    </p:blipFill>
-                    <p:spPr bwMode="auto">
-                      <a:xfrm>
-                        <a:off x="777875" y="2873375"/>
-                        <a:ext cx="4184650" cy="1906588"/>
-                      </a:xfrm>
-                      <a:prstGeom prst="rect">
-                        <a:avLst/>
-                      </a:prstGeom>
-                      <a:noFill/>
-                      <a:extLst>
-                        <a:ext uri="{909E8E84-426E-40dd-AFC4-6F175D3DCCD1}">
-                          <a14:hiddenFill xmlns:a14="http://schemas.microsoft.com/office/drawing/2010/main">
-                            <a:solidFill>
-                              <a:srgbClr val="FFFFFF"/>
-                            </a:solidFill>
-                          </a14:hiddenFill>
-                        </a:ext>
-                      </a:extLst>
-                    </p:spPr>
-                  </p:pic>
-                </p:oleObj>
-              </mc:Fallback>
-            </mc:AlternateContent>
-          </a:graphicData>
-        </a:graphic>
-      </p:graphicFrame>
-    </p:spTree>
-    <p:extLst>
-      <p:ext uri="{BB962C8B-B14F-4D97-AF65-F5344CB8AC3E}">
-        <p14:creationId xmlns:p14="http://schemas.microsoft.com/office/powerpoint/2010/main" val="3354419208"/>
-      </p:ext>
-    </p:extLst>
-  </p:cSld>
-  <p:clrMapOvr>
-    <a:masterClrMapping/>
-  </p:clrMapOvr>
-  <p:transition xmlns:p14="http://schemas.microsoft.com/office/powerpoint/2010/main" spd="slow" advClick="0">
-    <p:fade thruBlk="1"/>
-  </p:transition>
-  <p:timing>
-    <p:tnLst>
-      <p:par>
-        <p:cTn xmlns:p14="http://schemas.microsoft.com/office/powerpoint/2010/main" id="1" dur="indefinite" restart="never" nodeType="tmRoot">
-          <p:childTnLst>
-            <p:seq concurrent="1" nextAc="seek">
-              <p:cTn id="2" dur="indefinite" nodeType="mainSeq">
-                <p:childTnLst>
-                  <p:par>
-                    <p:cTn id="3" fill="hold">
-                      <p:stCondLst>
-                        <p:cond delay="indefinite"/>
-                      </p:stCondLst>
-                      <p:childTnLst>
-                        <p:par>
-                          <p:cTn id="4" fill="hold">
-                            <p:stCondLst>
-                              <p:cond delay="0"/>
-                            </p:stCondLst>
-                            <p:childTnLst>
-                              <p:par>
-                                <p:cTn id="5" presetID="22" presetClass="entr" presetSubtype="1" fill="hold" nodeType="clickEffect">
-                                  <p:stCondLst>
-                                    <p:cond delay="0"/>
-                                  </p:stCondLst>
-                                  <p:childTnLst>
-                                    <p:set>
-                                      <p:cBhvr>
-                                        <p:cTn id="6" dur="1" fill="hold">
-                                          <p:stCondLst>
-                                            <p:cond delay="0"/>
-                                          </p:stCondLst>
-                                        </p:cTn>
-                                        <p:tgtEl>
-                                          <p:spTgt spid="7"/>
-                                        </p:tgtEl>
-                                        <p:attrNameLst>
-                                          <p:attrName>style.visibility</p:attrName>
-                                        </p:attrNameLst>
-                                      </p:cBhvr>
-                                      <p:to>
-                                        <p:strVal val="visible"/>
-                                      </p:to>
-                                    </p:set>
-                                    <p:animEffect transition="in" filter="wipe(up)">
-                                      <p:cBhvr>
-                                        <p:cTn id="7" dur="1000"/>
-                                        <p:tgtEl>
-                                          <p:spTgt spid="7"/>
-                                        </p:tgtEl>
-                                      </p:cBhvr>
-                                    </p:animEffect>
-                                  </p:childTnLst>
-                                </p:cTn>
-                              </p:par>
-                            </p:childTnLst>
-                          </p:cTn>
-                        </p:par>
-                      </p:childTnLst>
-                    </p:cTn>
-                  </p:par>
-                  <p:par>
-                    <p:cTn id="8" fill="hold">
-                      <p:stCondLst>
-                        <p:cond delay="indefinite"/>
-                      </p:stCondLst>
-                      <p:childTnLst>
-                        <p:par>
-                          <p:cTn id="9" fill="hold">
-                            <p:stCondLst>
-                              <p:cond delay="0"/>
-                            </p:stCondLst>
-                            <p:childTnLst>
-                              <p:par>
-                                <p:cTn id="10" presetID="22" presetClass="entr" presetSubtype="8" fill="hold" nodeType="clickEffect">
-                                  <p:stCondLst>
-                                    <p:cond delay="0"/>
-                                  </p:stCondLst>
-                                  <p:childTnLst>
-                                    <p:set>
-                                      <p:cBhvr>
-                                        <p:cTn id="11" dur="1" fill="hold">
-                                          <p:stCondLst>
-                                            <p:cond delay="0"/>
-                                          </p:stCondLst>
-                                        </p:cTn>
-                                        <p:tgtEl>
-                                          <p:spTgt spid="18"/>
-                                        </p:tgtEl>
-                                        <p:attrNameLst>
-                                          <p:attrName>style.visibility</p:attrName>
-                                        </p:attrNameLst>
-                                      </p:cBhvr>
-                                      <p:to>
-                                        <p:strVal val="visible"/>
-                                      </p:to>
-                                    </p:set>
-                                    <p:animEffect transition="in" filter="wipe(left)">
-                                      <p:cBhvr>
-                                        <p:cTn id="12" dur="1000"/>
-                                        <p:tgtEl>
-                                          <p:spTgt spid="18"/>
-                                        </p:tgtEl>
-                                      </p:cBhvr>
-                                    </p:animEffect>
-                                  </p:childTnLst>
-                                </p:cTn>
-                              </p:par>
-                            </p:childTnLst>
-                          </p:cTn>
-                        </p:par>
-                      </p:childTnLst>
-                    </p:cTn>
-                  </p:par>
-                  <p:par>
-                    <p:cTn id="13" fill="hold">
-                      <p:stCondLst>
-                        <p:cond delay="indefinite"/>
-                      </p:stCondLst>
-                      <p:childTnLst>
-                        <p:par>
-                          <p:cTn id="14" fill="hold">
-                            <p:stCondLst>
-                              <p:cond delay="0"/>
-                            </p:stCondLst>
-                            <p:childTnLst>
-                              <p:par>
-                                <p:cTn id="15" presetID="22" presetClass="entr" presetSubtype="8" fill="hold" nodeType="clickEffect">
-                                  <p:stCondLst>
-                                    <p:cond delay="0"/>
-                                  </p:stCondLst>
-                                  <p:childTnLst>
-                                    <p:set>
-                                      <p:cBhvr>
-                                        <p:cTn id="16" dur="1" fill="hold">
-                                          <p:stCondLst>
-                                            <p:cond delay="0"/>
-                                          </p:stCondLst>
-                                        </p:cTn>
-                                        <p:tgtEl>
-                                          <p:spTgt spid="16"/>
-                                        </p:tgtEl>
-                                        <p:attrNameLst>
-                                          <p:attrName>style.visibility</p:attrName>
-                                        </p:attrNameLst>
-                                      </p:cBhvr>
-                                      <p:to>
-                                        <p:strVal val="visible"/>
-                                      </p:to>
-                                    </p:set>
-                                    <p:animEffect transition="in" filter="wipe(left)">
-                                      <p:cBhvr>
-                                        <p:cTn id="17" dur="1000"/>
-                                        <p:tgtEl>
-                                          <p:spTgt spid="16"/>
-                                        </p:tgtEl>
-                                      </p:cBhvr>
-                                    </p:animEffect>
                                   </p:childTnLst>
                                 </p:cTn>
                               </p:par>

</xml_diff>